<commit_message>
update plan .txt + debut slide + schéma architecture réseau
</commit_message>
<xml_diff>
--- a/Slides/PRES2019-Projet14-OlivierFourmaux-ROIStreamingImapct-soutenance.pptx
+++ b/Slides/PRES2019-Projet14-OlivierFourmaux-ROIStreamingImapct-soutenance.pptx
@@ -4,6 +4,9 @@
   <p:sldMasterIdLst>
     <p:sldMasterId id="2147483648" r:id="rId1"/>
   </p:sldMasterIdLst>
+  <p:notesMasterIdLst>
+    <p:notesMasterId r:id="rId17"/>
+  </p:notesMasterIdLst>
   <p:sldIdLst>
     <p:sldId id="256" r:id="rId2"/>
     <p:sldId id="257" r:id="rId3"/>
@@ -20,7 +23,6 @@
     <p:sldId id="268" r:id="rId14"/>
     <p:sldId id="269" r:id="rId15"/>
     <p:sldId id="270" r:id="rId16"/>
-    <p:sldId id="271" r:id="rId17"/>
   </p:sldIdLst>
   <p:sldSz cx="12192000" cy="6858000"/>
   <p:notesSz cx="6858000" cy="9144000"/>
@@ -138,6 +140,440 @@
 </p:presentation>
 </file>
 
+<file path=ppt/notesMasters/notesMaster1.xml><?xml version="1.0" encoding="utf-8"?>
+<p:notesMaster xmlns:a="http://schemas.openxmlformats.org/drawingml/2006/main" xmlns:r="http://schemas.openxmlformats.org/officeDocument/2006/relationships" xmlns:p="http://schemas.openxmlformats.org/presentationml/2006/main">
+  <p:cSld>
+    <p:bg>
+      <p:bgRef idx="1001">
+        <a:schemeClr val="bg1"/>
+      </p:bgRef>
+    </p:bg>
+    <p:spTree>
+      <p:nvGrpSpPr>
+        <p:cNvPr id="1" name=""/>
+        <p:cNvGrpSpPr/>
+        <p:nvPr/>
+      </p:nvGrpSpPr>
+      <p:grpSpPr>
+        <a:xfrm>
+          <a:off x="0" y="0"/>
+          <a:ext cx="0" cy="0"/>
+          <a:chOff x="0" y="0"/>
+          <a:chExt cx="0" cy="0"/>
+        </a:xfrm>
+      </p:grpSpPr>
+      <p:sp>
+        <p:nvSpPr>
+          <p:cNvPr id="2" name="Espace réservé de l'en-tête 1"/>
+          <p:cNvSpPr>
+            <a:spLocks noGrp="1"/>
+          </p:cNvSpPr>
+          <p:nvPr>
+            <p:ph type="hdr" sz="quarter"/>
+          </p:nvPr>
+        </p:nvSpPr>
+        <p:spPr>
+          <a:xfrm>
+            <a:off x="0" y="0"/>
+            <a:ext cx="2971800" cy="458788"/>
+          </a:xfrm>
+          <a:prstGeom prst="rect">
+            <a:avLst/>
+          </a:prstGeom>
+        </p:spPr>
+        <p:txBody>
+          <a:bodyPr vert="horz" lIns="91440" tIns="45720" rIns="91440" bIns="45720" rtlCol="0"/>
+          <a:lstStyle>
+            <a:lvl1pPr algn="l">
+              <a:defRPr sz="1200"/>
+            </a:lvl1pPr>
+          </a:lstStyle>
+          <a:p>
+            <a:endParaRPr lang="fr-FR"/>
+          </a:p>
+        </p:txBody>
+      </p:sp>
+      <p:sp>
+        <p:nvSpPr>
+          <p:cNvPr id="3" name="Espace réservé de la date 2"/>
+          <p:cNvSpPr>
+            <a:spLocks noGrp="1"/>
+          </p:cNvSpPr>
+          <p:nvPr>
+            <p:ph type="dt" idx="1"/>
+          </p:nvPr>
+        </p:nvSpPr>
+        <p:spPr>
+          <a:xfrm>
+            <a:off x="3884613" y="0"/>
+            <a:ext cx="2971800" cy="458788"/>
+          </a:xfrm>
+          <a:prstGeom prst="rect">
+            <a:avLst/>
+          </a:prstGeom>
+        </p:spPr>
+        <p:txBody>
+          <a:bodyPr vert="horz" lIns="91440" tIns="45720" rIns="91440" bIns="45720" rtlCol="0"/>
+          <a:lstStyle>
+            <a:lvl1pPr algn="r">
+              <a:defRPr sz="1200"/>
+            </a:lvl1pPr>
+          </a:lstStyle>
+          <a:p>
+            <a:fld id="{83956E12-A7B0-40BB-B53B-545BE3161811}" type="datetimeFigureOut">
+              <a:rPr lang="fr-FR" smtClean="0"/>
+              <a:t>12/06/2020</a:t>
+            </a:fld>
+            <a:endParaRPr lang="fr-FR"/>
+          </a:p>
+        </p:txBody>
+      </p:sp>
+      <p:sp>
+        <p:nvSpPr>
+          <p:cNvPr id="4" name="Espace réservé de l'image des diapositives 3"/>
+          <p:cNvSpPr>
+            <a:spLocks noGrp="1" noRot="1" noChangeAspect="1"/>
+          </p:cNvSpPr>
+          <p:nvPr>
+            <p:ph type="sldImg" idx="2"/>
+          </p:nvPr>
+        </p:nvSpPr>
+        <p:spPr>
+          <a:xfrm>
+            <a:off x="685800" y="1143000"/>
+            <a:ext cx="5486400" cy="3086100"/>
+          </a:xfrm>
+          <a:prstGeom prst="rect">
+            <a:avLst/>
+          </a:prstGeom>
+          <a:noFill/>
+          <a:ln w="12700">
+            <a:solidFill>
+              <a:prstClr val="black"/>
+            </a:solidFill>
+          </a:ln>
+        </p:spPr>
+        <p:txBody>
+          <a:bodyPr vert="horz" lIns="91440" tIns="45720" rIns="91440" bIns="45720" rtlCol="0" anchor="ctr"/>
+          <a:lstStyle/>
+          <a:p>
+            <a:endParaRPr lang="fr-FR"/>
+          </a:p>
+        </p:txBody>
+      </p:sp>
+      <p:sp>
+        <p:nvSpPr>
+          <p:cNvPr id="5" name="Espace réservé des commentaires 4"/>
+          <p:cNvSpPr>
+            <a:spLocks noGrp="1"/>
+          </p:cNvSpPr>
+          <p:nvPr>
+            <p:ph type="body" sz="quarter" idx="3"/>
+          </p:nvPr>
+        </p:nvSpPr>
+        <p:spPr>
+          <a:xfrm>
+            <a:off x="685800" y="4400550"/>
+            <a:ext cx="5486400" cy="3600450"/>
+          </a:xfrm>
+          <a:prstGeom prst="rect">
+            <a:avLst/>
+          </a:prstGeom>
+        </p:spPr>
+        <p:txBody>
+          <a:bodyPr vert="horz" lIns="91440" tIns="45720" rIns="91440" bIns="45720" rtlCol="0"/>
+          <a:lstStyle/>
+          <a:p>
+            <a:pPr lvl="0"/>
+            <a:r>
+              <a:rPr lang="fr-FR" smtClean="0"/>
+              <a:t>Modifiez les styles du texte du masque</a:t>
+            </a:r>
+          </a:p>
+          <a:p>
+            <a:pPr lvl="1"/>
+            <a:r>
+              <a:rPr lang="fr-FR" smtClean="0"/>
+              <a:t>Deuxième niveau</a:t>
+            </a:r>
+          </a:p>
+          <a:p>
+            <a:pPr lvl="2"/>
+            <a:r>
+              <a:rPr lang="fr-FR" smtClean="0"/>
+              <a:t>Troisième niveau</a:t>
+            </a:r>
+          </a:p>
+          <a:p>
+            <a:pPr lvl="3"/>
+            <a:r>
+              <a:rPr lang="fr-FR" smtClean="0"/>
+              <a:t>Quatrième niveau</a:t>
+            </a:r>
+          </a:p>
+          <a:p>
+            <a:pPr lvl="4"/>
+            <a:r>
+              <a:rPr lang="fr-FR" smtClean="0"/>
+              <a:t>Cinquième niveau</a:t>
+            </a:r>
+            <a:endParaRPr lang="fr-FR"/>
+          </a:p>
+        </p:txBody>
+      </p:sp>
+      <p:sp>
+        <p:nvSpPr>
+          <p:cNvPr id="6" name="Espace réservé du pied de page 5"/>
+          <p:cNvSpPr>
+            <a:spLocks noGrp="1"/>
+          </p:cNvSpPr>
+          <p:nvPr>
+            <p:ph type="ftr" sz="quarter" idx="4"/>
+          </p:nvPr>
+        </p:nvSpPr>
+        <p:spPr>
+          <a:xfrm>
+            <a:off x="0" y="8685213"/>
+            <a:ext cx="2971800" cy="458787"/>
+          </a:xfrm>
+          <a:prstGeom prst="rect">
+            <a:avLst/>
+          </a:prstGeom>
+        </p:spPr>
+        <p:txBody>
+          <a:bodyPr vert="horz" lIns="91440" tIns="45720" rIns="91440" bIns="45720" rtlCol="0" anchor="b"/>
+          <a:lstStyle>
+            <a:lvl1pPr algn="l">
+              <a:defRPr sz="1200"/>
+            </a:lvl1pPr>
+          </a:lstStyle>
+          <a:p>
+            <a:endParaRPr lang="fr-FR"/>
+          </a:p>
+        </p:txBody>
+      </p:sp>
+      <p:sp>
+        <p:nvSpPr>
+          <p:cNvPr id="7" name="Espace réservé du numéro de diapositive 6"/>
+          <p:cNvSpPr>
+            <a:spLocks noGrp="1"/>
+          </p:cNvSpPr>
+          <p:nvPr>
+            <p:ph type="sldNum" sz="quarter" idx="5"/>
+          </p:nvPr>
+        </p:nvSpPr>
+        <p:spPr>
+          <a:xfrm>
+            <a:off x="3884613" y="8685213"/>
+            <a:ext cx="2971800" cy="458787"/>
+          </a:xfrm>
+          <a:prstGeom prst="rect">
+            <a:avLst/>
+          </a:prstGeom>
+        </p:spPr>
+        <p:txBody>
+          <a:bodyPr vert="horz" lIns="91440" tIns="45720" rIns="91440" bIns="45720" rtlCol="0" anchor="b"/>
+          <a:lstStyle>
+            <a:lvl1pPr algn="r">
+              <a:defRPr sz="1200"/>
+            </a:lvl1pPr>
+          </a:lstStyle>
+          <a:p>
+            <a:fld id="{49964FFC-9B66-4F48-830D-CDE6869DA765}" type="slidenum">
+              <a:rPr lang="fr-FR" smtClean="0"/>
+              <a:t>‹N°›</a:t>
+            </a:fld>
+            <a:endParaRPr lang="fr-FR"/>
+          </a:p>
+        </p:txBody>
+      </p:sp>
+    </p:spTree>
+    <p:extLst>
+      <p:ext uri="{BB962C8B-B14F-4D97-AF65-F5344CB8AC3E}">
+        <p14:creationId xmlns:p14="http://schemas.microsoft.com/office/powerpoint/2010/main" val="2172398750"/>
+      </p:ext>
+    </p:extLst>
+  </p:cSld>
+  <p:clrMap bg1="lt1" tx1="dk1" bg2="lt2" tx2="dk2" accent1="accent1" accent2="accent2" accent3="accent3" accent4="accent4" accent5="accent5" accent6="accent6" hlink="hlink" folHlink="folHlink"/>
+  <p:notesStyle>
+    <a:lvl1pPr marL="0" algn="l" defTabSz="914400" rtl="0" eaLnBrk="1" latinLnBrk="0" hangingPunct="1">
+      <a:defRPr sz="1200" kern="1200">
+        <a:solidFill>
+          <a:schemeClr val="tx1"/>
+        </a:solidFill>
+        <a:latin typeface="+mn-lt"/>
+        <a:ea typeface="+mn-ea"/>
+        <a:cs typeface="+mn-cs"/>
+      </a:defRPr>
+    </a:lvl1pPr>
+    <a:lvl2pPr marL="457200" algn="l" defTabSz="914400" rtl="0" eaLnBrk="1" latinLnBrk="0" hangingPunct="1">
+      <a:defRPr sz="1200" kern="1200">
+        <a:solidFill>
+          <a:schemeClr val="tx1"/>
+        </a:solidFill>
+        <a:latin typeface="+mn-lt"/>
+        <a:ea typeface="+mn-ea"/>
+        <a:cs typeface="+mn-cs"/>
+      </a:defRPr>
+    </a:lvl2pPr>
+    <a:lvl3pPr marL="914400" algn="l" defTabSz="914400" rtl="0" eaLnBrk="1" latinLnBrk="0" hangingPunct="1">
+      <a:defRPr sz="1200" kern="1200">
+        <a:solidFill>
+          <a:schemeClr val="tx1"/>
+        </a:solidFill>
+        <a:latin typeface="+mn-lt"/>
+        <a:ea typeface="+mn-ea"/>
+        <a:cs typeface="+mn-cs"/>
+      </a:defRPr>
+    </a:lvl3pPr>
+    <a:lvl4pPr marL="1371600" algn="l" defTabSz="914400" rtl="0" eaLnBrk="1" latinLnBrk="0" hangingPunct="1">
+      <a:defRPr sz="1200" kern="1200">
+        <a:solidFill>
+          <a:schemeClr val="tx1"/>
+        </a:solidFill>
+        <a:latin typeface="+mn-lt"/>
+        <a:ea typeface="+mn-ea"/>
+        <a:cs typeface="+mn-cs"/>
+      </a:defRPr>
+    </a:lvl4pPr>
+    <a:lvl5pPr marL="1828800" algn="l" defTabSz="914400" rtl="0" eaLnBrk="1" latinLnBrk="0" hangingPunct="1">
+      <a:defRPr sz="1200" kern="1200">
+        <a:solidFill>
+          <a:schemeClr val="tx1"/>
+        </a:solidFill>
+        <a:latin typeface="+mn-lt"/>
+        <a:ea typeface="+mn-ea"/>
+        <a:cs typeface="+mn-cs"/>
+      </a:defRPr>
+    </a:lvl5pPr>
+    <a:lvl6pPr marL="2286000" algn="l" defTabSz="914400" rtl="0" eaLnBrk="1" latinLnBrk="0" hangingPunct="1">
+      <a:defRPr sz="1200" kern="1200">
+        <a:solidFill>
+          <a:schemeClr val="tx1"/>
+        </a:solidFill>
+        <a:latin typeface="+mn-lt"/>
+        <a:ea typeface="+mn-ea"/>
+        <a:cs typeface="+mn-cs"/>
+      </a:defRPr>
+    </a:lvl6pPr>
+    <a:lvl7pPr marL="2743200" algn="l" defTabSz="914400" rtl="0" eaLnBrk="1" latinLnBrk="0" hangingPunct="1">
+      <a:defRPr sz="1200" kern="1200">
+        <a:solidFill>
+          <a:schemeClr val="tx1"/>
+        </a:solidFill>
+        <a:latin typeface="+mn-lt"/>
+        <a:ea typeface="+mn-ea"/>
+        <a:cs typeface="+mn-cs"/>
+      </a:defRPr>
+    </a:lvl7pPr>
+    <a:lvl8pPr marL="3200400" algn="l" defTabSz="914400" rtl="0" eaLnBrk="1" latinLnBrk="0" hangingPunct="1">
+      <a:defRPr sz="1200" kern="1200">
+        <a:solidFill>
+          <a:schemeClr val="tx1"/>
+        </a:solidFill>
+        <a:latin typeface="+mn-lt"/>
+        <a:ea typeface="+mn-ea"/>
+        <a:cs typeface="+mn-cs"/>
+      </a:defRPr>
+    </a:lvl8pPr>
+    <a:lvl9pPr marL="3657600" algn="l" defTabSz="914400" rtl="0" eaLnBrk="1" latinLnBrk="0" hangingPunct="1">
+      <a:defRPr sz="1200" kern="1200">
+        <a:solidFill>
+          <a:schemeClr val="tx1"/>
+        </a:solidFill>
+        <a:latin typeface="+mn-lt"/>
+        <a:ea typeface="+mn-ea"/>
+        <a:cs typeface="+mn-cs"/>
+      </a:defRPr>
+    </a:lvl9pPr>
+  </p:notesStyle>
+</p:notesMaster>
+</file>
+
+<file path=ppt/notesSlides/notesSlide1.xml><?xml version="1.0" encoding="utf-8"?>
+<p:notes xmlns:a="http://schemas.openxmlformats.org/drawingml/2006/main" xmlns:r="http://schemas.openxmlformats.org/officeDocument/2006/relationships" xmlns:p="http://schemas.openxmlformats.org/presentationml/2006/main">
+  <p:cSld>
+    <p:spTree>
+      <p:nvGrpSpPr>
+        <p:cNvPr id="1" name=""/>
+        <p:cNvGrpSpPr/>
+        <p:nvPr/>
+      </p:nvGrpSpPr>
+      <p:grpSpPr>
+        <a:xfrm>
+          <a:off x="0" y="0"/>
+          <a:ext cx="0" cy="0"/>
+          <a:chOff x="0" y="0"/>
+          <a:chExt cx="0" cy="0"/>
+        </a:xfrm>
+      </p:grpSpPr>
+      <p:sp>
+        <p:nvSpPr>
+          <p:cNvPr id="2" name="Espace réservé de l'image des diapositives 1"/>
+          <p:cNvSpPr>
+            <a:spLocks noGrp="1" noRot="1" noChangeAspect="1"/>
+          </p:cNvSpPr>
+          <p:nvPr>
+            <p:ph type="sldImg"/>
+          </p:nvPr>
+        </p:nvSpPr>
+        <p:spPr/>
+      </p:sp>
+      <p:sp>
+        <p:nvSpPr>
+          <p:cNvPr id="3" name="Espace réservé des commentaires 2"/>
+          <p:cNvSpPr>
+            <a:spLocks noGrp="1"/>
+          </p:cNvSpPr>
+          <p:nvPr>
+            <p:ph type="body" idx="1"/>
+          </p:nvPr>
+        </p:nvSpPr>
+        <p:spPr/>
+        <p:txBody>
+          <a:bodyPr/>
+          <a:lstStyle/>
+          <a:p>
+            <a:endParaRPr lang="fr-FR"/>
+          </a:p>
+        </p:txBody>
+      </p:sp>
+      <p:sp>
+        <p:nvSpPr>
+          <p:cNvPr id="4" name="Espace réservé du numéro de diapositive 3"/>
+          <p:cNvSpPr>
+            <a:spLocks noGrp="1"/>
+          </p:cNvSpPr>
+          <p:nvPr>
+            <p:ph type="sldNum" sz="quarter" idx="10"/>
+          </p:nvPr>
+        </p:nvSpPr>
+        <p:spPr/>
+        <p:txBody>
+          <a:bodyPr/>
+          <a:lstStyle/>
+          <a:p>
+            <a:fld id="{49964FFC-9B66-4F48-830D-CDE6869DA765}" type="slidenum">
+              <a:rPr lang="fr-FR" smtClean="0"/>
+              <a:t>2</a:t>
+            </a:fld>
+            <a:endParaRPr lang="fr-FR"/>
+          </a:p>
+        </p:txBody>
+      </p:sp>
+    </p:spTree>
+    <p:extLst>
+      <p:ext uri="{BB962C8B-B14F-4D97-AF65-F5344CB8AC3E}">
+        <p14:creationId xmlns:p14="http://schemas.microsoft.com/office/powerpoint/2010/main" val="3934214582"/>
+      </p:ext>
+    </p:extLst>
+  </p:cSld>
+  <p:clrMapOvr>
+    <a:masterClrMapping/>
+  </p:clrMapOvr>
+</p:notes>
+</file>
+
 <file path=ppt/slideLayouts/slideLayout1.xml><?xml version="1.0" encoding="utf-8"?>
 <p:sldLayout xmlns:a="http://schemas.openxmlformats.org/drawingml/2006/main" xmlns:r="http://schemas.openxmlformats.org/officeDocument/2006/relationships" xmlns:p="http://schemas.openxmlformats.org/presentationml/2006/main" type="title" preserve="1">
   <p:cSld name="Diapositive de titre">
@@ -267,7 +703,7 @@
           <a:bodyPr/>
           <a:lstStyle/>
           <a:p>
-            <a:fld id="{64B8460C-1CC4-4866-86BE-B2B92C00360F}" type="datetimeFigureOut">
+            <a:fld id="{A6F29AD2-F1A2-4E74-92F5-24F9B59D7573}" type="datetime1">
               <a:rPr lang="fr-FR" smtClean="0"/>
               <a:t>12/06/2020</a:t>
             </a:fld>
@@ -437,7 +873,7 @@
           <a:bodyPr/>
           <a:lstStyle/>
           <a:p>
-            <a:fld id="{64B8460C-1CC4-4866-86BE-B2B92C00360F}" type="datetimeFigureOut">
+            <a:fld id="{5ED79E74-F135-472D-9DB2-DF9CBB980889}" type="datetime1">
               <a:rPr lang="fr-FR" smtClean="0"/>
               <a:t>12/06/2020</a:t>
             </a:fld>
@@ -617,7 +1053,7 @@
           <a:bodyPr/>
           <a:lstStyle/>
           <a:p>
-            <a:fld id="{64B8460C-1CC4-4866-86BE-B2B92C00360F}" type="datetimeFigureOut">
+            <a:fld id="{C6AC5058-C0DB-48EC-8AB0-832BB3642373}" type="datetime1">
               <a:rPr lang="fr-FR" smtClean="0"/>
               <a:t>12/06/2020</a:t>
             </a:fld>
@@ -787,7 +1223,7 @@
           <a:bodyPr/>
           <a:lstStyle/>
           <a:p>
-            <a:fld id="{64B8460C-1CC4-4866-86BE-B2B92C00360F}" type="datetimeFigureOut">
+            <a:fld id="{76F652B7-3FED-4BAB-9F63-01DE7F9FB2B9}" type="datetime1">
               <a:rPr lang="fr-FR" smtClean="0"/>
               <a:t>12/06/2020</a:t>
             </a:fld>
@@ -1033,7 +1469,7 @@
           <a:bodyPr/>
           <a:lstStyle/>
           <a:p>
-            <a:fld id="{64B8460C-1CC4-4866-86BE-B2B92C00360F}" type="datetimeFigureOut">
+            <a:fld id="{D7EEBBCA-4E0E-41A5-8927-176BBBB26381}" type="datetime1">
               <a:rPr lang="fr-FR" smtClean="0"/>
               <a:t>12/06/2020</a:t>
             </a:fld>
@@ -1265,7 +1701,7 @@
           <a:bodyPr/>
           <a:lstStyle/>
           <a:p>
-            <a:fld id="{64B8460C-1CC4-4866-86BE-B2B92C00360F}" type="datetimeFigureOut">
+            <a:fld id="{2B25F7E9-1BAD-4703-8D58-CE48142E5A5A}" type="datetime1">
               <a:rPr lang="fr-FR" smtClean="0"/>
               <a:t>12/06/2020</a:t>
             </a:fld>
@@ -1632,7 +2068,7 @@
           <a:bodyPr/>
           <a:lstStyle/>
           <a:p>
-            <a:fld id="{64B8460C-1CC4-4866-86BE-B2B92C00360F}" type="datetimeFigureOut">
+            <a:fld id="{316E7241-5728-45F1-8AF7-C3841E4FE797}" type="datetime1">
               <a:rPr lang="fr-FR" smtClean="0"/>
               <a:t>12/06/2020</a:t>
             </a:fld>
@@ -1750,7 +2186,7 @@
           <a:bodyPr/>
           <a:lstStyle/>
           <a:p>
-            <a:fld id="{64B8460C-1CC4-4866-86BE-B2B92C00360F}" type="datetimeFigureOut">
+            <a:fld id="{6894D680-D819-474A-8D7B-CFB7F721C2AD}" type="datetime1">
               <a:rPr lang="fr-FR" smtClean="0"/>
               <a:t>12/06/2020</a:t>
             </a:fld>
@@ -1845,7 +2281,7 @@
           <a:bodyPr/>
           <a:lstStyle/>
           <a:p>
-            <a:fld id="{64B8460C-1CC4-4866-86BE-B2B92C00360F}" type="datetimeFigureOut">
+            <a:fld id="{807E58CE-068E-4EE3-B99A-44087A7E6EFC}" type="datetime1">
               <a:rPr lang="fr-FR" smtClean="0"/>
               <a:t>12/06/2020</a:t>
             </a:fld>
@@ -2122,7 +2558,7 @@
           <a:bodyPr/>
           <a:lstStyle/>
           <a:p>
-            <a:fld id="{64B8460C-1CC4-4866-86BE-B2B92C00360F}" type="datetimeFigureOut">
+            <a:fld id="{D47317FF-4C54-4A8A-A564-9AE950381E3B}" type="datetime1">
               <a:rPr lang="fr-FR" smtClean="0"/>
               <a:t>12/06/2020</a:t>
             </a:fld>
@@ -2375,7 +2811,7 @@
           <a:bodyPr/>
           <a:lstStyle/>
           <a:p>
-            <a:fld id="{64B8460C-1CC4-4866-86BE-B2B92C00360F}" type="datetimeFigureOut">
+            <a:fld id="{89886678-C011-4E2C-A958-44E1DAFC1EA2}" type="datetime1">
               <a:rPr lang="fr-FR" smtClean="0"/>
               <a:t>12/06/2020</a:t>
             </a:fld>
@@ -2588,7 +3024,7 @@
             </a:lvl1pPr>
           </a:lstStyle>
           <a:p>
-            <a:fld id="{64B8460C-1CC4-4866-86BE-B2B92C00360F}" type="datetimeFigureOut">
+            <a:fld id="{BF44C28D-ABFF-4D11-8CAD-94D8A13303CD}" type="datetime1">
               <a:rPr lang="fr-FR" smtClean="0"/>
               <a:t>12/06/2020</a:t>
             </a:fld>
@@ -2695,6 +3131,7 @@
     <p:sldLayoutId id="2147483658" r:id="rId10"/>
     <p:sldLayoutId id="2147483659" r:id="rId11"/>
   </p:sldLayoutIdLst>
+  <p:hf hdr="0" ftr="0" dt="0"/>
   <p:txStyles>
     <p:titleStyle>
       <a:lvl1pPr algn="l" defTabSz="914400" rtl="0" eaLnBrk="1" latinLnBrk="0" hangingPunct="1">
@@ -3093,6 +3530,29 @@
           </a:p>
         </p:txBody>
       </p:sp>
+      <p:sp>
+        <p:nvSpPr>
+          <p:cNvPr id="4" name="Espace réservé du numéro de diapositive 3"/>
+          <p:cNvSpPr>
+            <a:spLocks noGrp="1"/>
+          </p:cNvSpPr>
+          <p:nvPr>
+            <p:ph type="sldNum" sz="quarter" idx="12"/>
+          </p:nvPr>
+        </p:nvSpPr>
+        <p:spPr/>
+        <p:txBody>
+          <a:bodyPr/>
+          <a:lstStyle/>
+          <a:p>
+            <a:fld id="{E4F67F9A-838C-4734-8EB0-754A37D9A5A7}" type="slidenum">
+              <a:rPr lang="fr-FR" smtClean="0"/>
+              <a:t>1</a:t>
+            </a:fld>
+            <a:endParaRPr lang="fr-FR"/>
+          </a:p>
+        </p:txBody>
+      </p:sp>
     </p:spTree>
     <p:extLst>
       <p:ext uri="{BB962C8B-B14F-4D97-AF65-F5344CB8AC3E}">
@@ -3103,6 +3563,13 @@
   <p:clrMapOvr>
     <a:masterClrMapping/>
   </p:clrMapOvr>
+  <p:timing>
+    <p:tnLst>
+      <p:par>
+        <p:cTn id="1" dur="indefinite" restart="never" nodeType="tmRoot"/>
+      </p:par>
+    </p:tnLst>
+  </p:timing>
 </p:sld>
 </file>
 
@@ -3123,6 +3590,67 @@
           <a:chExt cx="0" cy="0"/>
         </a:xfrm>
       </p:grpSpPr>
+      <p:sp>
+        <p:nvSpPr>
+          <p:cNvPr id="2" name="Espace réservé du numéro de diapositive 1"/>
+          <p:cNvSpPr>
+            <a:spLocks noGrp="1"/>
+          </p:cNvSpPr>
+          <p:nvPr>
+            <p:ph type="sldNum" sz="quarter" idx="12"/>
+          </p:nvPr>
+        </p:nvSpPr>
+        <p:spPr/>
+        <p:txBody>
+          <a:bodyPr/>
+          <a:lstStyle/>
+          <a:p>
+            <a:fld id="{E4F67F9A-838C-4734-8EB0-754A37D9A5A7}" type="slidenum">
+              <a:rPr lang="fr-FR" smtClean="0"/>
+              <a:t>10</a:t>
+            </a:fld>
+            <a:endParaRPr lang="fr-FR"/>
+          </a:p>
+        </p:txBody>
+      </p:sp>
+      <p:sp>
+        <p:nvSpPr>
+          <p:cNvPr id="3" name="ZoneTexte 2"/>
+          <p:cNvSpPr txBox="1"/>
+          <p:nvPr/>
+        </p:nvSpPr>
+        <p:spPr>
+          <a:xfrm>
+            <a:off x="-1" y="0"/>
+            <a:ext cx="1532467" cy="307777"/>
+          </a:xfrm>
+          <a:prstGeom prst="rect">
+            <a:avLst/>
+          </a:prstGeom>
+          <a:noFill/>
+        </p:spPr>
+        <p:txBody>
+          <a:bodyPr wrap="square" rtlCol="0">
+            <a:spAutoFit/>
+          </a:bodyPr>
+          <a:lstStyle/>
+          <a:p>
+            <a:r>
+              <a:rPr lang="fr-FR" sz="1400" dirty="0" smtClean="0">
+                <a:solidFill>
+                  <a:srgbClr val="FF0000"/>
+                </a:solidFill>
+              </a:rPr>
+              <a:t>Développement 2</a:t>
+            </a:r>
+            <a:endParaRPr lang="fr-FR" sz="1400" dirty="0">
+              <a:solidFill>
+                <a:srgbClr val="FF0000"/>
+              </a:solidFill>
+            </a:endParaRPr>
+          </a:p>
+        </p:txBody>
+      </p:sp>
     </p:spTree>
     <p:extLst>
       <p:ext uri="{BB962C8B-B14F-4D97-AF65-F5344CB8AC3E}">
@@ -3133,6 +3661,13 @@
   <p:clrMapOvr>
     <a:masterClrMapping/>
   </p:clrMapOvr>
+  <p:timing>
+    <p:tnLst>
+      <p:par>
+        <p:cTn id="1" dur="indefinite" restart="never" nodeType="tmRoot"/>
+      </p:par>
+    </p:tnLst>
+  </p:timing>
 </p:sld>
 </file>
 
@@ -3153,6 +3688,67 @@
           <a:chExt cx="0" cy="0"/>
         </a:xfrm>
       </p:grpSpPr>
+      <p:sp>
+        <p:nvSpPr>
+          <p:cNvPr id="2" name="Espace réservé du numéro de diapositive 1"/>
+          <p:cNvSpPr>
+            <a:spLocks noGrp="1"/>
+          </p:cNvSpPr>
+          <p:nvPr>
+            <p:ph type="sldNum" sz="quarter" idx="12"/>
+          </p:nvPr>
+        </p:nvSpPr>
+        <p:spPr/>
+        <p:txBody>
+          <a:bodyPr/>
+          <a:lstStyle/>
+          <a:p>
+            <a:fld id="{E4F67F9A-838C-4734-8EB0-754A37D9A5A7}" type="slidenum">
+              <a:rPr lang="fr-FR" smtClean="0"/>
+              <a:t>11</a:t>
+            </a:fld>
+            <a:endParaRPr lang="fr-FR"/>
+          </a:p>
+        </p:txBody>
+      </p:sp>
+      <p:sp>
+        <p:nvSpPr>
+          <p:cNvPr id="3" name="ZoneTexte 2"/>
+          <p:cNvSpPr txBox="1"/>
+          <p:nvPr/>
+        </p:nvSpPr>
+        <p:spPr>
+          <a:xfrm>
+            <a:off x="-1" y="0"/>
+            <a:ext cx="1532467" cy="307777"/>
+          </a:xfrm>
+          <a:prstGeom prst="rect">
+            <a:avLst/>
+          </a:prstGeom>
+          <a:noFill/>
+        </p:spPr>
+        <p:txBody>
+          <a:bodyPr wrap="square" rtlCol="0">
+            <a:spAutoFit/>
+          </a:bodyPr>
+          <a:lstStyle/>
+          <a:p>
+            <a:r>
+              <a:rPr lang="fr-FR" sz="1400" dirty="0" smtClean="0">
+                <a:solidFill>
+                  <a:srgbClr val="FF0000"/>
+                </a:solidFill>
+              </a:rPr>
+              <a:t>Développement 3</a:t>
+            </a:r>
+            <a:endParaRPr lang="fr-FR" sz="1400" dirty="0">
+              <a:solidFill>
+                <a:srgbClr val="FF0000"/>
+              </a:solidFill>
+            </a:endParaRPr>
+          </a:p>
+        </p:txBody>
+      </p:sp>
     </p:spTree>
     <p:extLst>
       <p:ext uri="{BB962C8B-B14F-4D97-AF65-F5344CB8AC3E}">
@@ -3163,6 +3759,13 @@
   <p:clrMapOvr>
     <a:masterClrMapping/>
   </p:clrMapOvr>
+  <p:timing>
+    <p:tnLst>
+      <p:par>
+        <p:cTn id="1" dur="indefinite" restart="never" nodeType="tmRoot"/>
+      </p:par>
+    </p:tnLst>
+  </p:timing>
 </p:sld>
 </file>
 
@@ -3183,6 +3786,67 @@
           <a:chExt cx="0" cy="0"/>
         </a:xfrm>
       </p:grpSpPr>
+      <p:sp>
+        <p:nvSpPr>
+          <p:cNvPr id="2" name="Espace réservé du numéro de diapositive 1"/>
+          <p:cNvSpPr>
+            <a:spLocks noGrp="1"/>
+          </p:cNvSpPr>
+          <p:nvPr>
+            <p:ph type="sldNum" sz="quarter" idx="12"/>
+          </p:nvPr>
+        </p:nvSpPr>
+        <p:spPr/>
+        <p:txBody>
+          <a:bodyPr/>
+          <a:lstStyle/>
+          <a:p>
+            <a:fld id="{E4F67F9A-838C-4734-8EB0-754A37D9A5A7}" type="slidenum">
+              <a:rPr lang="fr-FR" smtClean="0"/>
+              <a:t>12</a:t>
+            </a:fld>
+            <a:endParaRPr lang="fr-FR"/>
+          </a:p>
+        </p:txBody>
+      </p:sp>
+      <p:sp>
+        <p:nvSpPr>
+          <p:cNvPr id="3" name="ZoneTexte 2"/>
+          <p:cNvSpPr txBox="1"/>
+          <p:nvPr/>
+        </p:nvSpPr>
+        <p:spPr>
+          <a:xfrm>
+            <a:off x="-1" y="0"/>
+            <a:ext cx="1532467" cy="307777"/>
+          </a:xfrm>
+          <a:prstGeom prst="rect">
+            <a:avLst/>
+          </a:prstGeom>
+          <a:noFill/>
+        </p:spPr>
+        <p:txBody>
+          <a:bodyPr wrap="square" rtlCol="0">
+            <a:spAutoFit/>
+          </a:bodyPr>
+          <a:lstStyle/>
+          <a:p>
+            <a:r>
+              <a:rPr lang="fr-FR" sz="1400" dirty="0" smtClean="0">
+                <a:solidFill>
+                  <a:srgbClr val="FF0000"/>
+                </a:solidFill>
+              </a:rPr>
+              <a:t>Développement 4</a:t>
+            </a:r>
+            <a:endParaRPr lang="fr-FR" sz="1400" dirty="0">
+              <a:solidFill>
+                <a:srgbClr val="FF0000"/>
+              </a:solidFill>
+            </a:endParaRPr>
+          </a:p>
+        </p:txBody>
+      </p:sp>
     </p:spTree>
     <p:extLst>
       <p:ext uri="{BB962C8B-B14F-4D97-AF65-F5344CB8AC3E}">
@@ -3193,6 +3857,13 @@
   <p:clrMapOvr>
     <a:masterClrMapping/>
   </p:clrMapOvr>
+  <p:timing>
+    <p:tnLst>
+      <p:par>
+        <p:cTn id="1" dur="indefinite" restart="never" nodeType="tmRoot"/>
+      </p:par>
+    </p:tnLst>
+  </p:timing>
 </p:sld>
 </file>
 
@@ -3213,6 +3884,67 @@
           <a:chExt cx="0" cy="0"/>
         </a:xfrm>
       </p:grpSpPr>
+      <p:sp>
+        <p:nvSpPr>
+          <p:cNvPr id="2" name="Espace réservé du numéro de diapositive 1"/>
+          <p:cNvSpPr>
+            <a:spLocks noGrp="1"/>
+          </p:cNvSpPr>
+          <p:nvPr>
+            <p:ph type="sldNum" sz="quarter" idx="12"/>
+          </p:nvPr>
+        </p:nvSpPr>
+        <p:spPr/>
+        <p:txBody>
+          <a:bodyPr/>
+          <a:lstStyle/>
+          <a:p>
+            <a:fld id="{E4F67F9A-838C-4734-8EB0-754A37D9A5A7}" type="slidenum">
+              <a:rPr lang="fr-FR" smtClean="0"/>
+              <a:t>13</a:t>
+            </a:fld>
+            <a:endParaRPr lang="fr-FR"/>
+          </a:p>
+        </p:txBody>
+      </p:sp>
+      <p:sp>
+        <p:nvSpPr>
+          <p:cNvPr id="3" name="ZoneTexte 2"/>
+          <p:cNvSpPr txBox="1"/>
+          <p:nvPr/>
+        </p:nvSpPr>
+        <p:spPr>
+          <a:xfrm>
+            <a:off x="-1" y="0"/>
+            <a:ext cx="1532467" cy="307777"/>
+          </a:xfrm>
+          <a:prstGeom prst="rect">
+            <a:avLst/>
+          </a:prstGeom>
+          <a:noFill/>
+        </p:spPr>
+        <p:txBody>
+          <a:bodyPr wrap="square" rtlCol="0">
+            <a:spAutoFit/>
+          </a:bodyPr>
+          <a:lstStyle/>
+          <a:p>
+            <a:r>
+              <a:rPr lang="fr-FR" sz="1400" dirty="0" smtClean="0">
+                <a:solidFill>
+                  <a:srgbClr val="FF0000"/>
+                </a:solidFill>
+              </a:rPr>
+              <a:t>Développement 5</a:t>
+            </a:r>
+            <a:endParaRPr lang="fr-FR" sz="1400" dirty="0">
+              <a:solidFill>
+                <a:srgbClr val="FF0000"/>
+              </a:solidFill>
+            </a:endParaRPr>
+          </a:p>
+        </p:txBody>
+      </p:sp>
     </p:spTree>
     <p:extLst>
       <p:ext uri="{BB962C8B-B14F-4D97-AF65-F5344CB8AC3E}">
@@ -3223,6 +3955,13 @@
   <p:clrMapOvr>
     <a:masterClrMapping/>
   </p:clrMapOvr>
+  <p:timing>
+    <p:tnLst>
+      <p:par>
+        <p:cTn id="1" dur="indefinite" restart="never" nodeType="tmRoot"/>
+      </p:par>
+    </p:tnLst>
+  </p:timing>
 </p:sld>
 </file>
 
@@ -3243,6 +3982,67 @@
           <a:chExt cx="0" cy="0"/>
         </a:xfrm>
       </p:grpSpPr>
+      <p:sp>
+        <p:nvSpPr>
+          <p:cNvPr id="2" name="Espace réservé du numéro de diapositive 1"/>
+          <p:cNvSpPr>
+            <a:spLocks noGrp="1"/>
+          </p:cNvSpPr>
+          <p:nvPr>
+            <p:ph type="sldNum" sz="quarter" idx="12"/>
+          </p:nvPr>
+        </p:nvSpPr>
+        <p:spPr/>
+        <p:txBody>
+          <a:bodyPr/>
+          <a:lstStyle/>
+          <a:p>
+            <a:fld id="{E4F67F9A-838C-4734-8EB0-754A37D9A5A7}" type="slidenum">
+              <a:rPr lang="fr-FR" smtClean="0"/>
+              <a:t>14</a:t>
+            </a:fld>
+            <a:endParaRPr lang="fr-FR"/>
+          </a:p>
+        </p:txBody>
+      </p:sp>
+      <p:sp>
+        <p:nvSpPr>
+          <p:cNvPr id="3" name="ZoneTexte 2"/>
+          <p:cNvSpPr txBox="1"/>
+          <p:nvPr/>
+        </p:nvSpPr>
+        <p:spPr>
+          <a:xfrm>
+            <a:off x="-1" y="0"/>
+            <a:ext cx="1532467" cy="307777"/>
+          </a:xfrm>
+          <a:prstGeom prst="rect">
+            <a:avLst/>
+          </a:prstGeom>
+          <a:noFill/>
+        </p:spPr>
+        <p:txBody>
+          <a:bodyPr wrap="square" rtlCol="0">
+            <a:spAutoFit/>
+          </a:bodyPr>
+          <a:lstStyle/>
+          <a:p>
+            <a:r>
+              <a:rPr lang="fr-FR" sz="1400" dirty="0" smtClean="0">
+                <a:solidFill>
+                  <a:srgbClr val="FF0000"/>
+                </a:solidFill>
+              </a:rPr>
+              <a:t>Conclusion</a:t>
+            </a:r>
+            <a:endParaRPr lang="fr-FR" sz="1400" dirty="0">
+              <a:solidFill>
+                <a:srgbClr val="FF0000"/>
+              </a:solidFill>
+            </a:endParaRPr>
+          </a:p>
+        </p:txBody>
+      </p:sp>
     </p:spTree>
     <p:extLst>
       <p:ext uri="{BB962C8B-B14F-4D97-AF65-F5344CB8AC3E}">
@@ -3253,6 +4053,13 @@
   <p:clrMapOvr>
     <a:masterClrMapping/>
   </p:clrMapOvr>
+  <p:timing>
+    <p:tnLst>
+      <p:par>
+        <p:cTn id="1" dur="indefinite" restart="never" nodeType="tmRoot"/>
+      </p:par>
+    </p:tnLst>
+  </p:timing>
 </p:sld>
 </file>
 
@@ -3273,6 +4080,67 @@
           <a:chExt cx="0" cy="0"/>
         </a:xfrm>
       </p:grpSpPr>
+      <p:sp>
+        <p:nvSpPr>
+          <p:cNvPr id="2" name="Espace réservé du numéro de diapositive 1"/>
+          <p:cNvSpPr>
+            <a:spLocks noGrp="1"/>
+          </p:cNvSpPr>
+          <p:nvPr>
+            <p:ph type="sldNum" sz="quarter" idx="12"/>
+          </p:nvPr>
+        </p:nvSpPr>
+        <p:spPr/>
+        <p:txBody>
+          <a:bodyPr/>
+          <a:lstStyle/>
+          <a:p>
+            <a:fld id="{E4F67F9A-838C-4734-8EB0-754A37D9A5A7}" type="slidenum">
+              <a:rPr lang="fr-FR" smtClean="0"/>
+              <a:t>15</a:t>
+            </a:fld>
+            <a:endParaRPr lang="fr-FR"/>
+          </a:p>
+        </p:txBody>
+      </p:sp>
+      <p:sp>
+        <p:nvSpPr>
+          <p:cNvPr id="3" name="ZoneTexte 2"/>
+          <p:cNvSpPr txBox="1"/>
+          <p:nvPr/>
+        </p:nvSpPr>
+        <p:spPr>
+          <a:xfrm>
+            <a:off x="-1" y="0"/>
+            <a:ext cx="1532467" cy="307777"/>
+          </a:xfrm>
+          <a:prstGeom prst="rect">
+            <a:avLst/>
+          </a:prstGeom>
+          <a:noFill/>
+        </p:spPr>
+        <p:txBody>
+          <a:bodyPr wrap="square" rtlCol="0">
+            <a:spAutoFit/>
+          </a:bodyPr>
+          <a:lstStyle/>
+          <a:p>
+            <a:r>
+              <a:rPr lang="fr-FR" sz="1400" dirty="0" smtClean="0">
+                <a:solidFill>
+                  <a:srgbClr val="FF0000"/>
+                </a:solidFill>
+              </a:rPr>
+              <a:t>Merci</a:t>
+            </a:r>
+            <a:endParaRPr lang="fr-FR" sz="1400" dirty="0">
+              <a:solidFill>
+                <a:srgbClr val="FF0000"/>
+              </a:solidFill>
+            </a:endParaRPr>
+          </a:p>
+        </p:txBody>
+      </p:sp>
     </p:spTree>
     <p:extLst>
       <p:ext uri="{BB962C8B-B14F-4D97-AF65-F5344CB8AC3E}">
@@ -3283,36 +4151,13 @@
   <p:clrMapOvr>
     <a:masterClrMapping/>
   </p:clrMapOvr>
-</p:sld>
-</file>
-
-<file path=ppt/slides/slide16.xml><?xml version="1.0" encoding="utf-8"?>
-<p:sld xmlns:a="http://schemas.openxmlformats.org/drawingml/2006/main" xmlns:r="http://schemas.openxmlformats.org/officeDocument/2006/relationships" xmlns:p="http://schemas.openxmlformats.org/presentationml/2006/main">
-  <p:cSld>
-    <p:spTree>
-      <p:nvGrpSpPr>
-        <p:cNvPr id="1" name=""/>
-        <p:cNvGrpSpPr/>
-        <p:nvPr/>
-      </p:nvGrpSpPr>
-      <p:grpSpPr>
-        <a:xfrm>
-          <a:off x="0" y="0"/>
-          <a:ext cx="0" cy="0"/>
-          <a:chOff x="0" y="0"/>
-          <a:chExt cx="0" cy="0"/>
-        </a:xfrm>
-      </p:grpSpPr>
-    </p:spTree>
-    <p:extLst>
-      <p:ext uri="{BB962C8B-B14F-4D97-AF65-F5344CB8AC3E}">
-        <p14:creationId xmlns:p14="http://schemas.microsoft.com/office/powerpoint/2010/main" val="4053293182"/>
-      </p:ext>
-    </p:extLst>
-  </p:cSld>
-  <p:clrMapOvr>
-    <a:masterClrMapping/>
-  </p:clrMapOvr>
+  <p:timing>
+    <p:tnLst>
+      <p:par>
+        <p:cTn id="1" dur="indefinite" restart="never" nodeType="tmRoot"/>
+      </p:par>
+    </p:tnLst>
+  </p:timing>
 </p:sld>
 </file>
 
@@ -3333,6 +4178,67 @@
           <a:chExt cx="0" cy="0"/>
         </a:xfrm>
       </p:grpSpPr>
+      <p:sp>
+        <p:nvSpPr>
+          <p:cNvPr id="2" name="ZoneTexte 1"/>
+          <p:cNvSpPr txBox="1"/>
+          <p:nvPr/>
+        </p:nvSpPr>
+        <p:spPr>
+          <a:xfrm>
+            <a:off x="0" y="0"/>
+            <a:ext cx="2413000" cy="313267"/>
+          </a:xfrm>
+          <a:prstGeom prst="rect">
+            <a:avLst/>
+          </a:prstGeom>
+          <a:noFill/>
+        </p:spPr>
+        <p:txBody>
+          <a:bodyPr wrap="square" rtlCol="0">
+            <a:spAutoFit/>
+          </a:bodyPr>
+          <a:lstStyle/>
+          <a:p>
+            <a:r>
+              <a:rPr lang="fr-FR" sz="1400" dirty="0" smtClean="0">
+                <a:solidFill>
+                  <a:srgbClr val="FF0000"/>
+                </a:solidFill>
+              </a:rPr>
+              <a:t>Contexte technologique 1</a:t>
+            </a:r>
+            <a:endParaRPr lang="fr-FR" sz="1400" dirty="0">
+              <a:solidFill>
+                <a:srgbClr val="FF0000"/>
+              </a:solidFill>
+            </a:endParaRPr>
+          </a:p>
+        </p:txBody>
+      </p:sp>
+      <p:sp>
+        <p:nvSpPr>
+          <p:cNvPr id="3" name="Espace réservé du numéro de diapositive 2"/>
+          <p:cNvSpPr>
+            <a:spLocks noGrp="1"/>
+          </p:cNvSpPr>
+          <p:nvPr>
+            <p:ph type="sldNum" sz="quarter" idx="12"/>
+          </p:nvPr>
+        </p:nvSpPr>
+        <p:spPr/>
+        <p:txBody>
+          <a:bodyPr/>
+          <a:lstStyle/>
+          <a:p>
+            <a:fld id="{E4F67F9A-838C-4734-8EB0-754A37D9A5A7}" type="slidenum">
+              <a:rPr lang="fr-FR" smtClean="0"/>
+              <a:t>2</a:t>
+            </a:fld>
+            <a:endParaRPr lang="fr-FR" dirty="0"/>
+          </a:p>
+        </p:txBody>
+      </p:sp>
     </p:spTree>
     <p:extLst>
       <p:ext uri="{BB962C8B-B14F-4D97-AF65-F5344CB8AC3E}">
@@ -3343,6 +4249,13 @@
   <p:clrMapOvr>
     <a:masterClrMapping/>
   </p:clrMapOvr>
+  <p:timing>
+    <p:tnLst>
+      <p:par>
+        <p:cTn id="1" dur="indefinite" restart="never" nodeType="tmRoot"/>
+      </p:par>
+    </p:tnLst>
+  </p:timing>
 </p:sld>
 </file>
 
@@ -3363,6 +4276,67 @@
           <a:chExt cx="0" cy="0"/>
         </a:xfrm>
       </p:grpSpPr>
+      <p:sp>
+        <p:nvSpPr>
+          <p:cNvPr id="2" name="Espace réservé du numéro de diapositive 1"/>
+          <p:cNvSpPr>
+            <a:spLocks noGrp="1"/>
+          </p:cNvSpPr>
+          <p:nvPr>
+            <p:ph type="sldNum" sz="quarter" idx="12"/>
+          </p:nvPr>
+        </p:nvSpPr>
+        <p:spPr/>
+        <p:txBody>
+          <a:bodyPr/>
+          <a:lstStyle/>
+          <a:p>
+            <a:fld id="{E4F67F9A-838C-4734-8EB0-754A37D9A5A7}" type="slidenum">
+              <a:rPr lang="fr-FR" smtClean="0"/>
+              <a:t>3</a:t>
+            </a:fld>
+            <a:endParaRPr lang="fr-FR"/>
+          </a:p>
+        </p:txBody>
+      </p:sp>
+      <p:sp>
+        <p:nvSpPr>
+          <p:cNvPr id="3" name="ZoneTexte 2"/>
+          <p:cNvSpPr txBox="1"/>
+          <p:nvPr/>
+        </p:nvSpPr>
+        <p:spPr>
+          <a:xfrm>
+            <a:off x="0" y="0"/>
+            <a:ext cx="2413000" cy="313267"/>
+          </a:xfrm>
+          <a:prstGeom prst="rect">
+            <a:avLst/>
+          </a:prstGeom>
+          <a:noFill/>
+        </p:spPr>
+        <p:txBody>
+          <a:bodyPr wrap="square" rtlCol="0">
+            <a:spAutoFit/>
+          </a:bodyPr>
+          <a:lstStyle/>
+          <a:p>
+            <a:r>
+              <a:rPr lang="fr-FR" sz="1400" dirty="0" smtClean="0">
+                <a:solidFill>
+                  <a:srgbClr val="FF0000"/>
+                </a:solidFill>
+              </a:rPr>
+              <a:t>Contexte technologique 2</a:t>
+            </a:r>
+            <a:endParaRPr lang="fr-FR" sz="1400" dirty="0">
+              <a:solidFill>
+                <a:srgbClr val="FF0000"/>
+              </a:solidFill>
+            </a:endParaRPr>
+          </a:p>
+        </p:txBody>
+      </p:sp>
     </p:spTree>
     <p:extLst>
       <p:ext uri="{BB962C8B-B14F-4D97-AF65-F5344CB8AC3E}">
@@ -3373,6 +4347,13 @@
   <p:clrMapOvr>
     <a:masterClrMapping/>
   </p:clrMapOvr>
+  <p:timing>
+    <p:tnLst>
+      <p:par>
+        <p:cTn id="1" dur="indefinite" restart="never" nodeType="tmRoot"/>
+      </p:par>
+    </p:tnLst>
+  </p:timing>
 </p:sld>
 </file>
 
@@ -3393,6 +4374,67 @@
           <a:chExt cx="0" cy="0"/>
         </a:xfrm>
       </p:grpSpPr>
+      <p:sp>
+        <p:nvSpPr>
+          <p:cNvPr id="2" name="Espace réservé du numéro de diapositive 1"/>
+          <p:cNvSpPr>
+            <a:spLocks noGrp="1"/>
+          </p:cNvSpPr>
+          <p:nvPr>
+            <p:ph type="sldNum" sz="quarter" idx="12"/>
+          </p:nvPr>
+        </p:nvSpPr>
+        <p:spPr/>
+        <p:txBody>
+          <a:bodyPr/>
+          <a:lstStyle/>
+          <a:p>
+            <a:fld id="{E4F67F9A-838C-4734-8EB0-754A37D9A5A7}" type="slidenum">
+              <a:rPr lang="fr-FR" smtClean="0"/>
+              <a:t>4</a:t>
+            </a:fld>
+            <a:endParaRPr lang="fr-FR"/>
+          </a:p>
+        </p:txBody>
+      </p:sp>
+      <p:sp>
+        <p:nvSpPr>
+          <p:cNvPr id="3" name="ZoneTexte 2"/>
+          <p:cNvSpPr txBox="1"/>
+          <p:nvPr/>
+        </p:nvSpPr>
+        <p:spPr>
+          <a:xfrm>
+            <a:off x="0" y="0"/>
+            <a:ext cx="2413000" cy="313267"/>
+          </a:xfrm>
+          <a:prstGeom prst="rect">
+            <a:avLst/>
+          </a:prstGeom>
+          <a:noFill/>
+        </p:spPr>
+        <p:txBody>
+          <a:bodyPr wrap="square" rtlCol="0">
+            <a:spAutoFit/>
+          </a:bodyPr>
+          <a:lstStyle/>
+          <a:p>
+            <a:r>
+              <a:rPr lang="fr-FR" sz="1400" dirty="0" smtClean="0">
+                <a:solidFill>
+                  <a:srgbClr val="FF0000"/>
+                </a:solidFill>
+              </a:rPr>
+              <a:t>Contexte technologique 3</a:t>
+            </a:r>
+            <a:endParaRPr lang="fr-FR" sz="1400" dirty="0">
+              <a:solidFill>
+                <a:srgbClr val="FF0000"/>
+              </a:solidFill>
+            </a:endParaRPr>
+          </a:p>
+        </p:txBody>
+      </p:sp>
     </p:spTree>
     <p:extLst>
       <p:ext uri="{BB962C8B-B14F-4D97-AF65-F5344CB8AC3E}">
@@ -3403,6 +4445,13 @@
   <p:clrMapOvr>
     <a:masterClrMapping/>
   </p:clrMapOvr>
+  <p:timing>
+    <p:tnLst>
+      <p:par>
+        <p:cTn id="1" dur="indefinite" restart="never" nodeType="tmRoot"/>
+      </p:par>
+    </p:tnLst>
+  </p:timing>
 </p:sld>
 </file>
 
@@ -3423,6 +4472,67 @@
           <a:chExt cx="0" cy="0"/>
         </a:xfrm>
       </p:grpSpPr>
+      <p:sp>
+        <p:nvSpPr>
+          <p:cNvPr id="2" name="Espace réservé du numéro de diapositive 1"/>
+          <p:cNvSpPr>
+            <a:spLocks noGrp="1"/>
+          </p:cNvSpPr>
+          <p:nvPr>
+            <p:ph type="sldNum" sz="quarter" idx="12"/>
+          </p:nvPr>
+        </p:nvSpPr>
+        <p:spPr/>
+        <p:txBody>
+          <a:bodyPr/>
+          <a:lstStyle/>
+          <a:p>
+            <a:fld id="{E4F67F9A-838C-4734-8EB0-754A37D9A5A7}" type="slidenum">
+              <a:rPr lang="fr-FR" smtClean="0"/>
+              <a:t>5</a:t>
+            </a:fld>
+            <a:endParaRPr lang="fr-FR"/>
+          </a:p>
+        </p:txBody>
+      </p:sp>
+      <p:sp>
+        <p:nvSpPr>
+          <p:cNvPr id="3" name="ZoneTexte 2"/>
+          <p:cNvSpPr txBox="1"/>
+          <p:nvPr/>
+        </p:nvSpPr>
+        <p:spPr>
+          <a:xfrm>
+            <a:off x="0" y="0"/>
+            <a:ext cx="1710267" cy="313267"/>
+          </a:xfrm>
+          <a:prstGeom prst="rect">
+            <a:avLst/>
+          </a:prstGeom>
+          <a:noFill/>
+        </p:spPr>
+        <p:txBody>
+          <a:bodyPr wrap="square" rtlCol="0">
+            <a:spAutoFit/>
+          </a:bodyPr>
+          <a:lstStyle/>
+          <a:p>
+            <a:r>
+              <a:rPr lang="fr-FR" sz="1400" dirty="0" smtClean="0">
+                <a:solidFill>
+                  <a:srgbClr val="FF0000"/>
+                </a:solidFill>
+              </a:rPr>
+              <a:t>Cahier des charges 1</a:t>
+            </a:r>
+            <a:endParaRPr lang="fr-FR" sz="1400" dirty="0">
+              <a:solidFill>
+                <a:srgbClr val="FF0000"/>
+              </a:solidFill>
+            </a:endParaRPr>
+          </a:p>
+        </p:txBody>
+      </p:sp>
     </p:spTree>
     <p:extLst>
       <p:ext uri="{BB962C8B-B14F-4D97-AF65-F5344CB8AC3E}">
@@ -3433,6 +4543,13 @@
   <p:clrMapOvr>
     <a:masterClrMapping/>
   </p:clrMapOvr>
+  <p:timing>
+    <p:tnLst>
+      <p:par>
+        <p:cTn id="1" dur="indefinite" restart="never" nodeType="tmRoot"/>
+      </p:par>
+    </p:tnLst>
+  </p:timing>
 </p:sld>
 </file>
 
@@ -3453,6 +4570,67 @@
           <a:chExt cx="0" cy="0"/>
         </a:xfrm>
       </p:grpSpPr>
+      <p:sp>
+        <p:nvSpPr>
+          <p:cNvPr id="2" name="Espace réservé du numéro de diapositive 1"/>
+          <p:cNvSpPr>
+            <a:spLocks noGrp="1"/>
+          </p:cNvSpPr>
+          <p:nvPr>
+            <p:ph type="sldNum" sz="quarter" idx="12"/>
+          </p:nvPr>
+        </p:nvSpPr>
+        <p:spPr/>
+        <p:txBody>
+          <a:bodyPr/>
+          <a:lstStyle/>
+          <a:p>
+            <a:fld id="{E4F67F9A-838C-4734-8EB0-754A37D9A5A7}" type="slidenum">
+              <a:rPr lang="fr-FR" smtClean="0"/>
+              <a:t>6</a:t>
+            </a:fld>
+            <a:endParaRPr lang="fr-FR"/>
+          </a:p>
+        </p:txBody>
+      </p:sp>
+      <p:sp>
+        <p:nvSpPr>
+          <p:cNvPr id="3" name="ZoneTexte 2"/>
+          <p:cNvSpPr txBox="1"/>
+          <p:nvPr/>
+        </p:nvSpPr>
+        <p:spPr>
+          <a:xfrm>
+            <a:off x="0" y="0"/>
+            <a:ext cx="939800" cy="307777"/>
+          </a:xfrm>
+          <a:prstGeom prst="rect">
+            <a:avLst/>
+          </a:prstGeom>
+          <a:noFill/>
+        </p:spPr>
+        <p:txBody>
+          <a:bodyPr wrap="square" rtlCol="0">
+            <a:spAutoFit/>
+          </a:bodyPr>
+          <a:lstStyle/>
+          <a:p>
+            <a:r>
+              <a:rPr lang="fr-FR" sz="1400" dirty="0" smtClean="0">
+                <a:solidFill>
+                  <a:srgbClr val="FF0000"/>
+                </a:solidFill>
+              </a:rPr>
+              <a:t>Analyse 1</a:t>
+            </a:r>
+            <a:endParaRPr lang="fr-FR" sz="1400" dirty="0">
+              <a:solidFill>
+                <a:srgbClr val="FF0000"/>
+              </a:solidFill>
+            </a:endParaRPr>
+          </a:p>
+        </p:txBody>
+      </p:sp>
     </p:spTree>
     <p:extLst>
       <p:ext uri="{BB962C8B-B14F-4D97-AF65-F5344CB8AC3E}">
@@ -3463,6 +4641,13 @@
   <p:clrMapOvr>
     <a:masterClrMapping/>
   </p:clrMapOvr>
+  <p:timing>
+    <p:tnLst>
+      <p:par>
+        <p:cTn id="1" dur="indefinite" restart="never" nodeType="tmRoot"/>
+      </p:par>
+    </p:tnLst>
+  </p:timing>
 </p:sld>
 </file>
 
@@ -3483,6 +4668,67 @@
           <a:chExt cx="0" cy="0"/>
         </a:xfrm>
       </p:grpSpPr>
+      <p:sp>
+        <p:nvSpPr>
+          <p:cNvPr id="2" name="Espace réservé du numéro de diapositive 1"/>
+          <p:cNvSpPr>
+            <a:spLocks noGrp="1"/>
+          </p:cNvSpPr>
+          <p:nvPr>
+            <p:ph type="sldNum" sz="quarter" idx="12"/>
+          </p:nvPr>
+        </p:nvSpPr>
+        <p:spPr/>
+        <p:txBody>
+          <a:bodyPr/>
+          <a:lstStyle/>
+          <a:p>
+            <a:fld id="{E4F67F9A-838C-4734-8EB0-754A37D9A5A7}" type="slidenum">
+              <a:rPr lang="fr-FR" smtClean="0"/>
+              <a:t>7</a:t>
+            </a:fld>
+            <a:endParaRPr lang="fr-FR"/>
+          </a:p>
+        </p:txBody>
+      </p:sp>
+      <p:sp>
+        <p:nvSpPr>
+          <p:cNvPr id="3" name="ZoneTexte 2"/>
+          <p:cNvSpPr txBox="1"/>
+          <p:nvPr/>
+        </p:nvSpPr>
+        <p:spPr>
+          <a:xfrm>
+            <a:off x="0" y="0"/>
+            <a:ext cx="939800" cy="307777"/>
+          </a:xfrm>
+          <a:prstGeom prst="rect">
+            <a:avLst/>
+          </a:prstGeom>
+          <a:noFill/>
+        </p:spPr>
+        <p:txBody>
+          <a:bodyPr wrap="square" rtlCol="0">
+            <a:spAutoFit/>
+          </a:bodyPr>
+          <a:lstStyle/>
+          <a:p>
+            <a:r>
+              <a:rPr lang="fr-FR" sz="1400" dirty="0" smtClean="0">
+                <a:solidFill>
+                  <a:srgbClr val="FF0000"/>
+                </a:solidFill>
+              </a:rPr>
+              <a:t>Analyse 2</a:t>
+            </a:r>
+            <a:endParaRPr lang="fr-FR" sz="1400" dirty="0">
+              <a:solidFill>
+                <a:srgbClr val="FF0000"/>
+              </a:solidFill>
+            </a:endParaRPr>
+          </a:p>
+        </p:txBody>
+      </p:sp>
     </p:spTree>
     <p:extLst>
       <p:ext uri="{BB962C8B-B14F-4D97-AF65-F5344CB8AC3E}">
@@ -3493,6 +4739,13 @@
   <p:clrMapOvr>
     <a:masterClrMapping/>
   </p:clrMapOvr>
+  <p:timing>
+    <p:tnLst>
+      <p:par>
+        <p:cTn id="1" dur="indefinite" restart="never" nodeType="tmRoot"/>
+      </p:par>
+    </p:tnLst>
+  </p:timing>
 </p:sld>
 </file>
 
@@ -3513,6 +4766,67 @@
           <a:chExt cx="0" cy="0"/>
         </a:xfrm>
       </p:grpSpPr>
+      <p:sp>
+        <p:nvSpPr>
+          <p:cNvPr id="2" name="Espace réservé du numéro de diapositive 1"/>
+          <p:cNvSpPr>
+            <a:spLocks noGrp="1"/>
+          </p:cNvSpPr>
+          <p:nvPr>
+            <p:ph type="sldNum" sz="quarter" idx="12"/>
+          </p:nvPr>
+        </p:nvSpPr>
+        <p:spPr/>
+        <p:txBody>
+          <a:bodyPr/>
+          <a:lstStyle/>
+          <a:p>
+            <a:fld id="{E4F67F9A-838C-4734-8EB0-754A37D9A5A7}" type="slidenum">
+              <a:rPr lang="fr-FR" smtClean="0"/>
+              <a:t>8</a:t>
+            </a:fld>
+            <a:endParaRPr lang="fr-FR"/>
+          </a:p>
+        </p:txBody>
+      </p:sp>
+      <p:sp>
+        <p:nvSpPr>
+          <p:cNvPr id="3" name="ZoneTexte 2"/>
+          <p:cNvSpPr txBox="1"/>
+          <p:nvPr/>
+        </p:nvSpPr>
+        <p:spPr>
+          <a:xfrm>
+            <a:off x="0" y="0"/>
+            <a:ext cx="939800" cy="307777"/>
+          </a:xfrm>
+          <a:prstGeom prst="rect">
+            <a:avLst/>
+          </a:prstGeom>
+          <a:noFill/>
+        </p:spPr>
+        <p:txBody>
+          <a:bodyPr wrap="square" rtlCol="0">
+            <a:spAutoFit/>
+          </a:bodyPr>
+          <a:lstStyle/>
+          <a:p>
+            <a:r>
+              <a:rPr lang="fr-FR" sz="1400" dirty="0" smtClean="0">
+                <a:solidFill>
+                  <a:srgbClr val="FF0000"/>
+                </a:solidFill>
+              </a:rPr>
+              <a:t>Analyse 3</a:t>
+            </a:r>
+            <a:endParaRPr lang="fr-FR" sz="1400" dirty="0">
+              <a:solidFill>
+                <a:srgbClr val="FF0000"/>
+              </a:solidFill>
+            </a:endParaRPr>
+          </a:p>
+        </p:txBody>
+      </p:sp>
     </p:spTree>
     <p:extLst>
       <p:ext uri="{BB962C8B-B14F-4D97-AF65-F5344CB8AC3E}">
@@ -3523,6 +4837,13 @@
   <p:clrMapOvr>
     <a:masterClrMapping/>
   </p:clrMapOvr>
+  <p:timing>
+    <p:tnLst>
+      <p:par>
+        <p:cTn id="1" dur="indefinite" restart="never" nodeType="tmRoot"/>
+      </p:par>
+    </p:tnLst>
+  </p:timing>
 </p:sld>
 </file>
 
@@ -3543,6 +4864,67 @@
           <a:chExt cx="0" cy="0"/>
         </a:xfrm>
       </p:grpSpPr>
+      <p:sp>
+        <p:nvSpPr>
+          <p:cNvPr id="2" name="Espace réservé du numéro de diapositive 1"/>
+          <p:cNvSpPr>
+            <a:spLocks noGrp="1"/>
+          </p:cNvSpPr>
+          <p:nvPr>
+            <p:ph type="sldNum" sz="quarter" idx="12"/>
+          </p:nvPr>
+        </p:nvSpPr>
+        <p:spPr/>
+        <p:txBody>
+          <a:bodyPr/>
+          <a:lstStyle/>
+          <a:p>
+            <a:fld id="{E4F67F9A-838C-4734-8EB0-754A37D9A5A7}" type="slidenum">
+              <a:rPr lang="fr-FR" smtClean="0"/>
+              <a:t>9</a:t>
+            </a:fld>
+            <a:endParaRPr lang="fr-FR"/>
+          </a:p>
+        </p:txBody>
+      </p:sp>
+      <p:sp>
+        <p:nvSpPr>
+          <p:cNvPr id="3" name="ZoneTexte 2"/>
+          <p:cNvSpPr txBox="1"/>
+          <p:nvPr/>
+        </p:nvSpPr>
+        <p:spPr>
+          <a:xfrm>
+            <a:off x="-1" y="0"/>
+            <a:ext cx="1532467" cy="307777"/>
+          </a:xfrm>
+          <a:prstGeom prst="rect">
+            <a:avLst/>
+          </a:prstGeom>
+          <a:noFill/>
+        </p:spPr>
+        <p:txBody>
+          <a:bodyPr wrap="square" rtlCol="0">
+            <a:spAutoFit/>
+          </a:bodyPr>
+          <a:lstStyle/>
+          <a:p>
+            <a:r>
+              <a:rPr lang="fr-FR" sz="1400" dirty="0" smtClean="0">
+                <a:solidFill>
+                  <a:srgbClr val="FF0000"/>
+                </a:solidFill>
+              </a:rPr>
+              <a:t>Développement 1</a:t>
+            </a:r>
+            <a:endParaRPr lang="fr-FR" sz="1400" dirty="0">
+              <a:solidFill>
+                <a:srgbClr val="FF0000"/>
+              </a:solidFill>
+            </a:endParaRPr>
+          </a:p>
+        </p:txBody>
+      </p:sp>
     </p:spTree>
     <p:extLst>
       <p:ext uri="{BB962C8B-B14F-4D97-AF65-F5344CB8AC3E}">
@@ -3553,6 +4935,13 @@
   <p:clrMapOvr>
     <a:masterClrMapping/>
   </p:clrMapOvr>
+  <p:timing>
+    <p:tnLst>
+      <p:par>
+        <p:cTn id="1" dur="indefinite" restart="never" nodeType="tmRoot"/>
+      </p:par>
+    </p:tnLst>
+  </p:timing>
 </p:sld>
 </file>
 
@@ -3815,4 +5204,265 @@
     </a:ext>
   </a:extLst>
 </a:theme>
+</file>
+
+<file path=ppt/theme/theme2.xml><?xml version="1.0" encoding="utf-8"?>
+<a:theme xmlns:a="http://schemas.openxmlformats.org/drawingml/2006/main" name="Thème Office">
+  <a:themeElements>
+    <a:clrScheme name="Office">
+      <a:dk1>
+        <a:sysClr val="windowText" lastClr="000000"/>
+      </a:dk1>
+      <a:lt1>
+        <a:sysClr val="window" lastClr="FFFFFF"/>
+      </a:lt1>
+      <a:dk2>
+        <a:srgbClr val="44546A"/>
+      </a:dk2>
+      <a:lt2>
+        <a:srgbClr val="E7E6E6"/>
+      </a:lt2>
+      <a:accent1>
+        <a:srgbClr val="5B9BD5"/>
+      </a:accent1>
+      <a:accent2>
+        <a:srgbClr val="ED7D31"/>
+      </a:accent2>
+      <a:accent3>
+        <a:srgbClr val="A5A5A5"/>
+      </a:accent3>
+      <a:accent4>
+        <a:srgbClr val="FFC000"/>
+      </a:accent4>
+      <a:accent5>
+        <a:srgbClr val="4472C4"/>
+      </a:accent5>
+      <a:accent6>
+        <a:srgbClr val="70AD47"/>
+      </a:accent6>
+      <a:hlink>
+        <a:srgbClr val="0563C1"/>
+      </a:hlink>
+      <a:folHlink>
+        <a:srgbClr val="954F72"/>
+      </a:folHlink>
+    </a:clrScheme>
+    <a:fontScheme name="Office">
+      <a:majorFont>
+        <a:latin typeface="Calibri Light" panose="020F0302020204030204"/>
+        <a:ea typeface=""/>
+        <a:cs typeface=""/>
+        <a:font script="Jpan" typeface="ＭＳ Ｐゴシック"/>
+        <a:font script="Hang" typeface="맑은 고딕"/>
+        <a:font script="Hans" typeface="宋体"/>
+        <a:font script="Hant" typeface="新細明體"/>
+        <a:font script="Arab" typeface="Times New Roman"/>
+        <a:font script="Hebr" typeface="Times New Roman"/>
+        <a:font script="Thai" typeface="Angsana New"/>
+        <a:font script="Ethi" typeface="Nyala"/>
+        <a:font script="Beng" typeface="Vrinda"/>
+        <a:font script="Gujr" typeface="Shruti"/>
+        <a:font script="Khmr" typeface="MoolBoran"/>
+        <a:font script="Knda" typeface="Tunga"/>
+        <a:font script="Guru" typeface="Raavi"/>
+        <a:font script="Cans" typeface="Euphemia"/>
+        <a:font script="Cher" typeface="Plantagenet Cherokee"/>
+        <a:font script="Yiii" typeface="Microsoft Yi Baiti"/>
+        <a:font script="Tibt" typeface="Microsoft Himalaya"/>
+        <a:font script="Thaa" typeface="MV Boli"/>
+        <a:font script="Deva" typeface="Mangal"/>
+        <a:font script="Telu" typeface="Gautami"/>
+        <a:font script="Taml" typeface="Latha"/>
+        <a:font script="Syrc" typeface="Estrangelo Edessa"/>
+        <a:font script="Orya" typeface="Kalinga"/>
+        <a:font script="Mlym" typeface="Kartika"/>
+        <a:font script="Laoo" typeface="DokChampa"/>
+        <a:font script="Sinh" typeface="Iskoola Pota"/>
+        <a:font script="Mong" typeface="Mongolian Baiti"/>
+        <a:font script="Viet" typeface="Times New Roman"/>
+        <a:font script="Uigh" typeface="Microsoft Uighur"/>
+        <a:font script="Geor" typeface="Sylfaen"/>
+      </a:majorFont>
+      <a:minorFont>
+        <a:latin typeface="Calibri" panose="020F0502020204030204"/>
+        <a:ea typeface=""/>
+        <a:cs typeface=""/>
+        <a:font script="Jpan" typeface="ＭＳ Ｐゴシック"/>
+        <a:font script="Hang" typeface="맑은 고딕"/>
+        <a:font script="Hans" typeface="宋体"/>
+        <a:font script="Hant" typeface="新細明體"/>
+        <a:font script="Arab" typeface="Arial"/>
+        <a:font script="Hebr" typeface="Arial"/>
+        <a:font script="Thai" typeface="Cordia New"/>
+        <a:font script="Ethi" typeface="Nyala"/>
+        <a:font script="Beng" typeface="Vrinda"/>
+        <a:font script="Gujr" typeface="Shruti"/>
+        <a:font script="Khmr" typeface="DaunPenh"/>
+        <a:font script="Knda" typeface="Tunga"/>
+        <a:font script="Guru" typeface="Raavi"/>
+        <a:font script="Cans" typeface="Euphemia"/>
+        <a:font script="Cher" typeface="Plantagenet Cherokee"/>
+        <a:font script="Yiii" typeface="Microsoft Yi Baiti"/>
+        <a:font script="Tibt" typeface="Microsoft Himalaya"/>
+        <a:font script="Thaa" typeface="MV Boli"/>
+        <a:font script="Deva" typeface="Mangal"/>
+        <a:font script="Telu" typeface="Gautami"/>
+        <a:font script="Taml" typeface="Latha"/>
+        <a:font script="Syrc" typeface="Estrangelo Edessa"/>
+        <a:font script="Orya" typeface="Kalinga"/>
+        <a:font script="Mlym" typeface="Kartika"/>
+        <a:font script="Laoo" typeface="DokChampa"/>
+        <a:font script="Sinh" typeface="Iskoola Pota"/>
+        <a:font script="Mong" typeface="Mongolian Baiti"/>
+        <a:font script="Viet" typeface="Arial"/>
+        <a:font script="Uigh" typeface="Microsoft Uighur"/>
+        <a:font script="Geor" typeface="Sylfaen"/>
+      </a:minorFont>
+    </a:fontScheme>
+    <a:fmtScheme name="Office">
+      <a:fillStyleLst>
+        <a:solidFill>
+          <a:schemeClr val="phClr"/>
+        </a:solidFill>
+        <a:gradFill rotWithShape="1">
+          <a:gsLst>
+            <a:gs pos="0">
+              <a:schemeClr val="phClr">
+                <a:lumMod val="110000"/>
+                <a:satMod val="105000"/>
+                <a:tint val="67000"/>
+              </a:schemeClr>
+            </a:gs>
+            <a:gs pos="50000">
+              <a:schemeClr val="phClr">
+                <a:lumMod val="105000"/>
+                <a:satMod val="103000"/>
+                <a:tint val="73000"/>
+              </a:schemeClr>
+            </a:gs>
+            <a:gs pos="100000">
+              <a:schemeClr val="phClr">
+                <a:lumMod val="105000"/>
+                <a:satMod val="109000"/>
+                <a:tint val="81000"/>
+              </a:schemeClr>
+            </a:gs>
+          </a:gsLst>
+          <a:lin ang="5400000" scaled="0"/>
+        </a:gradFill>
+        <a:gradFill rotWithShape="1">
+          <a:gsLst>
+            <a:gs pos="0">
+              <a:schemeClr val="phClr">
+                <a:satMod val="103000"/>
+                <a:lumMod val="102000"/>
+                <a:tint val="94000"/>
+              </a:schemeClr>
+            </a:gs>
+            <a:gs pos="50000">
+              <a:schemeClr val="phClr">
+                <a:satMod val="110000"/>
+                <a:lumMod val="100000"/>
+                <a:shade val="100000"/>
+              </a:schemeClr>
+            </a:gs>
+            <a:gs pos="100000">
+              <a:schemeClr val="phClr">
+                <a:lumMod val="99000"/>
+                <a:satMod val="120000"/>
+                <a:shade val="78000"/>
+              </a:schemeClr>
+            </a:gs>
+          </a:gsLst>
+          <a:lin ang="5400000" scaled="0"/>
+        </a:gradFill>
+      </a:fillStyleLst>
+      <a:lnStyleLst>
+        <a:ln w="6350" cap="flat" cmpd="sng" algn="ctr">
+          <a:solidFill>
+            <a:schemeClr val="phClr"/>
+          </a:solidFill>
+          <a:prstDash val="solid"/>
+          <a:miter lim="800000"/>
+        </a:ln>
+        <a:ln w="12700" cap="flat" cmpd="sng" algn="ctr">
+          <a:solidFill>
+            <a:schemeClr val="phClr"/>
+          </a:solidFill>
+          <a:prstDash val="solid"/>
+          <a:miter lim="800000"/>
+        </a:ln>
+        <a:ln w="19050" cap="flat" cmpd="sng" algn="ctr">
+          <a:solidFill>
+            <a:schemeClr val="phClr"/>
+          </a:solidFill>
+          <a:prstDash val="solid"/>
+          <a:miter lim="800000"/>
+        </a:ln>
+      </a:lnStyleLst>
+      <a:effectStyleLst>
+        <a:effectStyle>
+          <a:effectLst/>
+        </a:effectStyle>
+        <a:effectStyle>
+          <a:effectLst/>
+        </a:effectStyle>
+        <a:effectStyle>
+          <a:effectLst>
+            <a:outerShdw blurRad="57150" dist="19050" dir="5400000" algn="ctr" rotWithShape="0">
+              <a:srgbClr val="000000">
+                <a:alpha val="63000"/>
+              </a:srgbClr>
+            </a:outerShdw>
+          </a:effectLst>
+        </a:effectStyle>
+      </a:effectStyleLst>
+      <a:bgFillStyleLst>
+        <a:solidFill>
+          <a:schemeClr val="phClr"/>
+        </a:solidFill>
+        <a:solidFill>
+          <a:schemeClr val="phClr">
+            <a:tint val="95000"/>
+            <a:satMod val="170000"/>
+          </a:schemeClr>
+        </a:solidFill>
+        <a:gradFill rotWithShape="1">
+          <a:gsLst>
+            <a:gs pos="0">
+              <a:schemeClr val="phClr">
+                <a:tint val="93000"/>
+                <a:satMod val="150000"/>
+                <a:shade val="98000"/>
+                <a:lumMod val="102000"/>
+              </a:schemeClr>
+            </a:gs>
+            <a:gs pos="50000">
+              <a:schemeClr val="phClr">
+                <a:tint val="98000"/>
+                <a:satMod val="130000"/>
+                <a:shade val="90000"/>
+                <a:lumMod val="103000"/>
+              </a:schemeClr>
+            </a:gs>
+            <a:gs pos="100000">
+              <a:schemeClr val="phClr">
+                <a:shade val="63000"/>
+                <a:satMod val="120000"/>
+              </a:schemeClr>
+            </a:gs>
+          </a:gsLst>
+          <a:lin ang="5400000" scaled="0"/>
+        </a:gradFill>
+      </a:bgFillStyleLst>
+    </a:fmtScheme>
+  </a:themeElements>
+  <a:objectDefaults/>
+  <a:extraClrSchemeLst/>
+  <a:extLst>
+    <a:ext uri="{05A4C25C-085E-4340-85A3-A5531E510DB2}">
+      <thm15:themeFamily xmlns:thm15="http://schemas.microsoft.com/office/thememl/2012/main" name="Office Theme" id="{62F939B6-93AF-4DB8-9C6B-D6C7DFDC589F}" vid="{4A3C46E8-61CC-4603-A589-7422A47A8E4A}"/>
+    </a:ext>
+  </a:extLst>
+</a:theme>
 </file>
</xml_diff>

<commit_message>
update slides + schema
</commit_message>
<xml_diff>
--- a/Slides/PRES2019-Projet14-OlivierFourmaux-ROIStreamingImapct-soutenance.pptx
+++ b/Slides/PRES2019-Projet14-OlivierFourmaux-ROIStreamingImapct-soutenance.pptx
@@ -5,7 +5,7 @@
     <p:sldMasterId id="2147483648" r:id="rId1"/>
   </p:sldMasterIdLst>
   <p:notesMasterIdLst>
-    <p:notesMasterId r:id="rId17"/>
+    <p:notesMasterId r:id="rId21"/>
   </p:notesMasterIdLst>
   <p:sldIdLst>
     <p:sldId id="256" r:id="rId2"/>
@@ -16,13 +16,17 @@
     <p:sldId id="261" r:id="rId7"/>
     <p:sldId id="262" r:id="rId8"/>
     <p:sldId id="263" r:id="rId9"/>
-    <p:sldId id="264" r:id="rId10"/>
-    <p:sldId id="265" r:id="rId11"/>
-    <p:sldId id="266" r:id="rId12"/>
-    <p:sldId id="267" r:id="rId13"/>
-    <p:sldId id="268" r:id="rId14"/>
-    <p:sldId id="269" r:id="rId15"/>
-    <p:sldId id="270" r:id="rId16"/>
+    <p:sldId id="265" r:id="rId10"/>
+    <p:sldId id="272" r:id="rId11"/>
+    <p:sldId id="273" r:id="rId12"/>
+    <p:sldId id="274" r:id="rId13"/>
+    <p:sldId id="264" r:id="rId14"/>
+    <p:sldId id="266" r:id="rId15"/>
+    <p:sldId id="268" r:id="rId16"/>
+    <p:sldId id="271" r:id="rId17"/>
+    <p:sldId id="267" r:id="rId18"/>
+    <p:sldId id="269" r:id="rId19"/>
+    <p:sldId id="270" r:id="rId20"/>
   </p:sldIdLst>
   <p:sldSz cx="12192000" cy="6858000"/>
   <p:notesSz cx="6858000" cy="9144000"/>
@@ -3444,7 +3448,7 @@
         </p:nvSpPr>
         <p:spPr>
           <a:xfrm>
-            <a:off x="660400" y="1557866"/>
+            <a:off x="660400" y="1015999"/>
             <a:ext cx="10871200" cy="969963"/>
           </a:xfrm>
         </p:spPr>
@@ -3474,7 +3478,7 @@
         </p:nvSpPr>
         <p:spPr>
           <a:xfrm>
-            <a:off x="1524000" y="3149599"/>
+            <a:off x="1524000" y="2744522"/>
             <a:ext cx="9144000" cy="2853267"/>
           </a:xfrm>
         </p:spPr>
@@ -3590,6 +3594,36 @@
           <a:chExt cx="0" cy="0"/>
         </a:xfrm>
       </p:grpSpPr>
+      <p:pic>
+        <p:nvPicPr>
+          <p:cNvPr id="7" name="Image 6"/>
+          <p:cNvPicPr>
+            <a:picLocks noChangeAspect="1"/>
+          </p:cNvPicPr>
+          <p:nvPr/>
+        </p:nvPicPr>
+        <p:blipFill>
+          <a:blip r:embed="rId2">
+            <a:extLst>
+              <a:ext uri="{28A0092B-C50C-407E-A947-70E740481C1C}">
+                <a14:useLocalDpi xmlns:a14="http://schemas.microsoft.com/office/drawing/2010/main" val="0"/>
+              </a:ext>
+            </a:extLst>
+          </a:blip>
+          <a:stretch>
+            <a:fillRect/>
+          </a:stretch>
+        </p:blipFill>
+        <p:spPr>
+          <a:xfrm>
+            <a:off x="1592996" y="1008793"/>
+            <a:ext cx="9008956" cy="5168354"/>
+          </a:xfrm>
+          <a:prstGeom prst="rect">
+            <a:avLst/>
+          </a:prstGeom>
+        </p:spPr>
+      </p:pic>
       <p:sp>
         <p:nvSpPr>
           <p:cNvPr id="2" name="Espace réservé du numéro de diapositive 1"/>
@@ -3641,7 +3675,7 @@
                   <a:srgbClr val="FF0000"/>
                 </a:solidFill>
               </a:rPr>
-              <a:t>Développement 2</a:t>
+              <a:t>Développement 1</a:t>
             </a:r>
             <a:endParaRPr lang="fr-FR" sz="1400" dirty="0">
               <a:solidFill>
@@ -3651,10 +3685,41 @@
           </a:p>
         </p:txBody>
       </p:sp>
+      <p:sp>
+        <p:nvSpPr>
+          <p:cNvPr id="5" name="ZoneTexte 4"/>
+          <p:cNvSpPr txBox="1"/>
+          <p:nvPr/>
+        </p:nvSpPr>
+        <p:spPr>
+          <a:xfrm>
+            <a:off x="2480733" y="426306"/>
+            <a:ext cx="7230533" cy="523220"/>
+          </a:xfrm>
+          <a:prstGeom prst="rect">
+            <a:avLst/>
+          </a:prstGeom>
+          <a:noFill/>
+        </p:spPr>
+        <p:txBody>
+          <a:bodyPr wrap="square" rtlCol="0">
+            <a:spAutoFit/>
+          </a:bodyPr>
+          <a:lstStyle/>
+          <a:p>
+            <a:pPr algn="ctr"/>
+            <a:r>
+              <a:rPr lang="fr-FR" sz="2800" dirty="0" smtClean="0"/>
+              <a:t>Schéma de la chaine d’encodage vidéo</a:t>
+            </a:r>
+            <a:endParaRPr lang="fr-FR" sz="2800" dirty="0"/>
+          </a:p>
+        </p:txBody>
+      </p:sp>
     </p:spTree>
     <p:extLst>
       <p:ext uri="{BB962C8B-B14F-4D97-AF65-F5344CB8AC3E}">
-        <p14:creationId xmlns:p14="http://schemas.microsoft.com/office/powerpoint/2010/main" val="141894101"/>
+        <p14:creationId xmlns:p14="http://schemas.microsoft.com/office/powerpoint/2010/main" val="239822806"/>
       </p:ext>
     </p:extLst>
   </p:cSld>
@@ -3688,6 +3753,36 @@
           <a:chExt cx="0" cy="0"/>
         </a:xfrm>
       </p:grpSpPr>
+      <p:pic>
+        <p:nvPicPr>
+          <p:cNvPr id="6" name="Image 5"/>
+          <p:cNvPicPr>
+            <a:picLocks noChangeAspect="1"/>
+          </p:cNvPicPr>
+          <p:nvPr/>
+        </p:nvPicPr>
+        <p:blipFill>
+          <a:blip r:embed="rId2">
+            <a:extLst>
+              <a:ext uri="{28A0092B-C50C-407E-A947-70E740481C1C}">
+                <a14:useLocalDpi xmlns:a14="http://schemas.microsoft.com/office/drawing/2010/main" val="0"/>
+              </a:ext>
+            </a:extLst>
+          </a:blip>
+          <a:stretch>
+            <a:fillRect/>
+          </a:stretch>
+        </p:blipFill>
+        <p:spPr>
+          <a:xfrm>
+            <a:off x="1591521" y="1008793"/>
+            <a:ext cx="9008956" cy="5168354"/>
+          </a:xfrm>
+          <a:prstGeom prst="rect">
+            <a:avLst/>
+          </a:prstGeom>
+        </p:spPr>
+      </p:pic>
       <p:sp>
         <p:nvSpPr>
           <p:cNvPr id="2" name="Espace réservé du numéro de diapositive 1"/>
@@ -3739,7 +3834,7 @@
                   <a:srgbClr val="FF0000"/>
                 </a:solidFill>
               </a:rPr>
-              <a:t>Développement 3</a:t>
+              <a:t>Développement 1</a:t>
             </a:r>
             <a:endParaRPr lang="fr-FR" sz="1400" dirty="0">
               <a:solidFill>
@@ -3749,10 +3844,41 @@
           </a:p>
         </p:txBody>
       </p:sp>
+      <p:sp>
+        <p:nvSpPr>
+          <p:cNvPr id="4" name="ZoneTexte 3"/>
+          <p:cNvSpPr txBox="1"/>
+          <p:nvPr/>
+        </p:nvSpPr>
+        <p:spPr>
+          <a:xfrm>
+            <a:off x="2480733" y="426306"/>
+            <a:ext cx="7230533" cy="523220"/>
+          </a:xfrm>
+          <a:prstGeom prst="rect">
+            <a:avLst/>
+          </a:prstGeom>
+          <a:noFill/>
+        </p:spPr>
+        <p:txBody>
+          <a:bodyPr wrap="square" rtlCol="0">
+            <a:spAutoFit/>
+          </a:bodyPr>
+          <a:lstStyle/>
+          <a:p>
+            <a:pPr algn="ctr"/>
+            <a:r>
+              <a:rPr lang="fr-FR" sz="2800" dirty="0" smtClean="0"/>
+              <a:t>Schéma de la chaine d’encodage vidéo</a:t>
+            </a:r>
+            <a:endParaRPr lang="fr-FR" sz="2800" dirty="0"/>
+          </a:p>
+        </p:txBody>
+      </p:sp>
     </p:spTree>
     <p:extLst>
       <p:ext uri="{BB962C8B-B14F-4D97-AF65-F5344CB8AC3E}">
-        <p14:creationId xmlns:p14="http://schemas.microsoft.com/office/powerpoint/2010/main" val="2442421539"/>
+        <p14:creationId xmlns:p14="http://schemas.microsoft.com/office/powerpoint/2010/main" val="2603497454"/>
       </p:ext>
     </p:extLst>
   </p:cSld>
@@ -3811,7 +3937,52 @@
       </p:sp>
       <p:sp>
         <p:nvSpPr>
-          <p:cNvPr id="3" name="ZoneTexte 2"/>
+          <p:cNvPr id="3" name="Rectangle 2"/>
+          <p:cNvSpPr/>
+          <p:nvPr/>
+        </p:nvSpPr>
+        <p:spPr>
+          <a:xfrm>
+            <a:off x="3576463" y="3105834"/>
+            <a:ext cx="5039073" cy="646331"/>
+          </a:xfrm>
+          <a:prstGeom prst="rect">
+            <a:avLst/>
+          </a:prstGeom>
+        </p:spPr>
+        <p:txBody>
+          <a:bodyPr wrap="none">
+            <a:spAutoFit/>
+          </a:bodyPr>
+          <a:lstStyle/>
+          <a:p>
+            <a:pPr algn="ctr"/>
+            <a:r>
+              <a:rPr lang="fr-FR" dirty="0" smtClean="0"/>
+              <a:t>Schéma de la </a:t>
+            </a:r>
+            <a:r>
+              <a:rPr lang="fr-FR" dirty="0" smtClean="0"/>
+              <a:t>partie pratique du </a:t>
+            </a:r>
+            <a:r>
+              <a:rPr lang="fr-FR" dirty="0" smtClean="0"/>
+              <a:t>streaming</a:t>
+            </a:r>
+          </a:p>
+          <a:p>
+            <a:pPr algn="ctr"/>
+            <a:r>
+              <a:rPr lang="fr-FR" dirty="0" smtClean="0"/>
+              <a:t>Partie export au format DASH et lecture sur le client</a:t>
+            </a:r>
+            <a:endParaRPr lang="fr-FR" dirty="0"/>
+          </a:p>
+        </p:txBody>
+      </p:sp>
+      <p:sp>
+        <p:nvSpPr>
+          <p:cNvPr id="4" name="ZoneTexte 3"/>
           <p:cNvSpPr txBox="1"/>
           <p:nvPr/>
         </p:nvSpPr>
@@ -3837,7 +4008,7 @@
                   <a:srgbClr val="FF0000"/>
                 </a:solidFill>
               </a:rPr>
-              <a:t>Développement 4</a:t>
+              <a:t>Développement 2</a:t>
             </a:r>
             <a:endParaRPr lang="fr-FR" sz="1400" dirty="0">
               <a:solidFill>
@@ -3850,20 +4021,13 @@
     </p:spTree>
     <p:extLst>
       <p:ext uri="{BB962C8B-B14F-4D97-AF65-F5344CB8AC3E}">
-        <p14:creationId xmlns:p14="http://schemas.microsoft.com/office/powerpoint/2010/main" val="122085997"/>
+        <p14:creationId xmlns:p14="http://schemas.microsoft.com/office/powerpoint/2010/main" val="1973676190"/>
       </p:ext>
     </p:extLst>
   </p:cSld>
   <p:clrMapOvr>
     <a:masterClrMapping/>
   </p:clrMapOvr>
-  <p:timing>
-    <p:tnLst>
-      <p:par>
-        <p:cTn id="1" dur="indefinite" restart="never" nodeType="tmRoot"/>
-      </p:par>
-    </p:tnLst>
-  </p:timing>
 </p:sld>
 </file>
 
@@ -3935,7 +4099,7 @@
                   <a:srgbClr val="FF0000"/>
                 </a:solidFill>
               </a:rPr>
-              <a:t>Développement 5</a:t>
+              <a:t>Développement 3</a:t>
             </a:r>
             <a:endParaRPr lang="fr-FR" sz="1400" dirty="0">
               <a:solidFill>
@@ -3945,10 +4109,71 @@
           </a:p>
         </p:txBody>
       </p:sp>
+      <p:sp>
+        <p:nvSpPr>
+          <p:cNvPr id="5" name="ZoneTexte 4"/>
+          <p:cNvSpPr txBox="1"/>
+          <p:nvPr/>
+        </p:nvSpPr>
+        <p:spPr>
+          <a:xfrm>
+            <a:off x="2480733" y="426306"/>
+            <a:ext cx="7230533" cy="523220"/>
+          </a:xfrm>
+          <a:prstGeom prst="rect">
+            <a:avLst/>
+          </a:prstGeom>
+          <a:noFill/>
+        </p:spPr>
+        <p:txBody>
+          <a:bodyPr wrap="square" rtlCol="0">
+            <a:spAutoFit/>
+          </a:bodyPr>
+          <a:lstStyle/>
+          <a:p>
+            <a:pPr algn="ctr"/>
+            <a:r>
+              <a:rPr lang="fr-FR" sz="2800" dirty="0" smtClean="0"/>
+              <a:t>Schéma de notre architecture de test</a:t>
+            </a:r>
+            <a:endParaRPr lang="fr-FR" sz="2800" dirty="0"/>
+          </a:p>
+        </p:txBody>
+      </p:sp>
+      <p:pic>
+        <p:nvPicPr>
+          <p:cNvPr id="6" name="Image 5"/>
+          <p:cNvPicPr>
+            <a:picLocks noChangeAspect="1"/>
+          </p:cNvPicPr>
+          <p:nvPr/>
+        </p:nvPicPr>
+        <p:blipFill>
+          <a:blip r:embed="rId2">
+            <a:extLst>
+              <a:ext uri="{28A0092B-C50C-407E-A947-70E740481C1C}">
+                <a14:useLocalDpi xmlns:a14="http://schemas.microsoft.com/office/drawing/2010/main" val="0"/>
+              </a:ext>
+            </a:extLst>
+          </a:blip>
+          <a:stretch>
+            <a:fillRect/>
+          </a:stretch>
+        </p:blipFill>
+        <p:spPr>
+          <a:xfrm>
+            <a:off x="2193117" y="989741"/>
+            <a:ext cx="7805765" cy="5549171"/>
+          </a:xfrm>
+          <a:prstGeom prst="rect">
+            <a:avLst/>
+          </a:prstGeom>
+        </p:spPr>
+      </p:pic>
     </p:spTree>
     <p:extLst>
       <p:ext uri="{BB962C8B-B14F-4D97-AF65-F5344CB8AC3E}">
-        <p14:creationId xmlns:p14="http://schemas.microsoft.com/office/powerpoint/2010/main" val="871201483"/>
+        <p14:creationId xmlns:p14="http://schemas.microsoft.com/office/powerpoint/2010/main" val="4288963991"/>
       </p:ext>
     </p:extLst>
   </p:cSld>
@@ -4033,7 +4258,7 @@
                   <a:srgbClr val="FF0000"/>
                 </a:solidFill>
               </a:rPr>
-              <a:t>Conclusion</a:t>
+              <a:t>Développement 4</a:t>
             </a:r>
             <a:endParaRPr lang="fr-FR" sz="1400" dirty="0">
               <a:solidFill>
@@ -4043,10 +4268,40 @@
           </a:p>
         </p:txBody>
       </p:sp>
+      <p:sp>
+        <p:nvSpPr>
+          <p:cNvPr id="4" name="Rectangle 3"/>
+          <p:cNvSpPr/>
+          <p:nvPr/>
+        </p:nvSpPr>
+        <p:spPr>
+          <a:xfrm>
+            <a:off x="4973417" y="3244334"/>
+            <a:ext cx="2245166" cy="369332"/>
+          </a:xfrm>
+          <a:prstGeom prst="rect">
+            <a:avLst/>
+          </a:prstGeom>
+        </p:spPr>
+        <p:txBody>
+          <a:bodyPr wrap="none">
+            <a:spAutoFit/>
+          </a:bodyPr>
+          <a:lstStyle/>
+          <a:p>
+            <a:pPr algn="ctr"/>
+            <a:r>
+              <a:rPr lang="fr-FR" dirty="0" smtClean="0"/>
+              <a:t>Problèmes rencontrés</a:t>
+            </a:r>
+            <a:endParaRPr lang="fr-FR" dirty="0"/>
+          </a:p>
+        </p:txBody>
+      </p:sp>
     </p:spTree>
     <p:extLst>
       <p:ext uri="{BB962C8B-B14F-4D97-AF65-F5344CB8AC3E}">
-        <p14:creationId xmlns:p14="http://schemas.microsoft.com/office/powerpoint/2010/main" val="3231713206"/>
+        <p14:creationId xmlns:p14="http://schemas.microsoft.com/office/powerpoint/2010/main" val="2442421539"/>
       </p:ext>
     </p:extLst>
   </p:cSld>
@@ -4131,13 +4386,547 @@
                   <a:srgbClr val="FF0000"/>
                 </a:solidFill>
               </a:rPr>
-              <a:t>Merci</a:t>
+              <a:t>Développement 4</a:t>
             </a:r>
             <a:endParaRPr lang="fr-FR" sz="1400" dirty="0">
               <a:solidFill>
                 <a:srgbClr val="FF0000"/>
               </a:solidFill>
             </a:endParaRPr>
+          </a:p>
+        </p:txBody>
+      </p:sp>
+      <p:sp>
+        <p:nvSpPr>
+          <p:cNvPr id="4" name="Rectangle 3"/>
+          <p:cNvSpPr/>
+          <p:nvPr/>
+        </p:nvSpPr>
+        <p:spPr>
+          <a:xfrm>
+            <a:off x="4973417" y="3244334"/>
+            <a:ext cx="2245166" cy="369332"/>
+          </a:xfrm>
+          <a:prstGeom prst="rect">
+            <a:avLst/>
+          </a:prstGeom>
+        </p:spPr>
+        <p:txBody>
+          <a:bodyPr wrap="none">
+            <a:spAutoFit/>
+          </a:bodyPr>
+          <a:lstStyle/>
+          <a:p>
+            <a:pPr algn="ctr"/>
+            <a:r>
+              <a:rPr lang="fr-FR" dirty="0" smtClean="0"/>
+              <a:t>Problèmes rencontrés</a:t>
+            </a:r>
+            <a:endParaRPr lang="fr-FR" dirty="0"/>
+          </a:p>
+        </p:txBody>
+      </p:sp>
+    </p:spTree>
+    <p:extLst>
+      <p:ext uri="{BB962C8B-B14F-4D97-AF65-F5344CB8AC3E}">
+        <p14:creationId xmlns:p14="http://schemas.microsoft.com/office/powerpoint/2010/main" val="871201483"/>
+      </p:ext>
+    </p:extLst>
+  </p:cSld>
+  <p:clrMapOvr>
+    <a:masterClrMapping/>
+  </p:clrMapOvr>
+  <p:timing>
+    <p:tnLst>
+      <p:par>
+        <p:cTn id="1" dur="indefinite" restart="never" nodeType="tmRoot"/>
+      </p:par>
+    </p:tnLst>
+  </p:timing>
+</p:sld>
+</file>
+
+<file path=ppt/slides/slide16.xml><?xml version="1.0" encoding="utf-8"?>
+<p:sld xmlns:a="http://schemas.openxmlformats.org/drawingml/2006/main" xmlns:r="http://schemas.openxmlformats.org/officeDocument/2006/relationships" xmlns:p="http://schemas.openxmlformats.org/presentationml/2006/main">
+  <p:cSld>
+    <p:spTree>
+      <p:nvGrpSpPr>
+        <p:cNvPr id="1" name=""/>
+        <p:cNvGrpSpPr/>
+        <p:nvPr/>
+      </p:nvGrpSpPr>
+      <p:grpSpPr>
+        <a:xfrm>
+          <a:off x="0" y="0"/>
+          <a:ext cx="0" cy="0"/>
+          <a:chOff x="0" y="0"/>
+          <a:chExt cx="0" cy="0"/>
+        </a:xfrm>
+      </p:grpSpPr>
+      <p:sp>
+        <p:nvSpPr>
+          <p:cNvPr id="2" name="Espace réservé du numéro de diapositive 1"/>
+          <p:cNvSpPr>
+            <a:spLocks noGrp="1"/>
+          </p:cNvSpPr>
+          <p:nvPr>
+            <p:ph type="sldNum" sz="quarter" idx="12"/>
+          </p:nvPr>
+        </p:nvSpPr>
+        <p:spPr/>
+        <p:txBody>
+          <a:bodyPr/>
+          <a:lstStyle/>
+          <a:p>
+            <a:fld id="{E4F67F9A-838C-4734-8EB0-754A37D9A5A7}" type="slidenum">
+              <a:rPr lang="fr-FR" smtClean="0"/>
+              <a:t>16</a:t>
+            </a:fld>
+            <a:endParaRPr lang="fr-FR"/>
+          </a:p>
+        </p:txBody>
+      </p:sp>
+      <p:sp>
+        <p:nvSpPr>
+          <p:cNvPr id="3" name="ZoneTexte 2"/>
+          <p:cNvSpPr txBox="1"/>
+          <p:nvPr/>
+        </p:nvSpPr>
+        <p:spPr>
+          <a:xfrm>
+            <a:off x="-1" y="0"/>
+            <a:ext cx="1854201" cy="307777"/>
+          </a:xfrm>
+          <a:prstGeom prst="rect">
+            <a:avLst/>
+          </a:prstGeom>
+          <a:noFill/>
+        </p:spPr>
+        <p:txBody>
+          <a:bodyPr wrap="square" rtlCol="0">
+            <a:spAutoFit/>
+          </a:bodyPr>
+          <a:lstStyle/>
+          <a:p>
+            <a:r>
+              <a:rPr lang="fr-FR" sz="1400" dirty="0" smtClean="0">
+                <a:solidFill>
+                  <a:srgbClr val="FF0000"/>
+                </a:solidFill>
+              </a:rPr>
+              <a:t>Vidéo démonstration</a:t>
+            </a:r>
+            <a:endParaRPr lang="fr-FR" sz="1400" dirty="0">
+              <a:solidFill>
+                <a:srgbClr val="FF0000"/>
+              </a:solidFill>
+            </a:endParaRPr>
+          </a:p>
+        </p:txBody>
+      </p:sp>
+      <p:sp>
+        <p:nvSpPr>
+          <p:cNvPr id="4" name="Rectangle 3"/>
+          <p:cNvSpPr/>
+          <p:nvPr/>
+        </p:nvSpPr>
+        <p:spPr>
+          <a:xfrm>
+            <a:off x="5543220" y="3167390"/>
+            <a:ext cx="1105559" cy="523220"/>
+          </a:xfrm>
+          <a:prstGeom prst="rect">
+            <a:avLst/>
+          </a:prstGeom>
+        </p:spPr>
+        <p:txBody>
+          <a:bodyPr wrap="none">
+            <a:spAutoFit/>
+          </a:bodyPr>
+          <a:lstStyle/>
+          <a:p>
+            <a:r>
+              <a:rPr lang="fr-FR" sz="2800" dirty="0" smtClean="0"/>
+              <a:t>VIDEO</a:t>
+            </a:r>
+            <a:endParaRPr lang="fr-FR" sz="2800" dirty="0"/>
+          </a:p>
+        </p:txBody>
+      </p:sp>
+    </p:spTree>
+    <p:extLst>
+      <p:ext uri="{BB962C8B-B14F-4D97-AF65-F5344CB8AC3E}">
+        <p14:creationId xmlns:p14="http://schemas.microsoft.com/office/powerpoint/2010/main" val="3655151742"/>
+      </p:ext>
+    </p:extLst>
+  </p:cSld>
+  <p:clrMapOvr>
+    <a:masterClrMapping/>
+  </p:clrMapOvr>
+</p:sld>
+</file>
+
+<file path=ppt/slides/slide17.xml><?xml version="1.0" encoding="utf-8"?>
+<p:sld xmlns:a="http://schemas.openxmlformats.org/drawingml/2006/main" xmlns:r="http://schemas.openxmlformats.org/officeDocument/2006/relationships" xmlns:p="http://schemas.openxmlformats.org/presentationml/2006/main">
+  <p:cSld>
+    <p:spTree>
+      <p:nvGrpSpPr>
+        <p:cNvPr id="1" name=""/>
+        <p:cNvGrpSpPr/>
+        <p:nvPr/>
+      </p:nvGrpSpPr>
+      <p:grpSpPr>
+        <a:xfrm>
+          <a:off x="0" y="0"/>
+          <a:ext cx="0" cy="0"/>
+          <a:chOff x="0" y="0"/>
+          <a:chExt cx="0" cy="0"/>
+        </a:xfrm>
+      </p:grpSpPr>
+      <p:sp>
+        <p:nvSpPr>
+          <p:cNvPr id="2" name="Espace réservé du numéro de diapositive 1"/>
+          <p:cNvSpPr>
+            <a:spLocks noGrp="1"/>
+          </p:cNvSpPr>
+          <p:nvPr>
+            <p:ph type="sldNum" sz="quarter" idx="12"/>
+          </p:nvPr>
+        </p:nvSpPr>
+        <p:spPr/>
+        <p:txBody>
+          <a:bodyPr/>
+          <a:lstStyle/>
+          <a:p>
+            <a:fld id="{E4F67F9A-838C-4734-8EB0-754A37D9A5A7}" type="slidenum">
+              <a:rPr lang="fr-FR" smtClean="0"/>
+              <a:t>17</a:t>
+            </a:fld>
+            <a:endParaRPr lang="fr-FR"/>
+          </a:p>
+        </p:txBody>
+      </p:sp>
+      <p:sp>
+        <p:nvSpPr>
+          <p:cNvPr id="3" name="ZoneTexte 2"/>
+          <p:cNvSpPr txBox="1"/>
+          <p:nvPr/>
+        </p:nvSpPr>
+        <p:spPr>
+          <a:xfrm>
+            <a:off x="-1" y="0"/>
+            <a:ext cx="1532467" cy="307777"/>
+          </a:xfrm>
+          <a:prstGeom prst="rect">
+            <a:avLst/>
+          </a:prstGeom>
+          <a:noFill/>
+        </p:spPr>
+        <p:txBody>
+          <a:bodyPr wrap="square" rtlCol="0">
+            <a:spAutoFit/>
+          </a:bodyPr>
+          <a:lstStyle/>
+          <a:p>
+            <a:r>
+              <a:rPr lang="fr-FR" sz="1400" dirty="0" smtClean="0">
+                <a:solidFill>
+                  <a:srgbClr val="FF0000"/>
+                </a:solidFill>
+              </a:rPr>
+              <a:t>Développement 5</a:t>
+            </a:r>
+            <a:endParaRPr lang="fr-FR" sz="1400" dirty="0">
+              <a:solidFill>
+                <a:srgbClr val="FF0000"/>
+              </a:solidFill>
+            </a:endParaRPr>
+          </a:p>
+        </p:txBody>
+      </p:sp>
+      <p:sp>
+        <p:nvSpPr>
+          <p:cNvPr id="4" name="Rectangle 3"/>
+          <p:cNvSpPr/>
+          <p:nvPr/>
+        </p:nvSpPr>
+        <p:spPr>
+          <a:xfrm>
+            <a:off x="2461383" y="3244334"/>
+            <a:ext cx="7269234" cy="369332"/>
+          </a:xfrm>
+          <a:prstGeom prst="rect">
+            <a:avLst/>
+          </a:prstGeom>
+        </p:spPr>
+        <p:txBody>
+          <a:bodyPr wrap="none">
+            <a:spAutoFit/>
+          </a:bodyPr>
+          <a:lstStyle/>
+          <a:p>
+            <a:pPr algn="ctr"/>
+            <a:r>
+              <a:rPr lang="fr-FR" dirty="0" smtClean="0"/>
+              <a:t>Peut être un slide de trop ou alors a rajouter pour les problèmes rencontrés</a:t>
+            </a:r>
+            <a:endParaRPr lang="fr-FR" dirty="0"/>
+          </a:p>
+        </p:txBody>
+      </p:sp>
+    </p:spTree>
+    <p:extLst>
+      <p:ext uri="{BB962C8B-B14F-4D97-AF65-F5344CB8AC3E}">
+        <p14:creationId xmlns:p14="http://schemas.microsoft.com/office/powerpoint/2010/main" val="122085997"/>
+      </p:ext>
+    </p:extLst>
+  </p:cSld>
+  <p:clrMapOvr>
+    <a:masterClrMapping/>
+  </p:clrMapOvr>
+  <p:timing>
+    <p:tnLst>
+      <p:par>
+        <p:cTn id="1" dur="indefinite" restart="never" nodeType="tmRoot"/>
+      </p:par>
+    </p:tnLst>
+  </p:timing>
+</p:sld>
+</file>
+
+<file path=ppt/slides/slide18.xml><?xml version="1.0" encoding="utf-8"?>
+<p:sld xmlns:a="http://schemas.openxmlformats.org/drawingml/2006/main" xmlns:r="http://schemas.openxmlformats.org/officeDocument/2006/relationships" xmlns:p="http://schemas.openxmlformats.org/presentationml/2006/main">
+  <p:cSld>
+    <p:spTree>
+      <p:nvGrpSpPr>
+        <p:cNvPr id="1" name=""/>
+        <p:cNvGrpSpPr/>
+        <p:nvPr/>
+      </p:nvGrpSpPr>
+      <p:grpSpPr>
+        <a:xfrm>
+          <a:off x="0" y="0"/>
+          <a:ext cx="0" cy="0"/>
+          <a:chOff x="0" y="0"/>
+          <a:chExt cx="0" cy="0"/>
+        </a:xfrm>
+      </p:grpSpPr>
+      <p:sp>
+        <p:nvSpPr>
+          <p:cNvPr id="2" name="Espace réservé du numéro de diapositive 1"/>
+          <p:cNvSpPr>
+            <a:spLocks noGrp="1"/>
+          </p:cNvSpPr>
+          <p:nvPr>
+            <p:ph type="sldNum" sz="quarter" idx="12"/>
+          </p:nvPr>
+        </p:nvSpPr>
+        <p:spPr/>
+        <p:txBody>
+          <a:bodyPr/>
+          <a:lstStyle/>
+          <a:p>
+            <a:fld id="{E4F67F9A-838C-4734-8EB0-754A37D9A5A7}" type="slidenum">
+              <a:rPr lang="fr-FR" smtClean="0"/>
+              <a:t>18</a:t>
+            </a:fld>
+            <a:endParaRPr lang="fr-FR"/>
+          </a:p>
+        </p:txBody>
+      </p:sp>
+      <p:sp>
+        <p:nvSpPr>
+          <p:cNvPr id="3" name="ZoneTexte 2"/>
+          <p:cNvSpPr txBox="1"/>
+          <p:nvPr/>
+        </p:nvSpPr>
+        <p:spPr>
+          <a:xfrm>
+            <a:off x="-1" y="0"/>
+            <a:ext cx="1532467" cy="307777"/>
+          </a:xfrm>
+          <a:prstGeom prst="rect">
+            <a:avLst/>
+          </a:prstGeom>
+          <a:noFill/>
+        </p:spPr>
+        <p:txBody>
+          <a:bodyPr wrap="square" rtlCol="0">
+            <a:spAutoFit/>
+          </a:bodyPr>
+          <a:lstStyle/>
+          <a:p>
+            <a:r>
+              <a:rPr lang="fr-FR" sz="1400" dirty="0" smtClean="0">
+                <a:solidFill>
+                  <a:srgbClr val="FF0000"/>
+                </a:solidFill>
+              </a:rPr>
+              <a:t>Conclusion</a:t>
+            </a:r>
+            <a:endParaRPr lang="fr-FR" sz="1400" dirty="0">
+              <a:solidFill>
+                <a:srgbClr val="FF0000"/>
+              </a:solidFill>
+            </a:endParaRPr>
+          </a:p>
+        </p:txBody>
+      </p:sp>
+      <p:sp>
+        <p:nvSpPr>
+          <p:cNvPr id="6" name="Rectangle 5"/>
+          <p:cNvSpPr/>
+          <p:nvPr/>
+        </p:nvSpPr>
+        <p:spPr>
+          <a:xfrm>
+            <a:off x="5314443" y="3244334"/>
+            <a:ext cx="1563120" cy="369332"/>
+          </a:xfrm>
+          <a:prstGeom prst="rect">
+            <a:avLst/>
+          </a:prstGeom>
+        </p:spPr>
+        <p:txBody>
+          <a:bodyPr wrap="none">
+            <a:spAutoFit/>
+          </a:bodyPr>
+          <a:lstStyle/>
+          <a:p>
+            <a:pPr algn="ctr"/>
+            <a:r>
+              <a:rPr lang="fr-FR" dirty="0" smtClean="0"/>
+              <a:t>Bilan du projet</a:t>
+            </a:r>
+            <a:endParaRPr lang="fr-FR" dirty="0"/>
+          </a:p>
+        </p:txBody>
+      </p:sp>
+    </p:spTree>
+    <p:extLst>
+      <p:ext uri="{BB962C8B-B14F-4D97-AF65-F5344CB8AC3E}">
+        <p14:creationId xmlns:p14="http://schemas.microsoft.com/office/powerpoint/2010/main" val="3231713206"/>
+      </p:ext>
+    </p:extLst>
+  </p:cSld>
+  <p:clrMapOvr>
+    <a:masterClrMapping/>
+  </p:clrMapOvr>
+  <p:timing>
+    <p:tnLst>
+      <p:par>
+        <p:cTn id="1" dur="indefinite" restart="never" nodeType="tmRoot"/>
+      </p:par>
+    </p:tnLst>
+  </p:timing>
+</p:sld>
+</file>
+
+<file path=ppt/slides/slide19.xml><?xml version="1.0" encoding="utf-8"?>
+<p:sld xmlns:a="http://schemas.openxmlformats.org/drawingml/2006/main" xmlns:r="http://schemas.openxmlformats.org/officeDocument/2006/relationships" xmlns:p="http://schemas.openxmlformats.org/presentationml/2006/main">
+  <p:cSld>
+    <p:spTree>
+      <p:nvGrpSpPr>
+        <p:cNvPr id="1" name=""/>
+        <p:cNvGrpSpPr/>
+        <p:nvPr/>
+      </p:nvGrpSpPr>
+      <p:grpSpPr>
+        <a:xfrm>
+          <a:off x="0" y="0"/>
+          <a:ext cx="0" cy="0"/>
+          <a:chOff x="0" y="0"/>
+          <a:chExt cx="0" cy="0"/>
+        </a:xfrm>
+      </p:grpSpPr>
+      <p:sp>
+        <p:nvSpPr>
+          <p:cNvPr id="2" name="Espace réservé du numéro de diapositive 1"/>
+          <p:cNvSpPr>
+            <a:spLocks noGrp="1"/>
+          </p:cNvSpPr>
+          <p:nvPr>
+            <p:ph type="sldNum" sz="quarter" idx="12"/>
+          </p:nvPr>
+        </p:nvSpPr>
+        <p:spPr/>
+        <p:txBody>
+          <a:bodyPr/>
+          <a:lstStyle/>
+          <a:p>
+            <a:fld id="{E4F67F9A-838C-4734-8EB0-754A37D9A5A7}" type="slidenum">
+              <a:rPr lang="fr-FR" smtClean="0"/>
+              <a:t>19</a:t>
+            </a:fld>
+            <a:endParaRPr lang="fr-FR"/>
+          </a:p>
+        </p:txBody>
+      </p:sp>
+      <p:sp>
+        <p:nvSpPr>
+          <p:cNvPr id="3" name="ZoneTexte 2"/>
+          <p:cNvSpPr txBox="1"/>
+          <p:nvPr/>
+        </p:nvSpPr>
+        <p:spPr>
+          <a:xfrm>
+            <a:off x="-1" y="0"/>
+            <a:ext cx="1532467" cy="307777"/>
+          </a:xfrm>
+          <a:prstGeom prst="rect">
+            <a:avLst/>
+          </a:prstGeom>
+          <a:noFill/>
+        </p:spPr>
+        <p:txBody>
+          <a:bodyPr wrap="square" rtlCol="0">
+            <a:spAutoFit/>
+          </a:bodyPr>
+          <a:lstStyle/>
+          <a:p>
+            <a:r>
+              <a:rPr lang="fr-FR" sz="1400" dirty="0" smtClean="0">
+                <a:solidFill>
+                  <a:srgbClr val="FF0000"/>
+                </a:solidFill>
+              </a:rPr>
+              <a:t>Merci</a:t>
+            </a:r>
+            <a:endParaRPr lang="fr-FR" sz="1400" dirty="0">
+              <a:solidFill>
+                <a:srgbClr val="FF0000"/>
+              </a:solidFill>
+            </a:endParaRPr>
+          </a:p>
+        </p:txBody>
+      </p:sp>
+      <p:sp>
+        <p:nvSpPr>
+          <p:cNvPr id="4" name="Rectangle 3"/>
+          <p:cNvSpPr/>
+          <p:nvPr/>
+        </p:nvSpPr>
+        <p:spPr>
+          <a:xfrm>
+            <a:off x="5525940" y="3167390"/>
+            <a:ext cx="1140120" cy="523220"/>
+          </a:xfrm>
+          <a:prstGeom prst="rect">
+            <a:avLst/>
+          </a:prstGeom>
+        </p:spPr>
+        <p:txBody>
+          <a:bodyPr wrap="none">
+            <a:spAutoFit/>
+          </a:bodyPr>
+          <a:lstStyle/>
+          <a:p>
+            <a:pPr algn="ctr"/>
+            <a:r>
+              <a:rPr lang="fr-FR" sz="2800" dirty="0" smtClean="0"/>
+              <a:t>MERCI</a:t>
+            </a:r>
+            <a:endParaRPr lang="fr-FR" sz="2800" dirty="0"/>
           </a:p>
         </p:txBody>
       </p:sp>
@@ -4239,6 +5028,45 @@
           </a:p>
         </p:txBody>
       </p:sp>
+      <p:sp>
+        <p:nvSpPr>
+          <p:cNvPr id="5" name="ZoneTexte 4"/>
+          <p:cNvSpPr txBox="1"/>
+          <p:nvPr/>
+        </p:nvSpPr>
+        <p:spPr>
+          <a:xfrm>
+            <a:off x="3412067" y="3244334"/>
+            <a:ext cx="5367866" cy="369332"/>
+          </a:xfrm>
+          <a:prstGeom prst="rect">
+            <a:avLst/>
+          </a:prstGeom>
+          <a:noFill/>
+        </p:spPr>
+        <p:txBody>
+          <a:bodyPr wrap="square" rtlCol="0">
+            <a:spAutoFit/>
+          </a:bodyPr>
+          <a:lstStyle/>
+          <a:p>
+            <a:pPr algn="ctr"/>
+            <a:r>
+              <a:rPr lang="fr-FR" dirty="0" smtClean="0"/>
+              <a:t>Définir les </a:t>
+            </a:r>
+            <a:r>
+              <a:rPr lang="fr-FR" dirty="0" smtClean="0"/>
+              <a:t>mots </a:t>
+            </a:r>
+            <a:r>
+              <a:rPr lang="fr-FR" dirty="0" smtClean="0"/>
+              <a:t>clés</a:t>
+            </a:r>
+            <a:endParaRPr lang="fr-FR" dirty="0"/>
+          </a:p>
+        </p:txBody>
+      </p:sp>
     </p:spTree>
     <p:extLst>
       <p:ext uri="{BB962C8B-B14F-4D97-AF65-F5344CB8AC3E}">
@@ -4337,6 +5165,45 @@
           </a:p>
         </p:txBody>
       </p:sp>
+      <p:sp>
+        <p:nvSpPr>
+          <p:cNvPr id="4" name="ZoneTexte 3"/>
+          <p:cNvSpPr txBox="1"/>
+          <p:nvPr/>
+        </p:nvSpPr>
+        <p:spPr>
+          <a:xfrm>
+            <a:off x="3412067" y="3244334"/>
+            <a:ext cx="5367866" cy="369332"/>
+          </a:xfrm>
+          <a:prstGeom prst="rect">
+            <a:avLst/>
+          </a:prstGeom>
+          <a:noFill/>
+        </p:spPr>
+        <p:txBody>
+          <a:bodyPr wrap="square" rtlCol="0">
+            <a:spAutoFit/>
+          </a:bodyPr>
+          <a:lstStyle/>
+          <a:p>
+            <a:pPr algn="ctr"/>
+            <a:r>
+              <a:rPr lang="fr-FR" dirty="0" smtClean="0"/>
+              <a:t>Définir les </a:t>
+            </a:r>
+            <a:r>
+              <a:rPr lang="fr-FR" dirty="0" smtClean="0"/>
+              <a:t>mots </a:t>
+            </a:r>
+            <a:r>
+              <a:rPr lang="fr-FR" dirty="0" smtClean="0"/>
+              <a:t>clés</a:t>
+            </a:r>
+            <a:endParaRPr lang="fr-FR" dirty="0"/>
+          </a:p>
+        </p:txBody>
+      </p:sp>
     </p:spTree>
     <p:extLst>
       <p:ext uri="{BB962C8B-B14F-4D97-AF65-F5344CB8AC3E}">
@@ -4435,6 +5302,45 @@
           </a:p>
         </p:txBody>
       </p:sp>
+      <p:sp>
+        <p:nvSpPr>
+          <p:cNvPr id="4" name="ZoneTexte 3"/>
+          <p:cNvSpPr txBox="1"/>
+          <p:nvPr/>
+        </p:nvSpPr>
+        <p:spPr>
+          <a:xfrm>
+            <a:off x="3412067" y="3244334"/>
+            <a:ext cx="5367866" cy="369332"/>
+          </a:xfrm>
+          <a:prstGeom prst="rect">
+            <a:avLst/>
+          </a:prstGeom>
+          <a:noFill/>
+        </p:spPr>
+        <p:txBody>
+          <a:bodyPr wrap="square" rtlCol="0">
+            <a:spAutoFit/>
+          </a:bodyPr>
+          <a:lstStyle/>
+          <a:p>
+            <a:pPr algn="ctr"/>
+            <a:r>
+              <a:rPr lang="fr-FR" dirty="0" smtClean="0"/>
+              <a:t>Définir les </a:t>
+            </a:r>
+            <a:r>
+              <a:rPr lang="fr-FR" dirty="0" smtClean="0"/>
+              <a:t>mots </a:t>
+            </a:r>
+            <a:r>
+              <a:rPr lang="fr-FR" dirty="0" smtClean="0"/>
+              <a:t>clés</a:t>
+            </a:r>
+            <a:endParaRPr lang="fr-FR" dirty="0"/>
+          </a:p>
+        </p:txBody>
+      </p:sp>
     </p:spTree>
     <p:extLst>
       <p:ext uri="{BB962C8B-B14F-4D97-AF65-F5344CB8AC3E}">
@@ -4474,6 +5380,37 @@
       </p:grpSpPr>
       <p:sp>
         <p:nvSpPr>
+          <p:cNvPr id="4" name="ZoneTexte 3"/>
+          <p:cNvSpPr txBox="1"/>
+          <p:nvPr/>
+        </p:nvSpPr>
+        <p:spPr>
+          <a:xfrm>
+            <a:off x="3471333" y="3244334"/>
+            <a:ext cx="5249333" cy="369332"/>
+          </a:xfrm>
+          <a:prstGeom prst="rect">
+            <a:avLst/>
+          </a:prstGeom>
+          <a:noFill/>
+        </p:spPr>
+        <p:txBody>
+          <a:bodyPr wrap="square" rtlCol="0">
+            <a:spAutoFit/>
+          </a:bodyPr>
+          <a:lstStyle/>
+          <a:p>
+            <a:pPr algn="ctr"/>
+            <a:r>
+              <a:rPr lang="fr-FR" dirty="0" smtClean="0"/>
+              <a:t>Lister les points importants du cahier des charges</a:t>
+            </a:r>
+            <a:endParaRPr lang="fr-FR" dirty="0"/>
+          </a:p>
+        </p:txBody>
+      </p:sp>
+      <p:sp>
+        <p:nvSpPr>
           <p:cNvPr id="2" name="Espace réservé du numéro de diapositive 1"/>
           <p:cNvSpPr>
             <a:spLocks noGrp="1"/>
@@ -4631,6 +5568,35 @@
           </a:p>
         </p:txBody>
       </p:sp>
+      <p:sp>
+        <p:nvSpPr>
+          <p:cNvPr id="5" name="Rectangle 4"/>
+          <p:cNvSpPr/>
+          <p:nvPr/>
+        </p:nvSpPr>
+        <p:spPr>
+          <a:xfrm>
+            <a:off x="3668636" y="3244334"/>
+            <a:ext cx="4854727" cy="369332"/>
+          </a:xfrm>
+          <a:prstGeom prst="rect">
+            <a:avLst/>
+          </a:prstGeom>
+        </p:spPr>
+        <p:txBody>
+          <a:bodyPr wrap="none">
+            <a:spAutoFit/>
+          </a:bodyPr>
+          <a:lstStyle/>
+          <a:p>
+            <a:pPr algn="ctr"/>
+            <a:r>
+              <a:rPr lang="fr-FR" dirty="0"/>
+              <a:t>Présentation de la théorie du découpage en tuiles</a:t>
+            </a:r>
+          </a:p>
+        </p:txBody>
+      </p:sp>
     </p:spTree>
     <p:extLst>
       <p:ext uri="{BB962C8B-B14F-4D97-AF65-F5344CB8AC3E}">
@@ -4729,6 +5695,40 @@
           </a:p>
         </p:txBody>
       </p:sp>
+      <p:sp>
+        <p:nvSpPr>
+          <p:cNvPr id="4" name="Rectangle 3"/>
+          <p:cNvSpPr/>
+          <p:nvPr/>
+        </p:nvSpPr>
+        <p:spPr>
+          <a:xfrm>
+            <a:off x="3855547" y="3244334"/>
+            <a:ext cx="4480907" cy="369332"/>
+          </a:xfrm>
+          <a:prstGeom prst="rect">
+            <a:avLst/>
+          </a:prstGeom>
+        </p:spPr>
+        <p:txBody>
+          <a:bodyPr wrap="none">
+            <a:spAutoFit/>
+          </a:bodyPr>
+          <a:lstStyle/>
+          <a:p>
+            <a:pPr algn="ctr"/>
+            <a:r>
+              <a:rPr lang="fr-FR" dirty="0"/>
+              <a:t>Présentation de la théorie </a:t>
+            </a:r>
+            <a:r>
+              <a:rPr lang="fr-FR" dirty="0" smtClean="0"/>
+              <a:t>du streaming DASH</a:t>
+            </a:r>
+            <a:endParaRPr lang="fr-FR" dirty="0"/>
+          </a:p>
+        </p:txBody>
+      </p:sp>
     </p:spTree>
     <p:extLst>
       <p:ext uri="{BB962C8B-B14F-4D97-AF65-F5344CB8AC3E}">
@@ -4827,6 +5827,36 @@
           </a:p>
         </p:txBody>
       </p:sp>
+      <p:sp>
+        <p:nvSpPr>
+          <p:cNvPr id="4" name="Rectangle 3"/>
+          <p:cNvSpPr/>
+          <p:nvPr/>
+        </p:nvSpPr>
+        <p:spPr>
+          <a:xfrm>
+            <a:off x="3916140" y="3244334"/>
+            <a:ext cx="4359720" cy="369332"/>
+          </a:xfrm>
+          <a:prstGeom prst="rect">
+            <a:avLst/>
+          </a:prstGeom>
+        </p:spPr>
+        <p:txBody>
+          <a:bodyPr wrap="none">
+            <a:spAutoFit/>
+          </a:bodyPr>
+          <a:lstStyle/>
+          <a:p>
+            <a:pPr algn="ctr"/>
+            <a:r>
+              <a:rPr lang="fr-FR" dirty="0" smtClean="0"/>
+              <a:t>Schéma de la chaine théorique de streaming</a:t>
+            </a:r>
+            <a:endParaRPr lang="fr-FR" dirty="0"/>
+          </a:p>
+        </p:txBody>
+      </p:sp>
     </p:spTree>
     <p:extLst>
       <p:ext uri="{BB962C8B-B14F-4D97-AF65-F5344CB8AC3E}">
@@ -4864,6 +5894,36 @@
           <a:chExt cx="0" cy="0"/>
         </a:xfrm>
       </p:grpSpPr>
+      <p:pic>
+        <p:nvPicPr>
+          <p:cNvPr id="9" name="Image 8"/>
+          <p:cNvPicPr>
+            <a:picLocks noChangeAspect="1"/>
+          </p:cNvPicPr>
+          <p:nvPr/>
+        </p:nvPicPr>
+        <p:blipFill>
+          <a:blip r:embed="rId2">
+            <a:extLst>
+              <a:ext uri="{28A0092B-C50C-407E-A947-70E740481C1C}">
+                <a14:useLocalDpi xmlns:a14="http://schemas.microsoft.com/office/drawing/2010/main" val="0"/>
+              </a:ext>
+            </a:extLst>
+          </a:blip>
+          <a:stretch>
+            <a:fillRect/>
+          </a:stretch>
+        </p:blipFill>
+        <p:spPr>
+          <a:xfrm>
+            <a:off x="1590289" y="1008793"/>
+            <a:ext cx="9011420" cy="5169768"/>
+          </a:xfrm>
+          <a:prstGeom prst="rect">
+            <a:avLst/>
+          </a:prstGeom>
+        </p:spPr>
+      </p:pic>
       <p:sp>
         <p:nvSpPr>
           <p:cNvPr id="2" name="Espace réservé du numéro de diapositive 1"/>
@@ -4925,10 +5985,41 @@
           </a:p>
         </p:txBody>
       </p:sp>
+      <p:sp>
+        <p:nvSpPr>
+          <p:cNvPr id="5" name="ZoneTexte 4"/>
+          <p:cNvSpPr txBox="1"/>
+          <p:nvPr/>
+        </p:nvSpPr>
+        <p:spPr>
+          <a:xfrm>
+            <a:off x="2480733" y="426306"/>
+            <a:ext cx="7230533" cy="523220"/>
+          </a:xfrm>
+          <a:prstGeom prst="rect">
+            <a:avLst/>
+          </a:prstGeom>
+          <a:noFill/>
+        </p:spPr>
+        <p:txBody>
+          <a:bodyPr wrap="square" rtlCol="0">
+            <a:spAutoFit/>
+          </a:bodyPr>
+          <a:lstStyle/>
+          <a:p>
+            <a:pPr algn="ctr"/>
+            <a:r>
+              <a:rPr lang="fr-FR" sz="2800" dirty="0" smtClean="0"/>
+              <a:t>Schéma de la chaine d’encodage vidéo</a:t>
+            </a:r>
+            <a:endParaRPr lang="fr-FR" sz="2800" dirty="0"/>
+          </a:p>
+        </p:txBody>
+      </p:sp>
     </p:spTree>
     <p:extLst>
       <p:ext uri="{BB962C8B-B14F-4D97-AF65-F5344CB8AC3E}">
-        <p14:creationId xmlns:p14="http://schemas.microsoft.com/office/powerpoint/2010/main" val="4288963991"/>
+        <p14:creationId xmlns:p14="http://schemas.microsoft.com/office/powerpoint/2010/main" val="141894101"/>
       </p:ext>
     </p:extLst>
   </p:cSld>

</xml_diff>

<commit_message>
update slides + BACKUP+ new schema + new capture
</commit_message>
<xml_diff>
--- a/Slides/PRES2019-Projet14-OlivierFourmaux-ROIStreamingImapct-soutenance.pptx
+++ b/Slides/PRES2019-Projet14-OlivierFourmaux-ROIStreamingImapct-soutenance.pptx
@@ -5,7 +5,7 @@
     <p:sldMasterId id="2147483648" r:id="rId1"/>
   </p:sldMasterIdLst>
   <p:notesMasterIdLst>
-    <p:notesMasterId r:id="rId21"/>
+    <p:notesMasterId r:id="rId23"/>
   </p:notesMasterIdLst>
   <p:sldIdLst>
     <p:sldId id="256" r:id="rId2"/>
@@ -20,13 +20,15 @@
     <p:sldId id="272" r:id="rId11"/>
     <p:sldId id="273" r:id="rId12"/>
     <p:sldId id="274" r:id="rId13"/>
-    <p:sldId id="264" r:id="rId14"/>
-    <p:sldId id="266" r:id="rId15"/>
-    <p:sldId id="268" r:id="rId16"/>
-    <p:sldId id="271" r:id="rId17"/>
-    <p:sldId id="267" r:id="rId18"/>
-    <p:sldId id="269" r:id="rId19"/>
-    <p:sldId id="270" r:id="rId20"/>
+    <p:sldId id="275" r:id="rId14"/>
+    <p:sldId id="276" r:id="rId15"/>
+    <p:sldId id="264" r:id="rId16"/>
+    <p:sldId id="266" r:id="rId17"/>
+    <p:sldId id="268" r:id="rId18"/>
+    <p:sldId id="271" r:id="rId19"/>
+    <p:sldId id="267" r:id="rId20"/>
+    <p:sldId id="269" r:id="rId21"/>
+    <p:sldId id="270" r:id="rId22"/>
   </p:sldIdLst>
   <p:sldSz cx="12192000" cy="6858000"/>
   <p:notesSz cx="6858000" cy="9144000"/>
@@ -226,7 +228,7 @@
           <a:p>
             <a:fld id="{83956E12-A7B0-40BB-B53B-545BE3161811}" type="datetimeFigureOut">
               <a:rPr lang="fr-FR" smtClean="0"/>
-              <a:t>12/06/2020</a:t>
+              <a:t>13/06/2020</a:t>
             </a:fld>
             <a:endParaRPr lang="fr-FR"/>
           </a:p>
@@ -709,7 +711,7 @@
           <a:p>
             <a:fld id="{A6F29AD2-F1A2-4E74-92F5-24F9B59D7573}" type="datetime1">
               <a:rPr lang="fr-FR" smtClean="0"/>
-              <a:t>12/06/2020</a:t>
+              <a:t>13/06/2020</a:t>
             </a:fld>
             <a:endParaRPr lang="fr-FR"/>
           </a:p>
@@ -879,7 +881,7 @@
           <a:p>
             <a:fld id="{5ED79E74-F135-472D-9DB2-DF9CBB980889}" type="datetime1">
               <a:rPr lang="fr-FR" smtClean="0"/>
-              <a:t>12/06/2020</a:t>
+              <a:t>13/06/2020</a:t>
             </a:fld>
             <a:endParaRPr lang="fr-FR"/>
           </a:p>
@@ -1059,7 +1061,7 @@
           <a:p>
             <a:fld id="{C6AC5058-C0DB-48EC-8AB0-832BB3642373}" type="datetime1">
               <a:rPr lang="fr-FR" smtClean="0"/>
-              <a:t>12/06/2020</a:t>
+              <a:t>13/06/2020</a:t>
             </a:fld>
             <a:endParaRPr lang="fr-FR"/>
           </a:p>
@@ -1229,7 +1231,7 @@
           <a:p>
             <a:fld id="{76F652B7-3FED-4BAB-9F63-01DE7F9FB2B9}" type="datetime1">
               <a:rPr lang="fr-FR" smtClean="0"/>
-              <a:t>12/06/2020</a:t>
+              <a:t>13/06/2020</a:t>
             </a:fld>
             <a:endParaRPr lang="fr-FR"/>
           </a:p>
@@ -1475,7 +1477,7 @@
           <a:p>
             <a:fld id="{D7EEBBCA-4E0E-41A5-8927-176BBBB26381}" type="datetime1">
               <a:rPr lang="fr-FR" smtClean="0"/>
-              <a:t>12/06/2020</a:t>
+              <a:t>13/06/2020</a:t>
             </a:fld>
             <a:endParaRPr lang="fr-FR"/>
           </a:p>
@@ -1707,7 +1709,7 @@
           <a:p>
             <a:fld id="{2B25F7E9-1BAD-4703-8D58-CE48142E5A5A}" type="datetime1">
               <a:rPr lang="fr-FR" smtClean="0"/>
-              <a:t>12/06/2020</a:t>
+              <a:t>13/06/2020</a:t>
             </a:fld>
             <a:endParaRPr lang="fr-FR"/>
           </a:p>
@@ -2074,7 +2076,7 @@
           <a:p>
             <a:fld id="{316E7241-5728-45F1-8AF7-C3841E4FE797}" type="datetime1">
               <a:rPr lang="fr-FR" smtClean="0"/>
-              <a:t>12/06/2020</a:t>
+              <a:t>13/06/2020</a:t>
             </a:fld>
             <a:endParaRPr lang="fr-FR"/>
           </a:p>
@@ -2192,7 +2194,7 @@
           <a:p>
             <a:fld id="{6894D680-D819-474A-8D7B-CFB7F721C2AD}" type="datetime1">
               <a:rPr lang="fr-FR" smtClean="0"/>
-              <a:t>12/06/2020</a:t>
+              <a:t>13/06/2020</a:t>
             </a:fld>
             <a:endParaRPr lang="fr-FR"/>
           </a:p>
@@ -2287,7 +2289,7 @@
           <a:p>
             <a:fld id="{807E58CE-068E-4EE3-B99A-44087A7E6EFC}" type="datetime1">
               <a:rPr lang="fr-FR" smtClean="0"/>
-              <a:t>12/06/2020</a:t>
+              <a:t>13/06/2020</a:t>
             </a:fld>
             <a:endParaRPr lang="fr-FR"/>
           </a:p>
@@ -2564,7 +2566,7 @@
           <a:p>
             <a:fld id="{D47317FF-4C54-4A8A-A564-9AE950381E3B}" type="datetime1">
               <a:rPr lang="fr-FR" smtClean="0"/>
-              <a:t>12/06/2020</a:t>
+              <a:t>13/06/2020</a:t>
             </a:fld>
             <a:endParaRPr lang="fr-FR"/>
           </a:p>
@@ -2817,7 +2819,7 @@
           <a:p>
             <a:fld id="{89886678-C011-4E2C-A958-44E1DAFC1EA2}" type="datetime1">
               <a:rPr lang="fr-FR" smtClean="0"/>
-              <a:t>12/06/2020</a:t>
+              <a:t>13/06/2020</a:t>
             </a:fld>
             <a:endParaRPr lang="fr-FR"/>
           </a:p>
@@ -3030,7 +3032,7 @@
           <a:p>
             <a:fld id="{BF44C28D-ABFF-4D11-8CAD-94D8A13303CD}" type="datetime1">
               <a:rPr lang="fr-FR" smtClean="0"/>
-              <a:t>12/06/2020</a:t>
+              <a:t>13/06/2020</a:t>
             </a:fld>
             <a:endParaRPr lang="fr-FR"/>
           </a:p>
@@ -3755,7 +3757,7 @@
       </p:grpSpPr>
       <p:pic>
         <p:nvPicPr>
-          <p:cNvPr id="6" name="Image 5"/>
+          <p:cNvPr id="5" name="Image 4"/>
           <p:cNvPicPr>
             <a:picLocks noChangeAspect="1"/>
           </p:cNvPicPr>
@@ -3776,7 +3778,7 @@
         <p:spPr>
           <a:xfrm>
             <a:off x="1591521" y="1008793"/>
-            <a:ext cx="9008956" cy="5168354"/>
+            <a:ext cx="9996540" cy="5168354"/>
           </a:xfrm>
           <a:prstGeom prst="rect">
             <a:avLst/>
@@ -3937,51 +3939,6 @@
       </p:sp>
       <p:sp>
         <p:nvSpPr>
-          <p:cNvPr id="3" name="Rectangle 2"/>
-          <p:cNvSpPr/>
-          <p:nvPr/>
-        </p:nvSpPr>
-        <p:spPr>
-          <a:xfrm>
-            <a:off x="3576463" y="3105834"/>
-            <a:ext cx="5039073" cy="646331"/>
-          </a:xfrm>
-          <a:prstGeom prst="rect">
-            <a:avLst/>
-          </a:prstGeom>
-        </p:spPr>
-        <p:txBody>
-          <a:bodyPr wrap="none">
-            <a:spAutoFit/>
-          </a:bodyPr>
-          <a:lstStyle/>
-          <a:p>
-            <a:pPr algn="ctr"/>
-            <a:r>
-              <a:rPr lang="fr-FR" dirty="0" smtClean="0"/>
-              <a:t>Schéma de la </a:t>
-            </a:r>
-            <a:r>
-              <a:rPr lang="fr-FR" dirty="0" smtClean="0"/>
-              <a:t>partie pratique du </a:t>
-            </a:r>
-            <a:r>
-              <a:rPr lang="fr-FR" dirty="0" smtClean="0"/>
-              <a:t>streaming</a:t>
-            </a:r>
-          </a:p>
-          <a:p>
-            <a:pPr algn="ctr"/>
-            <a:r>
-              <a:rPr lang="fr-FR" dirty="0" smtClean="0"/>
-              <a:t>Partie export au format DASH et lecture sur le client</a:t>
-            </a:r>
-            <a:endParaRPr lang="fr-FR" dirty="0"/>
-          </a:p>
-        </p:txBody>
-      </p:sp>
-      <p:sp>
-        <p:nvSpPr>
           <p:cNvPr id="4" name="ZoneTexte 3"/>
           <p:cNvSpPr txBox="1"/>
           <p:nvPr/>
@@ -4015,6 +3972,79 @@
                 <a:srgbClr val="FF0000"/>
               </a:solidFill>
             </a:endParaRPr>
+          </a:p>
+        </p:txBody>
+      </p:sp>
+      <p:pic>
+        <p:nvPicPr>
+          <p:cNvPr id="5" name="Image 4"/>
+          <p:cNvPicPr>
+            <a:picLocks noChangeAspect="1"/>
+          </p:cNvPicPr>
+          <p:nvPr/>
+        </p:nvPicPr>
+        <p:blipFill>
+          <a:blip r:embed="rId2">
+            <a:extLst>
+              <a:ext uri="{28A0092B-C50C-407E-A947-70E740481C1C}">
+                <a14:useLocalDpi xmlns:a14="http://schemas.microsoft.com/office/drawing/2010/main" val="0"/>
+              </a:ext>
+            </a:extLst>
+          </a:blip>
+          <a:stretch>
+            <a:fillRect/>
+          </a:stretch>
+        </p:blipFill>
+        <p:spPr>
+          <a:xfrm>
+            <a:off x="801613" y="1229863"/>
+            <a:ext cx="10588773" cy="4398273"/>
+          </a:xfrm>
+          <a:prstGeom prst="rect">
+            <a:avLst/>
+          </a:prstGeom>
+        </p:spPr>
+      </p:pic>
+      <p:sp>
+        <p:nvSpPr>
+          <p:cNvPr id="6" name="ZoneTexte 5"/>
+          <p:cNvSpPr txBox="1"/>
+          <p:nvPr/>
+        </p:nvSpPr>
+        <p:spPr>
+          <a:xfrm>
+            <a:off x="2353732" y="417840"/>
+            <a:ext cx="7484534" cy="523220"/>
+          </a:xfrm>
+          <a:prstGeom prst="rect">
+            <a:avLst/>
+          </a:prstGeom>
+          <a:noFill/>
+        </p:spPr>
+        <p:txBody>
+          <a:bodyPr wrap="square" rtlCol="0">
+            <a:spAutoFit/>
+          </a:bodyPr>
+          <a:lstStyle/>
+          <a:p>
+            <a:pPr algn="ctr"/>
+            <a:r>
+              <a:rPr lang="fr-FR" sz="2800" dirty="0" smtClean="0"/>
+              <a:t>Schéma de la chaine </a:t>
+            </a:r>
+            <a:r>
+              <a:rPr lang="fr-FR" sz="2800" dirty="0" smtClean="0"/>
+              <a:t>de </a:t>
+            </a:r>
+            <a:r>
+              <a:rPr lang="fr-FR" sz="2800" dirty="0" smtClean="0"/>
+              <a:t>segmentation</a:t>
+            </a:r>
+            <a:r>
+              <a:rPr lang="fr-FR" sz="2800" dirty="0" smtClean="0"/>
+              <a:t> de la vidéo</a:t>
+            </a:r>
+            <a:endParaRPr lang="fr-FR" sz="2800" dirty="0"/>
           </a:p>
         </p:txBody>
       </p:sp>
@@ -4048,6 +4078,36 @@
           <a:chExt cx="0" cy="0"/>
         </a:xfrm>
       </p:grpSpPr>
+      <p:pic>
+        <p:nvPicPr>
+          <p:cNvPr id="3" name="Image 2"/>
+          <p:cNvPicPr>
+            <a:picLocks noChangeAspect="1"/>
+          </p:cNvPicPr>
+          <p:nvPr/>
+        </p:nvPicPr>
+        <p:blipFill>
+          <a:blip r:embed="rId2">
+            <a:extLst>
+              <a:ext uri="{28A0092B-C50C-407E-A947-70E740481C1C}">
+                <a14:useLocalDpi xmlns:a14="http://schemas.microsoft.com/office/drawing/2010/main" val="0"/>
+              </a:ext>
+            </a:extLst>
+          </a:blip>
+          <a:stretch>
+            <a:fillRect/>
+          </a:stretch>
+        </p:blipFill>
+        <p:spPr>
+          <a:xfrm>
+            <a:off x="801613" y="1229863"/>
+            <a:ext cx="10588773" cy="4398273"/>
+          </a:xfrm>
+          <a:prstGeom prst="rect">
+            <a:avLst/>
+          </a:prstGeom>
+        </p:spPr>
+      </p:pic>
       <p:sp>
         <p:nvSpPr>
           <p:cNvPr id="2" name="Espace réservé du numéro de diapositive 1"/>
@@ -4066,6 +4126,304 @@
             <a:fld id="{E4F67F9A-838C-4734-8EB0-754A37D9A5A7}" type="slidenum">
               <a:rPr lang="fr-FR" smtClean="0"/>
               <a:t>13</a:t>
+            </a:fld>
+            <a:endParaRPr lang="fr-FR"/>
+          </a:p>
+        </p:txBody>
+      </p:sp>
+      <p:sp>
+        <p:nvSpPr>
+          <p:cNvPr id="4" name="ZoneTexte 3"/>
+          <p:cNvSpPr txBox="1"/>
+          <p:nvPr/>
+        </p:nvSpPr>
+        <p:spPr>
+          <a:xfrm>
+            <a:off x="-1" y="0"/>
+            <a:ext cx="1532467" cy="307777"/>
+          </a:xfrm>
+          <a:prstGeom prst="rect">
+            <a:avLst/>
+          </a:prstGeom>
+          <a:noFill/>
+        </p:spPr>
+        <p:txBody>
+          <a:bodyPr wrap="square" rtlCol="0">
+            <a:spAutoFit/>
+          </a:bodyPr>
+          <a:lstStyle/>
+          <a:p>
+            <a:r>
+              <a:rPr lang="fr-FR" sz="1400" dirty="0" smtClean="0">
+                <a:solidFill>
+                  <a:srgbClr val="FF0000"/>
+                </a:solidFill>
+              </a:rPr>
+              <a:t>Développement 2</a:t>
+            </a:r>
+            <a:endParaRPr lang="fr-FR" sz="1400" dirty="0">
+              <a:solidFill>
+                <a:srgbClr val="FF0000"/>
+              </a:solidFill>
+            </a:endParaRPr>
+          </a:p>
+        </p:txBody>
+      </p:sp>
+      <p:sp>
+        <p:nvSpPr>
+          <p:cNvPr id="6" name="ZoneTexte 5"/>
+          <p:cNvSpPr txBox="1"/>
+          <p:nvPr/>
+        </p:nvSpPr>
+        <p:spPr>
+          <a:xfrm>
+            <a:off x="2353732" y="417840"/>
+            <a:ext cx="7484534" cy="523220"/>
+          </a:xfrm>
+          <a:prstGeom prst="rect">
+            <a:avLst/>
+          </a:prstGeom>
+          <a:noFill/>
+        </p:spPr>
+        <p:txBody>
+          <a:bodyPr wrap="square" rtlCol="0">
+            <a:spAutoFit/>
+          </a:bodyPr>
+          <a:lstStyle/>
+          <a:p>
+            <a:pPr algn="ctr"/>
+            <a:r>
+              <a:rPr lang="fr-FR" sz="2800" dirty="0" smtClean="0"/>
+              <a:t>Schéma de la chaine </a:t>
+            </a:r>
+            <a:r>
+              <a:rPr lang="fr-FR" sz="2800" dirty="0" smtClean="0"/>
+              <a:t>de </a:t>
+            </a:r>
+            <a:r>
+              <a:rPr lang="fr-FR" sz="2800" dirty="0" smtClean="0"/>
+              <a:t>segmentation</a:t>
+            </a:r>
+            <a:r>
+              <a:rPr lang="fr-FR" sz="2800" dirty="0" smtClean="0"/>
+              <a:t> de la vidéo</a:t>
+            </a:r>
+            <a:endParaRPr lang="fr-FR" sz="2800" dirty="0"/>
+          </a:p>
+        </p:txBody>
+      </p:sp>
+    </p:spTree>
+    <p:extLst>
+      <p:ext uri="{BB962C8B-B14F-4D97-AF65-F5344CB8AC3E}">
+        <p14:creationId xmlns:p14="http://schemas.microsoft.com/office/powerpoint/2010/main" val="332650584"/>
+      </p:ext>
+    </p:extLst>
+  </p:cSld>
+  <p:clrMapOvr>
+    <a:masterClrMapping/>
+  </p:clrMapOvr>
+</p:sld>
+</file>
+
+<file path=ppt/slides/slide14.xml><?xml version="1.0" encoding="utf-8"?>
+<p:sld xmlns:a="http://schemas.openxmlformats.org/drawingml/2006/main" xmlns:r="http://schemas.openxmlformats.org/officeDocument/2006/relationships" xmlns:p="http://schemas.openxmlformats.org/presentationml/2006/main">
+  <p:cSld>
+    <p:spTree>
+      <p:nvGrpSpPr>
+        <p:cNvPr id="1" name=""/>
+        <p:cNvGrpSpPr/>
+        <p:nvPr/>
+      </p:nvGrpSpPr>
+      <p:grpSpPr>
+        <a:xfrm>
+          <a:off x="0" y="0"/>
+          <a:ext cx="0" cy="0"/>
+          <a:chOff x="0" y="0"/>
+          <a:chExt cx="0" cy="0"/>
+        </a:xfrm>
+      </p:grpSpPr>
+      <p:pic>
+        <p:nvPicPr>
+          <p:cNvPr id="3" name="Image 2"/>
+          <p:cNvPicPr>
+            <a:picLocks noChangeAspect="1"/>
+          </p:cNvPicPr>
+          <p:nvPr/>
+        </p:nvPicPr>
+        <p:blipFill>
+          <a:blip r:embed="rId2">
+            <a:extLst>
+              <a:ext uri="{28A0092B-C50C-407E-A947-70E740481C1C}">
+                <a14:useLocalDpi xmlns:a14="http://schemas.microsoft.com/office/drawing/2010/main" val="0"/>
+              </a:ext>
+            </a:extLst>
+          </a:blip>
+          <a:stretch>
+            <a:fillRect/>
+          </a:stretch>
+        </p:blipFill>
+        <p:spPr>
+          <a:xfrm>
+            <a:off x="801613" y="1229863"/>
+            <a:ext cx="10588773" cy="4398273"/>
+          </a:xfrm>
+          <a:prstGeom prst="rect">
+            <a:avLst/>
+          </a:prstGeom>
+        </p:spPr>
+      </p:pic>
+      <p:sp>
+        <p:nvSpPr>
+          <p:cNvPr id="2" name="Espace réservé du numéro de diapositive 1"/>
+          <p:cNvSpPr>
+            <a:spLocks noGrp="1"/>
+          </p:cNvSpPr>
+          <p:nvPr>
+            <p:ph type="sldNum" sz="quarter" idx="12"/>
+          </p:nvPr>
+        </p:nvSpPr>
+        <p:spPr/>
+        <p:txBody>
+          <a:bodyPr/>
+          <a:lstStyle/>
+          <a:p>
+            <a:fld id="{E4F67F9A-838C-4734-8EB0-754A37D9A5A7}" type="slidenum">
+              <a:rPr lang="fr-FR" smtClean="0"/>
+              <a:t>14</a:t>
+            </a:fld>
+            <a:endParaRPr lang="fr-FR"/>
+          </a:p>
+        </p:txBody>
+      </p:sp>
+      <p:sp>
+        <p:nvSpPr>
+          <p:cNvPr id="4" name="ZoneTexte 3"/>
+          <p:cNvSpPr txBox="1"/>
+          <p:nvPr/>
+        </p:nvSpPr>
+        <p:spPr>
+          <a:xfrm>
+            <a:off x="-1" y="0"/>
+            <a:ext cx="1532467" cy="307777"/>
+          </a:xfrm>
+          <a:prstGeom prst="rect">
+            <a:avLst/>
+          </a:prstGeom>
+          <a:noFill/>
+        </p:spPr>
+        <p:txBody>
+          <a:bodyPr wrap="square" rtlCol="0">
+            <a:spAutoFit/>
+          </a:bodyPr>
+          <a:lstStyle/>
+          <a:p>
+            <a:r>
+              <a:rPr lang="fr-FR" sz="1400" dirty="0" smtClean="0">
+                <a:solidFill>
+                  <a:srgbClr val="FF0000"/>
+                </a:solidFill>
+              </a:rPr>
+              <a:t>Développement 2</a:t>
+            </a:r>
+            <a:endParaRPr lang="fr-FR" sz="1400" dirty="0">
+              <a:solidFill>
+                <a:srgbClr val="FF0000"/>
+              </a:solidFill>
+            </a:endParaRPr>
+          </a:p>
+        </p:txBody>
+      </p:sp>
+      <p:sp>
+        <p:nvSpPr>
+          <p:cNvPr id="6" name="ZoneTexte 5"/>
+          <p:cNvSpPr txBox="1"/>
+          <p:nvPr/>
+        </p:nvSpPr>
+        <p:spPr>
+          <a:xfrm>
+            <a:off x="2353732" y="417840"/>
+            <a:ext cx="7484534" cy="523220"/>
+          </a:xfrm>
+          <a:prstGeom prst="rect">
+            <a:avLst/>
+          </a:prstGeom>
+          <a:noFill/>
+        </p:spPr>
+        <p:txBody>
+          <a:bodyPr wrap="square" rtlCol="0">
+            <a:spAutoFit/>
+          </a:bodyPr>
+          <a:lstStyle/>
+          <a:p>
+            <a:pPr algn="ctr"/>
+            <a:r>
+              <a:rPr lang="fr-FR" sz="2800" dirty="0" smtClean="0"/>
+              <a:t>Schéma de la chaine </a:t>
+            </a:r>
+            <a:r>
+              <a:rPr lang="fr-FR" sz="2800" dirty="0" smtClean="0"/>
+              <a:t>de </a:t>
+            </a:r>
+            <a:r>
+              <a:rPr lang="fr-FR" sz="2800" dirty="0" smtClean="0"/>
+              <a:t>segmentation</a:t>
+            </a:r>
+            <a:r>
+              <a:rPr lang="fr-FR" sz="2800" dirty="0" smtClean="0"/>
+              <a:t> de la vidéo</a:t>
+            </a:r>
+            <a:endParaRPr lang="fr-FR" sz="2800" dirty="0"/>
+          </a:p>
+        </p:txBody>
+      </p:sp>
+    </p:spTree>
+    <p:extLst>
+      <p:ext uri="{BB962C8B-B14F-4D97-AF65-F5344CB8AC3E}">
+        <p14:creationId xmlns:p14="http://schemas.microsoft.com/office/powerpoint/2010/main" val="3311244350"/>
+      </p:ext>
+    </p:extLst>
+  </p:cSld>
+  <p:clrMapOvr>
+    <a:masterClrMapping/>
+  </p:clrMapOvr>
+</p:sld>
+</file>
+
+<file path=ppt/slides/slide15.xml><?xml version="1.0" encoding="utf-8"?>
+<p:sld xmlns:a="http://schemas.openxmlformats.org/drawingml/2006/main" xmlns:r="http://schemas.openxmlformats.org/officeDocument/2006/relationships" xmlns:p="http://schemas.openxmlformats.org/presentationml/2006/main">
+  <p:cSld>
+    <p:spTree>
+      <p:nvGrpSpPr>
+        <p:cNvPr id="1" name=""/>
+        <p:cNvGrpSpPr/>
+        <p:nvPr/>
+      </p:nvGrpSpPr>
+      <p:grpSpPr>
+        <a:xfrm>
+          <a:off x="0" y="0"/>
+          <a:ext cx="0" cy="0"/>
+          <a:chOff x="0" y="0"/>
+          <a:chExt cx="0" cy="0"/>
+        </a:xfrm>
+      </p:grpSpPr>
+      <p:sp>
+        <p:nvSpPr>
+          <p:cNvPr id="2" name="Espace réservé du numéro de diapositive 1"/>
+          <p:cNvSpPr>
+            <a:spLocks noGrp="1"/>
+          </p:cNvSpPr>
+          <p:nvPr>
+            <p:ph type="sldNum" sz="quarter" idx="12"/>
+          </p:nvPr>
+        </p:nvSpPr>
+        <p:spPr/>
+        <p:txBody>
+          <a:bodyPr/>
+          <a:lstStyle/>
+          <a:p>
+            <a:fld id="{E4F67F9A-838C-4734-8EB0-754A37D9A5A7}" type="slidenum">
+              <a:rPr lang="fr-FR" smtClean="0"/>
+              <a:t>15</a:t>
             </a:fld>
             <a:endParaRPr lang="fr-FR"/>
           </a:p>
@@ -4174,262 +4532,6 @@
     <p:extLst>
       <p:ext uri="{BB962C8B-B14F-4D97-AF65-F5344CB8AC3E}">
         <p14:creationId xmlns:p14="http://schemas.microsoft.com/office/powerpoint/2010/main" val="4288963991"/>
-      </p:ext>
-    </p:extLst>
-  </p:cSld>
-  <p:clrMapOvr>
-    <a:masterClrMapping/>
-  </p:clrMapOvr>
-  <p:timing>
-    <p:tnLst>
-      <p:par>
-        <p:cTn id="1" dur="indefinite" restart="never" nodeType="tmRoot"/>
-      </p:par>
-    </p:tnLst>
-  </p:timing>
-</p:sld>
-</file>
-
-<file path=ppt/slides/slide14.xml><?xml version="1.0" encoding="utf-8"?>
-<p:sld xmlns:a="http://schemas.openxmlformats.org/drawingml/2006/main" xmlns:r="http://schemas.openxmlformats.org/officeDocument/2006/relationships" xmlns:p="http://schemas.openxmlformats.org/presentationml/2006/main">
-  <p:cSld>
-    <p:spTree>
-      <p:nvGrpSpPr>
-        <p:cNvPr id="1" name=""/>
-        <p:cNvGrpSpPr/>
-        <p:nvPr/>
-      </p:nvGrpSpPr>
-      <p:grpSpPr>
-        <a:xfrm>
-          <a:off x="0" y="0"/>
-          <a:ext cx="0" cy="0"/>
-          <a:chOff x="0" y="0"/>
-          <a:chExt cx="0" cy="0"/>
-        </a:xfrm>
-      </p:grpSpPr>
-      <p:sp>
-        <p:nvSpPr>
-          <p:cNvPr id="2" name="Espace réservé du numéro de diapositive 1"/>
-          <p:cNvSpPr>
-            <a:spLocks noGrp="1"/>
-          </p:cNvSpPr>
-          <p:nvPr>
-            <p:ph type="sldNum" sz="quarter" idx="12"/>
-          </p:nvPr>
-        </p:nvSpPr>
-        <p:spPr/>
-        <p:txBody>
-          <a:bodyPr/>
-          <a:lstStyle/>
-          <a:p>
-            <a:fld id="{E4F67F9A-838C-4734-8EB0-754A37D9A5A7}" type="slidenum">
-              <a:rPr lang="fr-FR" smtClean="0"/>
-              <a:t>14</a:t>
-            </a:fld>
-            <a:endParaRPr lang="fr-FR"/>
-          </a:p>
-        </p:txBody>
-      </p:sp>
-      <p:sp>
-        <p:nvSpPr>
-          <p:cNvPr id="3" name="ZoneTexte 2"/>
-          <p:cNvSpPr txBox="1"/>
-          <p:nvPr/>
-        </p:nvSpPr>
-        <p:spPr>
-          <a:xfrm>
-            <a:off x="-1" y="0"/>
-            <a:ext cx="1532467" cy="307777"/>
-          </a:xfrm>
-          <a:prstGeom prst="rect">
-            <a:avLst/>
-          </a:prstGeom>
-          <a:noFill/>
-        </p:spPr>
-        <p:txBody>
-          <a:bodyPr wrap="square" rtlCol="0">
-            <a:spAutoFit/>
-          </a:bodyPr>
-          <a:lstStyle/>
-          <a:p>
-            <a:r>
-              <a:rPr lang="fr-FR" sz="1400" dirty="0" smtClean="0">
-                <a:solidFill>
-                  <a:srgbClr val="FF0000"/>
-                </a:solidFill>
-              </a:rPr>
-              <a:t>Développement 4</a:t>
-            </a:r>
-            <a:endParaRPr lang="fr-FR" sz="1400" dirty="0">
-              <a:solidFill>
-                <a:srgbClr val="FF0000"/>
-              </a:solidFill>
-            </a:endParaRPr>
-          </a:p>
-        </p:txBody>
-      </p:sp>
-      <p:sp>
-        <p:nvSpPr>
-          <p:cNvPr id="4" name="Rectangle 3"/>
-          <p:cNvSpPr/>
-          <p:nvPr/>
-        </p:nvSpPr>
-        <p:spPr>
-          <a:xfrm>
-            <a:off x="4973417" y="3244334"/>
-            <a:ext cx="2245166" cy="369332"/>
-          </a:xfrm>
-          <a:prstGeom prst="rect">
-            <a:avLst/>
-          </a:prstGeom>
-        </p:spPr>
-        <p:txBody>
-          <a:bodyPr wrap="none">
-            <a:spAutoFit/>
-          </a:bodyPr>
-          <a:lstStyle/>
-          <a:p>
-            <a:pPr algn="ctr"/>
-            <a:r>
-              <a:rPr lang="fr-FR" dirty="0" smtClean="0"/>
-              <a:t>Problèmes rencontrés</a:t>
-            </a:r>
-            <a:endParaRPr lang="fr-FR" dirty="0"/>
-          </a:p>
-        </p:txBody>
-      </p:sp>
-    </p:spTree>
-    <p:extLst>
-      <p:ext uri="{BB962C8B-B14F-4D97-AF65-F5344CB8AC3E}">
-        <p14:creationId xmlns:p14="http://schemas.microsoft.com/office/powerpoint/2010/main" val="2442421539"/>
-      </p:ext>
-    </p:extLst>
-  </p:cSld>
-  <p:clrMapOvr>
-    <a:masterClrMapping/>
-  </p:clrMapOvr>
-  <p:timing>
-    <p:tnLst>
-      <p:par>
-        <p:cTn id="1" dur="indefinite" restart="never" nodeType="tmRoot"/>
-      </p:par>
-    </p:tnLst>
-  </p:timing>
-</p:sld>
-</file>
-
-<file path=ppt/slides/slide15.xml><?xml version="1.0" encoding="utf-8"?>
-<p:sld xmlns:a="http://schemas.openxmlformats.org/drawingml/2006/main" xmlns:r="http://schemas.openxmlformats.org/officeDocument/2006/relationships" xmlns:p="http://schemas.openxmlformats.org/presentationml/2006/main">
-  <p:cSld>
-    <p:spTree>
-      <p:nvGrpSpPr>
-        <p:cNvPr id="1" name=""/>
-        <p:cNvGrpSpPr/>
-        <p:nvPr/>
-      </p:nvGrpSpPr>
-      <p:grpSpPr>
-        <a:xfrm>
-          <a:off x="0" y="0"/>
-          <a:ext cx="0" cy="0"/>
-          <a:chOff x="0" y="0"/>
-          <a:chExt cx="0" cy="0"/>
-        </a:xfrm>
-      </p:grpSpPr>
-      <p:sp>
-        <p:nvSpPr>
-          <p:cNvPr id="2" name="Espace réservé du numéro de diapositive 1"/>
-          <p:cNvSpPr>
-            <a:spLocks noGrp="1"/>
-          </p:cNvSpPr>
-          <p:nvPr>
-            <p:ph type="sldNum" sz="quarter" idx="12"/>
-          </p:nvPr>
-        </p:nvSpPr>
-        <p:spPr/>
-        <p:txBody>
-          <a:bodyPr/>
-          <a:lstStyle/>
-          <a:p>
-            <a:fld id="{E4F67F9A-838C-4734-8EB0-754A37D9A5A7}" type="slidenum">
-              <a:rPr lang="fr-FR" smtClean="0"/>
-              <a:t>15</a:t>
-            </a:fld>
-            <a:endParaRPr lang="fr-FR"/>
-          </a:p>
-        </p:txBody>
-      </p:sp>
-      <p:sp>
-        <p:nvSpPr>
-          <p:cNvPr id="3" name="ZoneTexte 2"/>
-          <p:cNvSpPr txBox="1"/>
-          <p:nvPr/>
-        </p:nvSpPr>
-        <p:spPr>
-          <a:xfrm>
-            <a:off x="-1" y="0"/>
-            <a:ext cx="1532467" cy="307777"/>
-          </a:xfrm>
-          <a:prstGeom prst="rect">
-            <a:avLst/>
-          </a:prstGeom>
-          <a:noFill/>
-        </p:spPr>
-        <p:txBody>
-          <a:bodyPr wrap="square" rtlCol="0">
-            <a:spAutoFit/>
-          </a:bodyPr>
-          <a:lstStyle/>
-          <a:p>
-            <a:r>
-              <a:rPr lang="fr-FR" sz="1400" dirty="0" smtClean="0">
-                <a:solidFill>
-                  <a:srgbClr val="FF0000"/>
-                </a:solidFill>
-              </a:rPr>
-              <a:t>Développement 4</a:t>
-            </a:r>
-            <a:endParaRPr lang="fr-FR" sz="1400" dirty="0">
-              <a:solidFill>
-                <a:srgbClr val="FF0000"/>
-              </a:solidFill>
-            </a:endParaRPr>
-          </a:p>
-        </p:txBody>
-      </p:sp>
-      <p:sp>
-        <p:nvSpPr>
-          <p:cNvPr id="4" name="Rectangle 3"/>
-          <p:cNvSpPr/>
-          <p:nvPr/>
-        </p:nvSpPr>
-        <p:spPr>
-          <a:xfrm>
-            <a:off x="4973417" y="3244334"/>
-            <a:ext cx="2245166" cy="369332"/>
-          </a:xfrm>
-          <a:prstGeom prst="rect">
-            <a:avLst/>
-          </a:prstGeom>
-        </p:spPr>
-        <p:txBody>
-          <a:bodyPr wrap="none">
-            <a:spAutoFit/>
-          </a:bodyPr>
-          <a:lstStyle/>
-          <a:p>
-            <a:pPr algn="ctr"/>
-            <a:r>
-              <a:rPr lang="fr-FR" dirty="0" smtClean="0"/>
-              <a:t>Problèmes rencontrés</a:t>
-            </a:r>
-            <a:endParaRPr lang="fr-FR" dirty="0"/>
-          </a:p>
-        </p:txBody>
-      </p:sp>
-    </p:spTree>
-    <p:extLst>
-      <p:ext uri="{BB962C8B-B14F-4D97-AF65-F5344CB8AC3E}">
-        <p14:creationId xmlns:p14="http://schemas.microsoft.com/office/powerpoint/2010/main" val="871201483"/>
       </p:ext>
     </p:extLst>
   </p:cSld>
@@ -4495,7 +4597,7 @@
         <p:spPr>
           <a:xfrm>
             <a:off x="-1" y="0"/>
-            <a:ext cx="1854201" cy="307777"/>
+            <a:ext cx="1532467" cy="307777"/>
           </a:xfrm>
           <a:prstGeom prst="rect">
             <a:avLst/>
@@ -4514,7 +4616,7 @@
                   <a:srgbClr val="FF0000"/>
                 </a:solidFill>
               </a:rPr>
-              <a:t>Vidéo démonstration</a:t>
+              <a:t>Développement 4</a:t>
             </a:r>
             <a:endParaRPr lang="fr-FR" sz="1400" dirty="0">
               <a:solidFill>
@@ -4532,8 +4634,8 @@
         </p:nvSpPr>
         <p:spPr>
           <a:xfrm>
-            <a:off x="5543220" y="3167390"/>
-            <a:ext cx="1105559" cy="523220"/>
+            <a:off x="4973417" y="3244334"/>
+            <a:ext cx="2245166" cy="369332"/>
           </a:xfrm>
           <a:prstGeom prst="rect">
             <a:avLst/>
@@ -4545,24 +4647,32 @@
           </a:bodyPr>
           <a:lstStyle/>
           <a:p>
-            <a:r>
-              <a:rPr lang="fr-FR" sz="2800" dirty="0" smtClean="0"/>
-              <a:t>VIDEO</a:t>
-            </a:r>
-            <a:endParaRPr lang="fr-FR" sz="2800" dirty="0"/>
+            <a:pPr algn="ctr"/>
+            <a:r>
+              <a:rPr lang="fr-FR" dirty="0" smtClean="0"/>
+              <a:t>Problèmes rencontrés</a:t>
+            </a:r>
+            <a:endParaRPr lang="fr-FR" dirty="0"/>
           </a:p>
         </p:txBody>
       </p:sp>
     </p:spTree>
     <p:extLst>
       <p:ext uri="{BB962C8B-B14F-4D97-AF65-F5344CB8AC3E}">
-        <p14:creationId xmlns:p14="http://schemas.microsoft.com/office/powerpoint/2010/main" val="3655151742"/>
+        <p14:creationId xmlns:p14="http://schemas.microsoft.com/office/powerpoint/2010/main" val="2442421539"/>
       </p:ext>
     </p:extLst>
   </p:cSld>
   <p:clrMapOvr>
     <a:masterClrMapping/>
   </p:clrMapOvr>
+  <p:timing>
+    <p:tnLst>
+      <p:par>
+        <p:cTn id="1" dur="indefinite" restart="never" nodeType="tmRoot"/>
+      </p:par>
+    </p:tnLst>
+  </p:timing>
 </p:sld>
 </file>
 
@@ -4634,7 +4744,7 @@
                   <a:srgbClr val="FF0000"/>
                 </a:solidFill>
               </a:rPr>
-              <a:t>Développement 5</a:t>
+              <a:t>Développement 4</a:t>
             </a:r>
             <a:endParaRPr lang="fr-FR" sz="1400" dirty="0">
               <a:solidFill>
@@ -4652,8 +4762,8 @@
         </p:nvSpPr>
         <p:spPr>
           <a:xfrm>
-            <a:off x="2461383" y="3244334"/>
-            <a:ext cx="7269234" cy="369332"/>
+            <a:off x="4973417" y="3244334"/>
+            <a:ext cx="2245166" cy="369332"/>
           </a:xfrm>
           <a:prstGeom prst="rect">
             <a:avLst/>
@@ -4668,7 +4778,7 @@
             <a:pPr algn="ctr"/>
             <a:r>
               <a:rPr lang="fr-FR" dirty="0" smtClean="0"/>
-              <a:t>Peut être un slide de trop ou alors a rajouter pour les problèmes rencontrés</a:t>
+              <a:t>Problèmes rencontrés</a:t>
             </a:r>
             <a:endParaRPr lang="fr-FR" dirty="0"/>
           </a:p>
@@ -4677,7 +4787,7 @@
     </p:spTree>
     <p:extLst>
       <p:ext uri="{BB962C8B-B14F-4D97-AF65-F5344CB8AC3E}">
-        <p14:creationId xmlns:p14="http://schemas.microsoft.com/office/powerpoint/2010/main" val="122085997"/>
+        <p14:creationId xmlns:p14="http://schemas.microsoft.com/office/powerpoint/2010/main" val="871201483"/>
       </p:ext>
     </p:extLst>
   </p:cSld>
@@ -4697,6 +4807,16 @@
 <file path=ppt/slides/slide18.xml><?xml version="1.0" encoding="utf-8"?>
 <p:sld xmlns:a="http://schemas.openxmlformats.org/drawingml/2006/main" xmlns:r="http://schemas.openxmlformats.org/officeDocument/2006/relationships" xmlns:p="http://schemas.openxmlformats.org/presentationml/2006/main">
   <p:cSld>
+    <p:bg>
+      <p:bgPr>
+        <a:solidFill>
+          <a:schemeClr val="bg2">
+            <a:lumMod val="50000"/>
+          </a:schemeClr>
+        </a:solidFill>
+        <a:effectLst/>
+      </p:bgPr>
+    </p:bg>
     <p:spTree>
       <p:nvGrpSpPr>
         <p:cNvPr id="1" name=""/>
@@ -4743,7 +4863,7 @@
         <p:spPr>
           <a:xfrm>
             <a:off x="-1" y="0"/>
-            <a:ext cx="1532467" cy="307777"/>
+            <a:ext cx="1854201" cy="307777"/>
           </a:xfrm>
           <a:prstGeom prst="rect">
             <a:avLst/>
@@ -4762,7 +4882,7 @@
                   <a:srgbClr val="FF0000"/>
                 </a:solidFill>
               </a:rPr>
-              <a:t>Conclusion</a:t>
+              <a:t>Vidéo démonstration</a:t>
             </a:r>
             <a:endParaRPr lang="fr-FR" sz="1400" dirty="0">
               <a:solidFill>
@@ -4774,14 +4894,14 @@
       </p:sp>
       <p:sp>
         <p:nvSpPr>
-          <p:cNvPr id="6" name="Rectangle 5"/>
+          <p:cNvPr id="4" name="Rectangle 3"/>
           <p:cNvSpPr/>
           <p:nvPr/>
         </p:nvSpPr>
         <p:spPr>
           <a:xfrm>
-            <a:off x="5314443" y="3244334"/>
-            <a:ext cx="1563120" cy="369332"/>
+            <a:off x="5543220" y="3167390"/>
+            <a:ext cx="1105559" cy="523220"/>
           </a:xfrm>
           <a:prstGeom prst="rect">
             <a:avLst/>
@@ -4793,32 +4913,24 @@
           </a:bodyPr>
           <a:lstStyle/>
           <a:p>
-            <a:pPr algn="ctr"/>
-            <a:r>
-              <a:rPr lang="fr-FR" dirty="0" smtClean="0"/>
-              <a:t>Bilan du projet</a:t>
-            </a:r>
-            <a:endParaRPr lang="fr-FR" dirty="0"/>
+            <a:r>
+              <a:rPr lang="fr-FR" sz="2800" dirty="0" smtClean="0"/>
+              <a:t>VIDEO</a:t>
+            </a:r>
+            <a:endParaRPr lang="fr-FR" sz="2800" dirty="0"/>
           </a:p>
         </p:txBody>
       </p:sp>
     </p:spTree>
     <p:extLst>
       <p:ext uri="{BB962C8B-B14F-4D97-AF65-F5344CB8AC3E}">
-        <p14:creationId xmlns:p14="http://schemas.microsoft.com/office/powerpoint/2010/main" val="3231713206"/>
+        <p14:creationId xmlns:p14="http://schemas.microsoft.com/office/powerpoint/2010/main" val="3655151742"/>
       </p:ext>
     </p:extLst>
   </p:cSld>
   <p:clrMapOvr>
     <a:masterClrMapping/>
   </p:clrMapOvr>
-  <p:timing>
-    <p:tnLst>
-      <p:par>
-        <p:cTn id="1" dur="indefinite" restart="never" nodeType="tmRoot"/>
-      </p:par>
-    </p:tnLst>
-  </p:timing>
 </p:sld>
 </file>
 
@@ -4890,7 +5002,7 @@
                   <a:srgbClr val="FF0000"/>
                 </a:solidFill>
               </a:rPr>
-              <a:t>Merci</a:t>
+              <a:t>Développement 5</a:t>
             </a:r>
             <a:endParaRPr lang="fr-FR" sz="1400" dirty="0">
               <a:solidFill>
@@ -4908,8 +5020,8 @@
         </p:nvSpPr>
         <p:spPr>
           <a:xfrm>
-            <a:off x="5525940" y="3167390"/>
-            <a:ext cx="1140120" cy="523220"/>
+            <a:off x="2461383" y="3244334"/>
+            <a:ext cx="7269234" cy="369332"/>
           </a:xfrm>
           <a:prstGeom prst="rect">
             <a:avLst/>
@@ -4923,17 +5035,17 @@
           <a:p>
             <a:pPr algn="ctr"/>
             <a:r>
-              <a:rPr lang="fr-FR" sz="2800" dirty="0" smtClean="0"/>
-              <a:t>MERCI</a:t>
-            </a:r>
-            <a:endParaRPr lang="fr-FR" sz="2800" dirty="0"/>
+              <a:rPr lang="fr-FR" dirty="0" smtClean="0"/>
+              <a:t>Peut être un slide de trop ou alors a rajouter pour les problèmes rencontrés</a:t>
+            </a:r>
+            <a:endParaRPr lang="fr-FR" dirty="0"/>
           </a:p>
         </p:txBody>
       </p:sp>
     </p:spTree>
     <p:extLst>
       <p:ext uri="{BB962C8B-B14F-4D97-AF65-F5344CB8AC3E}">
-        <p14:creationId xmlns:p14="http://schemas.microsoft.com/office/powerpoint/2010/main" val="3670161884"/>
+        <p14:creationId xmlns:p14="http://schemas.microsoft.com/office/powerpoint/2010/main" val="122085997"/>
       </p:ext>
     </p:extLst>
   </p:cSld>
@@ -5053,15 +5165,7 @@
             <a:pPr algn="ctr"/>
             <a:r>
               <a:rPr lang="fr-FR" dirty="0" smtClean="0"/>
-              <a:t>Définir les </a:t>
-            </a:r>
-            <a:r>
-              <a:rPr lang="fr-FR" dirty="0" smtClean="0"/>
-              <a:t>mots </a:t>
-            </a:r>
-            <a:r>
-              <a:rPr lang="fr-FR" dirty="0" smtClean="0"/>
-              <a:t>clés</a:t>
+              <a:t>Définir les mots clés</a:t>
             </a:r>
             <a:endParaRPr lang="fr-FR" dirty="0"/>
           </a:p>
@@ -5071,6 +5175,262 @@
     <p:extLst>
       <p:ext uri="{BB962C8B-B14F-4D97-AF65-F5344CB8AC3E}">
         <p14:creationId xmlns:p14="http://schemas.microsoft.com/office/powerpoint/2010/main" val="1930118938"/>
+      </p:ext>
+    </p:extLst>
+  </p:cSld>
+  <p:clrMapOvr>
+    <a:masterClrMapping/>
+  </p:clrMapOvr>
+  <p:timing>
+    <p:tnLst>
+      <p:par>
+        <p:cTn id="1" dur="indefinite" restart="never" nodeType="tmRoot"/>
+      </p:par>
+    </p:tnLst>
+  </p:timing>
+</p:sld>
+</file>
+
+<file path=ppt/slides/slide20.xml><?xml version="1.0" encoding="utf-8"?>
+<p:sld xmlns:a="http://schemas.openxmlformats.org/drawingml/2006/main" xmlns:r="http://schemas.openxmlformats.org/officeDocument/2006/relationships" xmlns:p="http://schemas.openxmlformats.org/presentationml/2006/main">
+  <p:cSld>
+    <p:spTree>
+      <p:nvGrpSpPr>
+        <p:cNvPr id="1" name=""/>
+        <p:cNvGrpSpPr/>
+        <p:nvPr/>
+      </p:nvGrpSpPr>
+      <p:grpSpPr>
+        <a:xfrm>
+          <a:off x="0" y="0"/>
+          <a:ext cx="0" cy="0"/>
+          <a:chOff x="0" y="0"/>
+          <a:chExt cx="0" cy="0"/>
+        </a:xfrm>
+      </p:grpSpPr>
+      <p:sp>
+        <p:nvSpPr>
+          <p:cNvPr id="2" name="Espace réservé du numéro de diapositive 1"/>
+          <p:cNvSpPr>
+            <a:spLocks noGrp="1"/>
+          </p:cNvSpPr>
+          <p:nvPr>
+            <p:ph type="sldNum" sz="quarter" idx="12"/>
+          </p:nvPr>
+        </p:nvSpPr>
+        <p:spPr/>
+        <p:txBody>
+          <a:bodyPr/>
+          <a:lstStyle/>
+          <a:p>
+            <a:fld id="{E4F67F9A-838C-4734-8EB0-754A37D9A5A7}" type="slidenum">
+              <a:rPr lang="fr-FR" smtClean="0"/>
+              <a:t>20</a:t>
+            </a:fld>
+            <a:endParaRPr lang="fr-FR"/>
+          </a:p>
+        </p:txBody>
+      </p:sp>
+      <p:sp>
+        <p:nvSpPr>
+          <p:cNvPr id="3" name="ZoneTexte 2"/>
+          <p:cNvSpPr txBox="1"/>
+          <p:nvPr/>
+        </p:nvSpPr>
+        <p:spPr>
+          <a:xfrm>
+            <a:off x="-1" y="0"/>
+            <a:ext cx="1532467" cy="307777"/>
+          </a:xfrm>
+          <a:prstGeom prst="rect">
+            <a:avLst/>
+          </a:prstGeom>
+          <a:noFill/>
+        </p:spPr>
+        <p:txBody>
+          <a:bodyPr wrap="square" rtlCol="0">
+            <a:spAutoFit/>
+          </a:bodyPr>
+          <a:lstStyle/>
+          <a:p>
+            <a:r>
+              <a:rPr lang="fr-FR" sz="1400" dirty="0" smtClean="0">
+                <a:solidFill>
+                  <a:srgbClr val="FF0000"/>
+                </a:solidFill>
+              </a:rPr>
+              <a:t>Conclusion</a:t>
+            </a:r>
+            <a:endParaRPr lang="fr-FR" sz="1400" dirty="0">
+              <a:solidFill>
+                <a:srgbClr val="FF0000"/>
+              </a:solidFill>
+            </a:endParaRPr>
+          </a:p>
+        </p:txBody>
+      </p:sp>
+      <p:sp>
+        <p:nvSpPr>
+          <p:cNvPr id="6" name="Rectangle 5"/>
+          <p:cNvSpPr/>
+          <p:nvPr/>
+        </p:nvSpPr>
+        <p:spPr>
+          <a:xfrm>
+            <a:off x="5314443" y="3244334"/>
+            <a:ext cx="1563120" cy="369332"/>
+          </a:xfrm>
+          <a:prstGeom prst="rect">
+            <a:avLst/>
+          </a:prstGeom>
+        </p:spPr>
+        <p:txBody>
+          <a:bodyPr wrap="none">
+            <a:spAutoFit/>
+          </a:bodyPr>
+          <a:lstStyle/>
+          <a:p>
+            <a:pPr algn="ctr"/>
+            <a:r>
+              <a:rPr lang="fr-FR" dirty="0" smtClean="0"/>
+              <a:t>Bilan du projet</a:t>
+            </a:r>
+            <a:endParaRPr lang="fr-FR" dirty="0"/>
+          </a:p>
+        </p:txBody>
+      </p:sp>
+    </p:spTree>
+    <p:extLst>
+      <p:ext uri="{BB962C8B-B14F-4D97-AF65-F5344CB8AC3E}">
+        <p14:creationId xmlns:p14="http://schemas.microsoft.com/office/powerpoint/2010/main" val="3231713206"/>
+      </p:ext>
+    </p:extLst>
+  </p:cSld>
+  <p:clrMapOvr>
+    <a:masterClrMapping/>
+  </p:clrMapOvr>
+  <p:timing>
+    <p:tnLst>
+      <p:par>
+        <p:cTn id="1" dur="indefinite" restart="never" nodeType="tmRoot"/>
+      </p:par>
+    </p:tnLst>
+  </p:timing>
+</p:sld>
+</file>
+
+<file path=ppt/slides/slide21.xml><?xml version="1.0" encoding="utf-8"?>
+<p:sld xmlns:a="http://schemas.openxmlformats.org/drawingml/2006/main" xmlns:r="http://schemas.openxmlformats.org/officeDocument/2006/relationships" xmlns:p="http://schemas.openxmlformats.org/presentationml/2006/main">
+  <p:cSld>
+    <p:spTree>
+      <p:nvGrpSpPr>
+        <p:cNvPr id="1" name=""/>
+        <p:cNvGrpSpPr/>
+        <p:nvPr/>
+      </p:nvGrpSpPr>
+      <p:grpSpPr>
+        <a:xfrm>
+          <a:off x="0" y="0"/>
+          <a:ext cx="0" cy="0"/>
+          <a:chOff x="0" y="0"/>
+          <a:chExt cx="0" cy="0"/>
+        </a:xfrm>
+      </p:grpSpPr>
+      <p:sp>
+        <p:nvSpPr>
+          <p:cNvPr id="2" name="Espace réservé du numéro de diapositive 1"/>
+          <p:cNvSpPr>
+            <a:spLocks noGrp="1"/>
+          </p:cNvSpPr>
+          <p:nvPr>
+            <p:ph type="sldNum" sz="quarter" idx="12"/>
+          </p:nvPr>
+        </p:nvSpPr>
+        <p:spPr/>
+        <p:txBody>
+          <a:bodyPr/>
+          <a:lstStyle/>
+          <a:p>
+            <a:fld id="{E4F67F9A-838C-4734-8EB0-754A37D9A5A7}" type="slidenum">
+              <a:rPr lang="fr-FR" smtClean="0"/>
+              <a:t>21</a:t>
+            </a:fld>
+            <a:endParaRPr lang="fr-FR"/>
+          </a:p>
+        </p:txBody>
+      </p:sp>
+      <p:sp>
+        <p:nvSpPr>
+          <p:cNvPr id="3" name="ZoneTexte 2"/>
+          <p:cNvSpPr txBox="1"/>
+          <p:nvPr/>
+        </p:nvSpPr>
+        <p:spPr>
+          <a:xfrm>
+            <a:off x="-1" y="0"/>
+            <a:ext cx="1532467" cy="307777"/>
+          </a:xfrm>
+          <a:prstGeom prst="rect">
+            <a:avLst/>
+          </a:prstGeom>
+          <a:noFill/>
+        </p:spPr>
+        <p:txBody>
+          <a:bodyPr wrap="square" rtlCol="0">
+            <a:spAutoFit/>
+          </a:bodyPr>
+          <a:lstStyle/>
+          <a:p>
+            <a:r>
+              <a:rPr lang="fr-FR" sz="1400" dirty="0" smtClean="0">
+                <a:solidFill>
+                  <a:srgbClr val="FF0000"/>
+                </a:solidFill>
+              </a:rPr>
+              <a:t>Merci</a:t>
+            </a:r>
+            <a:endParaRPr lang="fr-FR" sz="1400" dirty="0">
+              <a:solidFill>
+                <a:srgbClr val="FF0000"/>
+              </a:solidFill>
+            </a:endParaRPr>
+          </a:p>
+        </p:txBody>
+      </p:sp>
+      <p:sp>
+        <p:nvSpPr>
+          <p:cNvPr id="4" name="Rectangle 3"/>
+          <p:cNvSpPr/>
+          <p:nvPr/>
+        </p:nvSpPr>
+        <p:spPr>
+          <a:xfrm>
+            <a:off x="5525940" y="3167390"/>
+            <a:ext cx="1140120" cy="523220"/>
+          </a:xfrm>
+          <a:prstGeom prst="rect">
+            <a:avLst/>
+          </a:prstGeom>
+        </p:spPr>
+        <p:txBody>
+          <a:bodyPr wrap="none">
+            <a:spAutoFit/>
+          </a:bodyPr>
+          <a:lstStyle/>
+          <a:p>
+            <a:pPr algn="ctr"/>
+            <a:r>
+              <a:rPr lang="fr-FR" sz="2800" dirty="0" smtClean="0"/>
+              <a:t>MERCI</a:t>
+            </a:r>
+            <a:endParaRPr lang="fr-FR" sz="2800" dirty="0"/>
+          </a:p>
+        </p:txBody>
+      </p:sp>
+    </p:spTree>
+    <p:extLst>
+      <p:ext uri="{BB962C8B-B14F-4D97-AF65-F5344CB8AC3E}">
+        <p14:creationId xmlns:p14="http://schemas.microsoft.com/office/powerpoint/2010/main" val="3670161884"/>
       </p:ext>
     </p:extLst>
   </p:cSld>
@@ -5190,15 +5550,7 @@
             <a:pPr algn="ctr"/>
             <a:r>
               <a:rPr lang="fr-FR" dirty="0" smtClean="0"/>
-              <a:t>Définir les </a:t>
-            </a:r>
-            <a:r>
-              <a:rPr lang="fr-FR" dirty="0" smtClean="0"/>
-              <a:t>mots </a:t>
-            </a:r>
-            <a:r>
-              <a:rPr lang="fr-FR" dirty="0" smtClean="0"/>
-              <a:t>clés</a:t>
+              <a:t>Définir les mots clés</a:t>
             </a:r>
             <a:endParaRPr lang="fr-FR" dirty="0"/>
           </a:p>
@@ -5327,15 +5679,7 @@
             <a:pPr algn="ctr"/>
             <a:r>
               <a:rPr lang="fr-FR" dirty="0" smtClean="0"/>
-              <a:t>Définir les </a:t>
-            </a:r>
-            <a:r>
-              <a:rPr lang="fr-FR" dirty="0" smtClean="0"/>
-              <a:t>mots </a:t>
-            </a:r>
-            <a:r>
-              <a:rPr lang="fr-FR" dirty="0" smtClean="0"/>
-              <a:t>clés</a:t>
+              <a:t>Définir les mots clés</a:t>
             </a:r>
             <a:endParaRPr lang="fr-FR" dirty="0"/>
           </a:p>
@@ -5577,7 +5921,7 @@
         <p:spPr>
           <a:xfrm>
             <a:off x="3668636" y="3244334"/>
-            <a:ext cx="4854727" cy="369332"/>
+            <a:ext cx="4854727" cy="646331"/>
           </a:xfrm>
           <a:prstGeom prst="rect">
             <a:avLst/>
@@ -5592,8 +5936,24 @@
             <a:pPr algn="ctr"/>
             <a:r>
               <a:rPr lang="fr-FR" dirty="0"/>
-              <a:t>Présentation de la théorie du découpage en tuiles</a:t>
-            </a:r>
+              <a:t>Présentation de la théorie du découpage en </a:t>
+            </a:r>
+            <a:r>
+              <a:rPr lang="fr-FR" dirty="0" smtClean="0"/>
+              <a:t>tuiles</a:t>
+            </a:r>
+          </a:p>
+          <a:p>
+            <a:pPr algn="ctr"/>
+            <a:r>
+              <a:rPr lang="fr-FR" dirty="0" smtClean="0"/>
+              <a:t>(avec </a:t>
+            </a:r>
+            <a:r>
+              <a:rPr lang="fr-FR" smtClean="0"/>
+              <a:t>la bibliographie)</a:t>
+            </a:r>
+            <a:endParaRPr lang="fr-FR" dirty="0"/>
           </a:p>
         </p:txBody>
       </p:sp>
@@ -5704,7 +6064,7 @@
         <p:spPr>
           <a:xfrm>
             <a:off x="3855547" y="3244334"/>
-            <a:ext cx="4480907" cy="369332"/>
+            <a:ext cx="4480907" cy="646331"/>
           </a:xfrm>
           <a:prstGeom prst="rect">
             <a:avLst/>
@@ -5723,7 +6083,18 @@
             </a:r>
             <a:r>
               <a:rPr lang="fr-FR" dirty="0" smtClean="0"/>
-              <a:t>du streaming DASH</a:t>
+              <a:t>du streaming </a:t>
+            </a:r>
+            <a:r>
+              <a:rPr lang="fr-FR" dirty="0" smtClean="0"/>
+              <a:t>DASH</a:t>
+            </a:r>
+          </a:p>
+          <a:p>
+            <a:pPr algn="ctr"/>
+            <a:r>
+              <a:rPr lang="fr-FR" dirty="0" smtClean="0"/>
+              <a:t>(avec la bibliographie)</a:t>
             </a:r>
             <a:endParaRPr lang="fr-FR" dirty="0"/>
           </a:p>
@@ -5836,7 +6207,7 @@
         <p:spPr>
           <a:xfrm>
             <a:off x="3916140" y="3244334"/>
-            <a:ext cx="4359720" cy="369332"/>
+            <a:ext cx="4359719" cy="646331"/>
           </a:xfrm>
           <a:prstGeom prst="rect">
             <a:avLst/>
@@ -5851,7 +6222,18 @@
             <a:pPr algn="ctr"/>
             <a:r>
               <a:rPr lang="fr-FR" dirty="0" smtClean="0"/>
-              <a:t>Schéma de la chaine théorique de streaming</a:t>
+              <a:t>Schéma de la chaine théorique de </a:t>
+            </a:r>
+            <a:r>
+              <a:rPr lang="fr-FR" dirty="0" smtClean="0"/>
+              <a:t>streaming</a:t>
+            </a:r>
+          </a:p>
+          <a:p>
+            <a:pPr algn="ctr"/>
+            <a:r>
+              <a:rPr lang="fr-FR" dirty="0" smtClean="0"/>
+              <a:t>(image de la bibliographie)</a:t>
             </a:r>
             <a:endParaRPr lang="fr-FR" dirty="0"/>
           </a:p>

</xml_diff>

<commit_message>
update slide + backup
</commit_message>
<xml_diff>
--- a/Slides/PRES2019-Projet14-OlivierFourmaux-ROIStreamingImapct-soutenance.pptx
+++ b/Slides/PRES2019-Projet14-OlivierFourmaux-ROIStreamingImapct-soutenance.pptx
@@ -5,7 +5,7 @@
     <p:sldMasterId id="2147483648" r:id="rId1"/>
   </p:sldMasterIdLst>
   <p:notesMasterIdLst>
-    <p:notesMasterId r:id="rId23"/>
+    <p:notesMasterId r:id="rId24"/>
   </p:notesMasterIdLst>
   <p:sldIdLst>
     <p:sldId id="256" r:id="rId2"/>
@@ -23,12 +23,13 @@
     <p:sldId id="275" r:id="rId14"/>
     <p:sldId id="276" r:id="rId15"/>
     <p:sldId id="264" r:id="rId16"/>
-    <p:sldId id="266" r:id="rId17"/>
-    <p:sldId id="268" r:id="rId18"/>
-    <p:sldId id="271" r:id="rId19"/>
-    <p:sldId id="267" r:id="rId20"/>
-    <p:sldId id="269" r:id="rId21"/>
-    <p:sldId id="270" r:id="rId22"/>
+    <p:sldId id="268" r:id="rId17"/>
+    <p:sldId id="266" r:id="rId18"/>
+    <p:sldId id="277" r:id="rId19"/>
+    <p:sldId id="271" r:id="rId20"/>
+    <p:sldId id="267" r:id="rId21"/>
+    <p:sldId id="269" r:id="rId22"/>
+    <p:sldId id="270" r:id="rId23"/>
   </p:sldIdLst>
   <p:sldSz cx="12192000" cy="6858000"/>
   <p:notesSz cx="6858000" cy="9144000"/>
@@ -166,8 +167,9 @@
             <p14:sldId id="275"/>
             <p14:sldId id="276"/>
             <p14:sldId id="264"/>
+            <p14:sldId id="268"/>
             <p14:sldId id="266"/>
-            <p14:sldId id="268"/>
+            <p14:sldId id="277"/>
           </p14:sldIdLst>
         </p14:section>
         <p14:section name="Demonstration" id="{56155059-68A4-4C75-96D6-BFEF409A2169}">
@@ -4652,38 +4654,150 @@
       </p:sp>
       <p:sp>
         <p:nvSpPr>
-          <p:cNvPr id="4" name="Rectangle 3"/>
-          <p:cNvSpPr/>
+          <p:cNvPr id="5" name="ZoneTexte 4"/>
+          <p:cNvSpPr txBox="1"/>
           <p:nvPr/>
         </p:nvSpPr>
         <p:spPr>
           <a:xfrm>
-            <a:off x="4973417" y="3244334"/>
-            <a:ext cx="2245166" cy="369332"/>
+            <a:off x="905931" y="1536174"/>
+            <a:ext cx="5452536" cy="3785652"/>
           </a:xfrm>
           <a:prstGeom prst="rect">
             <a:avLst/>
           </a:prstGeom>
-        </p:spPr>
-        <p:txBody>
-          <a:bodyPr wrap="none">
+          <a:noFill/>
+        </p:spPr>
+        <p:txBody>
+          <a:bodyPr wrap="square" rtlCol="0">
             <a:spAutoFit/>
           </a:bodyPr>
           <a:lstStyle/>
           <a:p>
+            <a:pPr marL="285750" indent="-285750" algn="just">
+              <a:lnSpc>
+                <a:spcPct val="200000"/>
+              </a:lnSpc>
+              <a:buFont typeface="Arial" panose="020B0604020202020204" pitchFamily="34" charset="0"/>
+              <a:buChar char="•"/>
+            </a:pPr>
+            <a:r>
+              <a:rPr lang="fr-FR" sz="2000" dirty="0" smtClean="0"/>
+              <a:t>Temps d’encodage très long, taille des fichiers</a:t>
+            </a:r>
+          </a:p>
+          <a:p>
+            <a:pPr marL="285750" indent="-285750" algn="just">
+              <a:lnSpc>
+                <a:spcPct val="200000"/>
+              </a:lnSpc>
+              <a:buFont typeface="Arial" panose="020B0604020202020204" pitchFamily="34" charset="0"/>
+              <a:buChar char="•"/>
+            </a:pPr>
+            <a:r>
+              <a:rPr lang="fr-FR" sz="2000" dirty="0"/>
+              <a:t>Bande passante de l’architecture de test limitée</a:t>
+            </a:r>
+          </a:p>
+          <a:p>
+            <a:pPr marL="285750" indent="-285750" algn="just">
+              <a:lnSpc>
+                <a:spcPct val="200000"/>
+              </a:lnSpc>
+              <a:buFont typeface="Arial" panose="020B0604020202020204" pitchFamily="34" charset="0"/>
+              <a:buChar char="•"/>
+            </a:pPr>
+            <a:r>
+              <a:rPr lang="fr-FR" sz="2000" dirty="0" smtClean="0"/>
+              <a:t>Limite </a:t>
+            </a:r>
+            <a:r>
+              <a:rPr lang="fr-FR" sz="2000" dirty="0"/>
+              <a:t>du nombre de tuiles maximum </a:t>
+            </a:r>
+          </a:p>
+          <a:p>
+            <a:pPr marL="285750" indent="-285750" algn="just">
+              <a:lnSpc>
+                <a:spcPct val="200000"/>
+              </a:lnSpc>
+              <a:buFont typeface="Arial" panose="020B0604020202020204" pitchFamily="34" charset="0"/>
+              <a:buChar char="•"/>
+            </a:pPr>
+            <a:r>
+              <a:rPr lang="fr-FR" sz="2000" dirty="0"/>
+              <a:t>Limite du nombre de bitrates </a:t>
+            </a:r>
+            <a:r>
+              <a:rPr lang="fr-FR" sz="2000" dirty="0" smtClean="0"/>
+              <a:t>différents</a:t>
+            </a:r>
+          </a:p>
+          <a:p>
+            <a:pPr marL="285750" indent="-285750" algn="just">
+              <a:lnSpc>
+                <a:spcPct val="200000"/>
+              </a:lnSpc>
+              <a:buFont typeface="Arial" panose="020B0604020202020204" pitchFamily="34" charset="0"/>
+              <a:buChar char="•"/>
+            </a:pPr>
+            <a:r>
+              <a:rPr lang="fr-FR" sz="2000" dirty="0" smtClean="0"/>
+              <a:t>Choix de la ROI limité</a:t>
+            </a:r>
+            <a:endParaRPr lang="fr-FR" sz="2000" dirty="0"/>
+          </a:p>
+          <a:p>
+            <a:pPr marL="285750" indent="-285750" algn="just">
+              <a:lnSpc>
+                <a:spcPct val="200000"/>
+              </a:lnSpc>
+              <a:buFont typeface="Arial" panose="020B0604020202020204" pitchFamily="34" charset="0"/>
+              <a:buChar char="•"/>
+            </a:pPr>
+            <a:r>
+              <a:rPr lang="fr-FR" sz="2000" dirty="0" smtClean="0"/>
+              <a:t>Stabilité du lecteur GPAC</a:t>
+            </a:r>
+            <a:endParaRPr lang="fr-FR" sz="2000" dirty="0"/>
+          </a:p>
+        </p:txBody>
+      </p:sp>
+      <p:sp>
+        <p:nvSpPr>
+          <p:cNvPr id="6" name="ZoneTexte 5"/>
+          <p:cNvSpPr txBox="1"/>
+          <p:nvPr/>
+        </p:nvSpPr>
+        <p:spPr>
+          <a:xfrm>
+            <a:off x="2353732" y="417840"/>
+            <a:ext cx="7484534" cy="523220"/>
+          </a:xfrm>
+          <a:prstGeom prst="rect">
+            <a:avLst/>
+          </a:prstGeom>
+          <a:noFill/>
+        </p:spPr>
+        <p:txBody>
+          <a:bodyPr wrap="square" rtlCol="0">
+            <a:spAutoFit/>
+          </a:bodyPr>
+          <a:lstStyle/>
+          <a:p>
             <a:pPr algn="ctr"/>
             <a:r>
-              <a:rPr lang="fr-FR" dirty="0" smtClean="0"/>
+              <a:rPr lang="fr-FR" sz="2800" dirty="0" smtClean="0"/>
               <a:t>Problèmes rencontrés</a:t>
             </a:r>
-            <a:endParaRPr lang="fr-FR" dirty="0"/>
+            <a:endParaRPr lang="fr-FR" sz="2800" dirty="0"/>
           </a:p>
         </p:txBody>
       </p:sp>
     </p:spTree>
     <p:extLst>
       <p:ext uri="{BB962C8B-B14F-4D97-AF65-F5344CB8AC3E}">
-        <p14:creationId xmlns:p14="http://schemas.microsoft.com/office/powerpoint/2010/main" val="2442421539"/>
+        <p14:creationId xmlns:p14="http://schemas.microsoft.com/office/powerpoint/2010/main" val="871201483"/>
       </p:ext>
     </p:extLst>
   </p:cSld>
@@ -4780,38 +4894,288 @@
       </p:sp>
       <p:sp>
         <p:nvSpPr>
-          <p:cNvPr id="4" name="Rectangle 3"/>
-          <p:cNvSpPr/>
+          <p:cNvPr id="5" name="ZoneTexte 4"/>
+          <p:cNvSpPr txBox="1"/>
           <p:nvPr/>
         </p:nvSpPr>
         <p:spPr>
           <a:xfrm>
-            <a:off x="4973417" y="3244334"/>
-            <a:ext cx="2245166" cy="369332"/>
+            <a:off x="905931" y="1536174"/>
+            <a:ext cx="5452536" cy="3785652"/>
           </a:xfrm>
           <a:prstGeom prst="rect">
             <a:avLst/>
           </a:prstGeom>
-        </p:spPr>
-        <p:txBody>
-          <a:bodyPr wrap="none">
+          <a:noFill/>
+        </p:spPr>
+        <p:txBody>
+          <a:bodyPr wrap="square" rtlCol="0">
             <a:spAutoFit/>
           </a:bodyPr>
           <a:lstStyle/>
           <a:p>
+            <a:pPr marL="285750" indent="-285750" algn="just">
+              <a:lnSpc>
+                <a:spcPct val="200000"/>
+              </a:lnSpc>
+              <a:buFont typeface="Arial" panose="020B0604020202020204" pitchFamily="34" charset="0"/>
+              <a:buChar char="•"/>
+            </a:pPr>
+            <a:r>
+              <a:rPr lang="fr-FR" sz="2000" dirty="0" smtClean="0"/>
+              <a:t>Temps d’encodage très long, taille des fichiers</a:t>
+            </a:r>
+          </a:p>
+          <a:p>
+            <a:pPr marL="285750" indent="-285750" algn="just">
+              <a:lnSpc>
+                <a:spcPct val="200000"/>
+              </a:lnSpc>
+              <a:buFont typeface="Arial" panose="020B0604020202020204" pitchFamily="34" charset="0"/>
+              <a:buChar char="•"/>
+            </a:pPr>
+            <a:r>
+              <a:rPr lang="fr-FR" sz="2000" dirty="0"/>
+              <a:t>Bande passante de l’architecture de test limitée</a:t>
+            </a:r>
+          </a:p>
+          <a:p>
+            <a:pPr marL="285750" indent="-285750" algn="just">
+              <a:lnSpc>
+                <a:spcPct val="200000"/>
+              </a:lnSpc>
+              <a:buFont typeface="Arial" panose="020B0604020202020204" pitchFamily="34" charset="0"/>
+              <a:buChar char="•"/>
+            </a:pPr>
+            <a:r>
+              <a:rPr lang="fr-FR" sz="2000" dirty="0" smtClean="0"/>
+              <a:t>Limite </a:t>
+            </a:r>
+            <a:r>
+              <a:rPr lang="fr-FR" sz="2000" dirty="0"/>
+              <a:t>du nombre de tuiles maximum </a:t>
+            </a:r>
+          </a:p>
+          <a:p>
+            <a:pPr marL="285750" indent="-285750" algn="just">
+              <a:lnSpc>
+                <a:spcPct val="200000"/>
+              </a:lnSpc>
+              <a:buFont typeface="Arial" panose="020B0604020202020204" pitchFamily="34" charset="0"/>
+              <a:buChar char="•"/>
+            </a:pPr>
+            <a:r>
+              <a:rPr lang="fr-FR" sz="2000" dirty="0"/>
+              <a:t>Limite du nombre de bitrates </a:t>
+            </a:r>
+            <a:r>
+              <a:rPr lang="fr-FR" sz="2000" dirty="0" smtClean="0"/>
+              <a:t>différents</a:t>
+            </a:r>
+          </a:p>
+          <a:p>
+            <a:pPr marL="285750" indent="-285750" algn="just">
+              <a:lnSpc>
+                <a:spcPct val="200000"/>
+              </a:lnSpc>
+              <a:buFont typeface="Arial" panose="020B0604020202020204" pitchFamily="34" charset="0"/>
+              <a:buChar char="•"/>
+            </a:pPr>
+            <a:r>
+              <a:rPr lang="fr-FR" sz="2000" dirty="0" smtClean="0"/>
+              <a:t>Choix de la ROI limité</a:t>
+            </a:r>
+            <a:endParaRPr lang="fr-FR" sz="2000" dirty="0"/>
+          </a:p>
+          <a:p>
+            <a:pPr marL="285750" indent="-285750" algn="just">
+              <a:lnSpc>
+                <a:spcPct val="200000"/>
+              </a:lnSpc>
+              <a:buFont typeface="Arial" panose="020B0604020202020204" pitchFamily="34" charset="0"/>
+              <a:buChar char="•"/>
+            </a:pPr>
+            <a:r>
+              <a:rPr lang="fr-FR" sz="2000" dirty="0" smtClean="0"/>
+              <a:t>Stabilité du lecteur GPAC</a:t>
+            </a:r>
+            <a:endParaRPr lang="fr-FR" sz="2000" dirty="0"/>
+          </a:p>
+        </p:txBody>
+      </p:sp>
+      <p:sp>
+        <p:nvSpPr>
+          <p:cNvPr id="6" name="ZoneTexte 5"/>
+          <p:cNvSpPr txBox="1"/>
+          <p:nvPr/>
+        </p:nvSpPr>
+        <p:spPr>
+          <a:xfrm>
+            <a:off x="2353732" y="417840"/>
+            <a:ext cx="7484534" cy="523220"/>
+          </a:xfrm>
+          <a:prstGeom prst="rect">
+            <a:avLst/>
+          </a:prstGeom>
+          <a:noFill/>
+        </p:spPr>
+        <p:txBody>
+          <a:bodyPr wrap="square" rtlCol="0">
+            <a:spAutoFit/>
+          </a:bodyPr>
+          <a:lstStyle/>
+          <a:p>
             <a:pPr algn="ctr"/>
             <a:r>
-              <a:rPr lang="fr-FR" dirty="0" smtClean="0"/>
+              <a:rPr lang="fr-FR" sz="2800" dirty="0" smtClean="0"/>
               <a:t>Problèmes rencontrés</a:t>
             </a:r>
-            <a:endParaRPr lang="fr-FR" dirty="0"/>
+            <a:endParaRPr lang="fr-FR" sz="2800" dirty="0"/>
+          </a:p>
+        </p:txBody>
+      </p:sp>
+      <p:sp>
+        <p:nvSpPr>
+          <p:cNvPr id="7" name="Accolade fermante 6"/>
+          <p:cNvSpPr/>
+          <p:nvPr/>
+        </p:nvSpPr>
+        <p:spPr>
+          <a:xfrm>
+            <a:off x="6180667" y="1667933"/>
+            <a:ext cx="347133" cy="1185334"/>
+          </a:xfrm>
+          <a:prstGeom prst="rightBrace">
+            <a:avLst/>
+          </a:prstGeom>
+          <a:ln w="12700"/>
+        </p:spPr>
+        <p:style>
+          <a:lnRef idx="1">
+            <a:schemeClr val="dk1"/>
+          </a:lnRef>
+          <a:fillRef idx="0">
+            <a:schemeClr val="dk1"/>
+          </a:fillRef>
+          <a:effectRef idx="0">
+            <a:schemeClr val="dk1"/>
+          </a:effectRef>
+          <a:fontRef idx="minor">
+            <a:schemeClr val="tx1"/>
+          </a:fontRef>
+        </p:style>
+        <p:txBody>
+          <a:bodyPr rtlCol="0" anchor="ctr"/>
+          <a:lstStyle/>
+          <a:p>
+            <a:pPr algn="ctr"/>
+            <a:endParaRPr lang="fr-FR"/>
+          </a:p>
+        </p:txBody>
+      </p:sp>
+      <p:sp>
+        <p:nvSpPr>
+          <p:cNvPr id="8" name="Accolade fermante 7"/>
+          <p:cNvSpPr/>
+          <p:nvPr/>
+        </p:nvSpPr>
+        <p:spPr>
+          <a:xfrm>
+            <a:off x="6180666" y="3056038"/>
+            <a:ext cx="347133" cy="2265788"/>
+          </a:xfrm>
+          <a:prstGeom prst="rightBrace">
+            <a:avLst/>
+          </a:prstGeom>
+          <a:ln w="12700"/>
+        </p:spPr>
+        <p:style>
+          <a:lnRef idx="1">
+            <a:schemeClr val="dk1"/>
+          </a:lnRef>
+          <a:fillRef idx="0">
+            <a:schemeClr val="dk1"/>
+          </a:fillRef>
+          <a:effectRef idx="0">
+            <a:schemeClr val="dk1"/>
+          </a:effectRef>
+          <a:fontRef idx="minor">
+            <a:schemeClr val="tx1"/>
+          </a:fontRef>
+        </p:style>
+        <p:txBody>
+          <a:bodyPr rtlCol="0" anchor="ctr"/>
+          <a:lstStyle/>
+          <a:p>
+            <a:pPr algn="ctr"/>
+            <a:endParaRPr lang="fr-FR"/>
+          </a:p>
+        </p:txBody>
+      </p:sp>
+      <p:sp>
+        <p:nvSpPr>
+          <p:cNvPr id="9" name="ZoneTexte 8"/>
+          <p:cNvSpPr txBox="1"/>
+          <p:nvPr/>
+        </p:nvSpPr>
+        <p:spPr>
+          <a:xfrm>
+            <a:off x="6722534" y="2018211"/>
+            <a:ext cx="2489200" cy="461665"/>
+          </a:xfrm>
+          <a:prstGeom prst="rect">
+            <a:avLst/>
+          </a:prstGeom>
+          <a:noFill/>
+        </p:spPr>
+        <p:txBody>
+          <a:bodyPr wrap="square" rtlCol="0">
+            <a:spAutoFit/>
+          </a:bodyPr>
+          <a:lstStyle/>
+          <a:p>
+            <a:r>
+              <a:rPr lang="fr-FR" sz="2400" dirty="0" smtClean="0"/>
+              <a:t>Limite matérielle</a:t>
+            </a:r>
+            <a:endParaRPr lang="fr-FR" sz="2400" dirty="0"/>
+          </a:p>
+        </p:txBody>
+      </p:sp>
+      <p:sp>
+        <p:nvSpPr>
+          <p:cNvPr id="10" name="ZoneTexte 9"/>
+          <p:cNvSpPr txBox="1"/>
+          <p:nvPr/>
+        </p:nvSpPr>
+        <p:spPr>
+          <a:xfrm>
+            <a:off x="6722534" y="3956448"/>
+            <a:ext cx="2164522" cy="461665"/>
+          </a:xfrm>
+          <a:prstGeom prst="rect">
+            <a:avLst/>
+          </a:prstGeom>
+          <a:noFill/>
+        </p:spPr>
+        <p:txBody>
+          <a:bodyPr wrap="square" rtlCol="0">
+            <a:spAutoFit/>
+          </a:bodyPr>
+          <a:lstStyle/>
+          <a:p>
+            <a:r>
+              <a:rPr lang="fr-FR" sz="2400" dirty="0" smtClean="0"/>
+              <a:t>Limite logiciel</a:t>
+            </a:r>
+            <a:endParaRPr lang="fr-FR" sz="2400" dirty="0"/>
           </a:p>
         </p:txBody>
       </p:sp>
     </p:spTree>
     <p:extLst>
       <p:ext uri="{BB962C8B-B14F-4D97-AF65-F5344CB8AC3E}">
-        <p14:creationId xmlns:p14="http://schemas.microsoft.com/office/powerpoint/2010/main" val="871201483"/>
+        <p14:creationId xmlns:p14="http://schemas.microsoft.com/office/powerpoint/2010/main" val="2442421539"/>
       </p:ext>
     </p:extLst>
   </p:cSld>
@@ -4829,6 +5193,548 @@
 </file>
 
 <file path=ppt/slides/slide18.xml><?xml version="1.0" encoding="utf-8"?>
+<p:sld xmlns:a="http://schemas.openxmlformats.org/drawingml/2006/main" xmlns:r="http://schemas.openxmlformats.org/officeDocument/2006/relationships" xmlns:p="http://schemas.openxmlformats.org/presentationml/2006/main">
+  <p:cSld>
+    <p:spTree>
+      <p:nvGrpSpPr>
+        <p:cNvPr id="1" name=""/>
+        <p:cNvGrpSpPr/>
+        <p:nvPr/>
+      </p:nvGrpSpPr>
+      <p:grpSpPr>
+        <a:xfrm>
+          <a:off x="0" y="0"/>
+          <a:ext cx="0" cy="0"/>
+          <a:chOff x="0" y="0"/>
+          <a:chExt cx="0" cy="0"/>
+        </a:xfrm>
+      </p:grpSpPr>
+      <p:sp>
+        <p:nvSpPr>
+          <p:cNvPr id="2" name="Espace réservé du numéro de diapositive 1"/>
+          <p:cNvSpPr>
+            <a:spLocks noGrp="1"/>
+          </p:cNvSpPr>
+          <p:nvPr>
+            <p:ph type="sldNum" sz="quarter" idx="12"/>
+          </p:nvPr>
+        </p:nvSpPr>
+        <p:spPr/>
+        <p:txBody>
+          <a:bodyPr/>
+          <a:lstStyle/>
+          <a:p>
+            <a:fld id="{E4F67F9A-838C-4734-8EB0-754A37D9A5A7}" type="slidenum">
+              <a:rPr lang="fr-FR" smtClean="0"/>
+              <a:t>18</a:t>
+            </a:fld>
+            <a:endParaRPr lang="fr-FR"/>
+          </a:p>
+        </p:txBody>
+      </p:sp>
+      <p:sp>
+        <p:nvSpPr>
+          <p:cNvPr id="3" name="ZoneTexte 2"/>
+          <p:cNvSpPr txBox="1"/>
+          <p:nvPr/>
+        </p:nvSpPr>
+        <p:spPr>
+          <a:xfrm>
+            <a:off x="-1" y="0"/>
+            <a:ext cx="1532467" cy="307777"/>
+          </a:xfrm>
+          <a:prstGeom prst="rect">
+            <a:avLst/>
+          </a:prstGeom>
+          <a:noFill/>
+        </p:spPr>
+        <p:txBody>
+          <a:bodyPr wrap="square" rtlCol="0">
+            <a:spAutoFit/>
+          </a:bodyPr>
+          <a:lstStyle/>
+          <a:p>
+            <a:r>
+              <a:rPr lang="fr-FR" sz="1400" dirty="0" smtClean="0">
+                <a:solidFill>
+                  <a:srgbClr val="FF0000"/>
+                </a:solidFill>
+              </a:rPr>
+              <a:t>Développement 4</a:t>
+            </a:r>
+            <a:endParaRPr lang="fr-FR" sz="1400" dirty="0">
+              <a:solidFill>
+                <a:srgbClr val="FF0000"/>
+              </a:solidFill>
+            </a:endParaRPr>
+          </a:p>
+        </p:txBody>
+      </p:sp>
+      <p:sp>
+        <p:nvSpPr>
+          <p:cNvPr id="5" name="ZoneTexte 4"/>
+          <p:cNvSpPr txBox="1"/>
+          <p:nvPr/>
+        </p:nvSpPr>
+        <p:spPr>
+          <a:xfrm>
+            <a:off x="905931" y="1536174"/>
+            <a:ext cx="5452536" cy="3785652"/>
+          </a:xfrm>
+          <a:prstGeom prst="rect">
+            <a:avLst/>
+          </a:prstGeom>
+          <a:noFill/>
+        </p:spPr>
+        <p:txBody>
+          <a:bodyPr wrap="square" rtlCol="0">
+            <a:spAutoFit/>
+          </a:bodyPr>
+          <a:lstStyle/>
+          <a:p>
+            <a:pPr marL="285750" indent="-285750" algn="just">
+              <a:lnSpc>
+                <a:spcPct val="200000"/>
+              </a:lnSpc>
+              <a:buFont typeface="Arial" panose="020B0604020202020204" pitchFamily="34" charset="0"/>
+              <a:buChar char="•"/>
+            </a:pPr>
+            <a:r>
+              <a:rPr lang="fr-FR" sz="2000" dirty="0" smtClean="0"/>
+              <a:t>Temps d’encodage très long, taille des fichiers</a:t>
+            </a:r>
+          </a:p>
+          <a:p>
+            <a:pPr marL="285750" indent="-285750" algn="just">
+              <a:lnSpc>
+                <a:spcPct val="200000"/>
+              </a:lnSpc>
+              <a:buFont typeface="Arial" panose="020B0604020202020204" pitchFamily="34" charset="0"/>
+              <a:buChar char="•"/>
+            </a:pPr>
+            <a:r>
+              <a:rPr lang="fr-FR" sz="2000" dirty="0"/>
+              <a:t>Bande passante de l’architecture de test limitée</a:t>
+            </a:r>
+          </a:p>
+          <a:p>
+            <a:pPr marL="285750" indent="-285750" algn="just">
+              <a:lnSpc>
+                <a:spcPct val="200000"/>
+              </a:lnSpc>
+              <a:buFont typeface="Arial" panose="020B0604020202020204" pitchFamily="34" charset="0"/>
+              <a:buChar char="•"/>
+            </a:pPr>
+            <a:r>
+              <a:rPr lang="fr-FR" sz="2000" dirty="0" smtClean="0"/>
+              <a:t>Limite </a:t>
+            </a:r>
+            <a:r>
+              <a:rPr lang="fr-FR" sz="2000" dirty="0"/>
+              <a:t>du nombre de tuiles maximum </a:t>
+            </a:r>
+          </a:p>
+          <a:p>
+            <a:pPr marL="285750" indent="-285750" algn="just">
+              <a:lnSpc>
+                <a:spcPct val="200000"/>
+              </a:lnSpc>
+              <a:buFont typeface="Arial" panose="020B0604020202020204" pitchFamily="34" charset="0"/>
+              <a:buChar char="•"/>
+            </a:pPr>
+            <a:r>
+              <a:rPr lang="fr-FR" sz="2000" dirty="0"/>
+              <a:t>Limite du nombre de bitrates </a:t>
+            </a:r>
+            <a:r>
+              <a:rPr lang="fr-FR" sz="2000" dirty="0" smtClean="0"/>
+              <a:t>différents</a:t>
+            </a:r>
+          </a:p>
+          <a:p>
+            <a:pPr marL="285750" indent="-285750" algn="just">
+              <a:lnSpc>
+                <a:spcPct val="200000"/>
+              </a:lnSpc>
+              <a:buFont typeface="Arial" panose="020B0604020202020204" pitchFamily="34" charset="0"/>
+              <a:buChar char="•"/>
+            </a:pPr>
+            <a:r>
+              <a:rPr lang="fr-FR" sz="2000" dirty="0" smtClean="0"/>
+              <a:t>Choix de la ROI limité</a:t>
+            </a:r>
+            <a:endParaRPr lang="fr-FR" sz="2000" dirty="0"/>
+          </a:p>
+          <a:p>
+            <a:pPr marL="285750" indent="-285750" algn="just">
+              <a:lnSpc>
+                <a:spcPct val="200000"/>
+              </a:lnSpc>
+              <a:buFont typeface="Arial" panose="020B0604020202020204" pitchFamily="34" charset="0"/>
+              <a:buChar char="•"/>
+            </a:pPr>
+            <a:r>
+              <a:rPr lang="fr-FR" sz="2000" dirty="0" smtClean="0"/>
+              <a:t>Stabilité du lecteur GPAC</a:t>
+            </a:r>
+            <a:endParaRPr lang="fr-FR" sz="2000" dirty="0"/>
+          </a:p>
+        </p:txBody>
+      </p:sp>
+      <p:sp>
+        <p:nvSpPr>
+          <p:cNvPr id="6" name="ZoneTexte 5"/>
+          <p:cNvSpPr txBox="1"/>
+          <p:nvPr/>
+        </p:nvSpPr>
+        <p:spPr>
+          <a:xfrm>
+            <a:off x="2353732" y="417840"/>
+            <a:ext cx="7484534" cy="523220"/>
+          </a:xfrm>
+          <a:prstGeom prst="rect">
+            <a:avLst/>
+          </a:prstGeom>
+          <a:noFill/>
+        </p:spPr>
+        <p:txBody>
+          <a:bodyPr wrap="square" rtlCol="0">
+            <a:spAutoFit/>
+          </a:bodyPr>
+          <a:lstStyle/>
+          <a:p>
+            <a:pPr algn="ctr"/>
+            <a:r>
+              <a:rPr lang="fr-FR" sz="2800" dirty="0" smtClean="0"/>
+              <a:t>Problèmes rencontrés</a:t>
+            </a:r>
+            <a:endParaRPr lang="fr-FR" sz="2800" dirty="0"/>
+          </a:p>
+        </p:txBody>
+      </p:sp>
+      <p:sp>
+        <p:nvSpPr>
+          <p:cNvPr id="7" name="Accolade fermante 6"/>
+          <p:cNvSpPr/>
+          <p:nvPr/>
+        </p:nvSpPr>
+        <p:spPr>
+          <a:xfrm>
+            <a:off x="6180667" y="1667933"/>
+            <a:ext cx="347133" cy="1185334"/>
+          </a:xfrm>
+          <a:prstGeom prst="rightBrace">
+            <a:avLst/>
+          </a:prstGeom>
+          <a:ln w="12700"/>
+        </p:spPr>
+        <p:style>
+          <a:lnRef idx="1">
+            <a:schemeClr val="dk1"/>
+          </a:lnRef>
+          <a:fillRef idx="0">
+            <a:schemeClr val="dk1"/>
+          </a:fillRef>
+          <a:effectRef idx="0">
+            <a:schemeClr val="dk1"/>
+          </a:effectRef>
+          <a:fontRef idx="minor">
+            <a:schemeClr val="tx1"/>
+          </a:fontRef>
+        </p:style>
+        <p:txBody>
+          <a:bodyPr rtlCol="0" anchor="ctr"/>
+          <a:lstStyle/>
+          <a:p>
+            <a:pPr algn="ctr"/>
+            <a:endParaRPr lang="fr-FR"/>
+          </a:p>
+        </p:txBody>
+      </p:sp>
+      <p:sp>
+        <p:nvSpPr>
+          <p:cNvPr id="8" name="Accolade fermante 7"/>
+          <p:cNvSpPr/>
+          <p:nvPr/>
+        </p:nvSpPr>
+        <p:spPr>
+          <a:xfrm>
+            <a:off x="6180666" y="3056038"/>
+            <a:ext cx="347133" cy="2265788"/>
+          </a:xfrm>
+          <a:prstGeom prst="rightBrace">
+            <a:avLst/>
+          </a:prstGeom>
+          <a:ln w="12700"/>
+        </p:spPr>
+        <p:style>
+          <a:lnRef idx="1">
+            <a:schemeClr val="dk1"/>
+          </a:lnRef>
+          <a:fillRef idx="0">
+            <a:schemeClr val="dk1"/>
+          </a:fillRef>
+          <a:effectRef idx="0">
+            <a:schemeClr val="dk1"/>
+          </a:effectRef>
+          <a:fontRef idx="minor">
+            <a:schemeClr val="tx1"/>
+          </a:fontRef>
+        </p:style>
+        <p:txBody>
+          <a:bodyPr rtlCol="0" anchor="ctr"/>
+          <a:lstStyle/>
+          <a:p>
+            <a:pPr algn="ctr"/>
+            <a:endParaRPr lang="fr-FR"/>
+          </a:p>
+        </p:txBody>
+      </p:sp>
+      <p:sp>
+        <p:nvSpPr>
+          <p:cNvPr id="9" name="ZoneTexte 8"/>
+          <p:cNvSpPr txBox="1"/>
+          <p:nvPr/>
+        </p:nvSpPr>
+        <p:spPr>
+          <a:xfrm>
+            <a:off x="6722534" y="2018211"/>
+            <a:ext cx="2489200" cy="461665"/>
+          </a:xfrm>
+          <a:prstGeom prst="rect">
+            <a:avLst/>
+          </a:prstGeom>
+          <a:noFill/>
+        </p:spPr>
+        <p:txBody>
+          <a:bodyPr wrap="square" rtlCol="0">
+            <a:spAutoFit/>
+          </a:bodyPr>
+          <a:lstStyle/>
+          <a:p>
+            <a:r>
+              <a:rPr lang="fr-FR" sz="2400" dirty="0" smtClean="0"/>
+              <a:t>Limite matérielle</a:t>
+            </a:r>
+            <a:endParaRPr lang="fr-FR" sz="2400" dirty="0"/>
+          </a:p>
+        </p:txBody>
+      </p:sp>
+      <p:sp>
+        <p:nvSpPr>
+          <p:cNvPr id="10" name="ZoneTexte 9"/>
+          <p:cNvSpPr txBox="1"/>
+          <p:nvPr/>
+        </p:nvSpPr>
+        <p:spPr>
+          <a:xfrm>
+            <a:off x="6722534" y="3956448"/>
+            <a:ext cx="2164522" cy="461665"/>
+          </a:xfrm>
+          <a:prstGeom prst="rect">
+            <a:avLst/>
+          </a:prstGeom>
+          <a:noFill/>
+        </p:spPr>
+        <p:txBody>
+          <a:bodyPr wrap="square" rtlCol="0">
+            <a:spAutoFit/>
+          </a:bodyPr>
+          <a:lstStyle/>
+          <a:p>
+            <a:r>
+              <a:rPr lang="fr-FR" sz="2400" dirty="0" smtClean="0"/>
+              <a:t>Limite logiciel</a:t>
+            </a:r>
+            <a:endParaRPr lang="fr-FR" sz="2400" dirty="0"/>
+          </a:p>
+        </p:txBody>
+      </p:sp>
+      <p:sp>
+        <p:nvSpPr>
+          <p:cNvPr id="13" name="Flèche à angle droit 12"/>
+          <p:cNvSpPr/>
+          <p:nvPr/>
+        </p:nvSpPr>
+        <p:spPr>
+          <a:xfrm rot="5400000">
+            <a:off x="6856287" y="2504425"/>
+            <a:ext cx="502741" cy="381213"/>
+          </a:xfrm>
+          <a:prstGeom prst="bentUpArrow">
+            <a:avLst>
+              <a:gd name="adj1" fmla="val 25100"/>
+              <a:gd name="adj2" fmla="val 26553"/>
+              <a:gd name="adj3" fmla="val 25000"/>
+            </a:avLst>
+          </a:prstGeom>
+        </p:spPr>
+        <p:style>
+          <a:lnRef idx="2">
+            <a:schemeClr val="accent3">
+              <a:shade val="50000"/>
+            </a:schemeClr>
+          </a:lnRef>
+          <a:fillRef idx="1">
+            <a:schemeClr val="accent3"/>
+          </a:fillRef>
+          <a:effectRef idx="0">
+            <a:schemeClr val="accent3"/>
+          </a:effectRef>
+          <a:fontRef idx="minor">
+            <a:schemeClr val="lt1"/>
+          </a:fontRef>
+        </p:style>
+        <p:txBody>
+          <a:bodyPr rtlCol="0" anchor="ctr"/>
+          <a:lstStyle/>
+          <a:p>
+            <a:pPr algn="ctr"/>
+            <a:endParaRPr lang="fr-FR"/>
+          </a:p>
+        </p:txBody>
+      </p:sp>
+      <p:sp>
+        <p:nvSpPr>
+          <p:cNvPr id="15" name="ZoneTexte 14"/>
+          <p:cNvSpPr txBox="1"/>
+          <p:nvPr/>
+        </p:nvSpPr>
+        <p:spPr>
+          <a:xfrm>
+            <a:off x="7365999" y="2598003"/>
+            <a:ext cx="4267203" cy="830997"/>
+          </a:xfrm>
+          <a:prstGeom prst="rect">
+            <a:avLst/>
+          </a:prstGeom>
+          <a:noFill/>
+        </p:spPr>
+        <p:txBody>
+          <a:bodyPr wrap="square" rtlCol="0">
+            <a:spAutoFit/>
+          </a:bodyPr>
+          <a:lstStyle/>
+          <a:p>
+            <a:r>
+              <a:rPr lang="fr-FR" sz="2400" dirty="0" smtClean="0">
+                <a:solidFill>
+                  <a:srgbClr val="800000"/>
+                </a:solidFill>
+              </a:rPr>
+              <a:t>Solution : architecture de test de laboratoire</a:t>
+            </a:r>
+            <a:endParaRPr lang="fr-FR" sz="2400" dirty="0">
+              <a:solidFill>
+                <a:srgbClr val="800000"/>
+              </a:solidFill>
+            </a:endParaRPr>
+          </a:p>
+        </p:txBody>
+      </p:sp>
+      <p:sp>
+        <p:nvSpPr>
+          <p:cNvPr id="16" name="ZoneTexte 15"/>
+          <p:cNvSpPr txBox="1"/>
+          <p:nvPr/>
+        </p:nvSpPr>
+        <p:spPr>
+          <a:xfrm>
+            <a:off x="7365999" y="4520397"/>
+            <a:ext cx="4377269" cy="461665"/>
+          </a:xfrm>
+          <a:prstGeom prst="rect">
+            <a:avLst/>
+          </a:prstGeom>
+          <a:noFill/>
+        </p:spPr>
+        <p:txBody>
+          <a:bodyPr wrap="square" rtlCol="0">
+            <a:spAutoFit/>
+          </a:bodyPr>
+          <a:lstStyle/>
+          <a:p>
+            <a:r>
+              <a:rPr lang="fr-FR" sz="2400" dirty="0" smtClean="0">
+                <a:solidFill>
+                  <a:srgbClr val="800000"/>
+                </a:solidFill>
+              </a:rPr>
+              <a:t>Solution : utiliser un autre lecteur</a:t>
+            </a:r>
+            <a:endParaRPr lang="fr-FR" sz="2400" dirty="0">
+              <a:solidFill>
+                <a:srgbClr val="800000"/>
+              </a:solidFill>
+            </a:endParaRPr>
+          </a:p>
+        </p:txBody>
+      </p:sp>
+      <p:sp>
+        <p:nvSpPr>
+          <p:cNvPr id="17" name="Flèche à angle droit 16"/>
+          <p:cNvSpPr/>
+          <p:nvPr/>
+        </p:nvSpPr>
+        <p:spPr>
+          <a:xfrm rot="5400000">
+            <a:off x="6856287" y="4438742"/>
+            <a:ext cx="502741" cy="381213"/>
+          </a:xfrm>
+          <a:prstGeom prst="bentUpArrow">
+            <a:avLst>
+              <a:gd name="adj1" fmla="val 25100"/>
+              <a:gd name="adj2" fmla="val 26553"/>
+              <a:gd name="adj3" fmla="val 25000"/>
+            </a:avLst>
+          </a:prstGeom>
+        </p:spPr>
+        <p:style>
+          <a:lnRef idx="2">
+            <a:schemeClr val="accent3">
+              <a:shade val="50000"/>
+            </a:schemeClr>
+          </a:lnRef>
+          <a:fillRef idx="1">
+            <a:schemeClr val="accent3"/>
+          </a:fillRef>
+          <a:effectRef idx="0">
+            <a:schemeClr val="accent3"/>
+          </a:effectRef>
+          <a:fontRef idx="minor">
+            <a:schemeClr val="lt1"/>
+          </a:fontRef>
+        </p:style>
+        <p:txBody>
+          <a:bodyPr rtlCol="0" anchor="ctr"/>
+          <a:lstStyle/>
+          <a:p>
+            <a:pPr algn="ctr"/>
+            <a:endParaRPr lang="fr-FR"/>
+          </a:p>
+        </p:txBody>
+      </p:sp>
+    </p:spTree>
+    <p:extLst>
+      <p:ext uri="{BB962C8B-B14F-4D97-AF65-F5344CB8AC3E}">
+        <p14:creationId xmlns:p14="http://schemas.microsoft.com/office/powerpoint/2010/main" val="3732989751"/>
+      </p:ext>
+    </p:extLst>
+  </p:cSld>
+  <p:clrMapOvr>
+    <a:masterClrMapping/>
+  </p:clrMapOvr>
+  <p:timing>
+    <p:tnLst>
+      <p:par>
+        <p:cTn id="1" dur="indefinite" restart="never" nodeType="tmRoot"/>
+      </p:par>
+    </p:tnLst>
+  </p:timing>
+</p:sld>
+</file>
+
+<file path=ppt/slides/slide19.xml><?xml version="1.0" encoding="utf-8"?>
 <p:sld xmlns:a="http://schemas.openxmlformats.org/drawingml/2006/main" xmlns:r="http://schemas.openxmlformats.org/officeDocument/2006/relationships" xmlns:p="http://schemas.openxmlformats.org/presentationml/2006/main">
   <p:cSld>
     <p:bg>
@@ -4872,7 +5778,7 @@
           <a:p>
             <a:fld id="{E4F67F9A-838C-4734-8EB0-754A37D9A5A7}" type="slidenum">
               <a:rPr lang="fr-FR" smtClean="0"/>
-              <a:t>18</a:t>
+              <a:t>19</a:t>
             </a:fld>
             <a:endParaRPr lang="fr-FR"/>
           </a:p>
@@ -4955,134 +5861,6 @@
   <p:clrMapOvr>
     <a:masterClrMapping/>
   </p:clrMapOvr>
-</p:sld>
-</file>
-
-<file path=ppt/slides/slide19.xml><?xml version="1.0" encoding="utf-8"?>
-<p:sld xmlns:a="http://schemas.openxmlformats.org/drawingml/2006/main" xmlns:r="http://schemas.openxmlformats.org/officeDocument/2006/relationships" xmlns:p="http://schemas.openxmlformats.org/presentationml/2006/main">
-  <p:cSld>
-    <p:spTree>
-      <p:nvGrpSpPr>
-        <p:cNvPr id="1" name=""/>
-        <p:cNvGrpSpPr/>
-        <p:nvPr/>
-      </p:nvGrpSpPr>
-      <p:grpSpPr>
-        <a:xfrm>
-          <a:off x="0" y="0"/>
-          <a:ext cx="0" cy="0"/>
-          <a:chOff x="0" y="0"/>
-          <a:chExt cx="0" cy="0"/>
-        </a:xfrm>
-      </p:grpSpPr>
-      <p:sp>
-        <p:nvSpPr>
-          <p:cNvPr id="2" name="Espace réservé du numéro de diapositive 1"/>
-          <p:cNvSpPr>
-            <a:spLocks noGrp="1"/>
-          </p:cNvSpPr>
-          <p:nvPr>
-            <p:ph type="sldNum" sz="quarter" idx="12"/>
-          </p:nvPr>
-        </p:nvSpPr>
-        <p:spPr/>
-        <p:txBody>
-          <a:bodyPr/>
-          <a:lstStyle/>
-          <a:p>
-            <a:fld id="{E4F67F9A-838C-4734-8EB0-754A37D9A5A7}" type="slidenum">
-              <a:rPr lang="fr-FR" smtClean="0"/>
-              <a:t>19</a:t>
-            </a:fld>
-            <a:endParaRPr lang="fr-FR"/>
-          </a:p>
-        </p:txBody>
-      </p:sp>
-      <p:sp>
-        <p:nvSpPr>
-          <p:cNvPr id="3" name="ZoneTexte 2"/>
-          <p:cNvSpPr txBox="1"/>
-          <p:nvPr/>
-        </p:nvSpPr>
-        <p:spPr>
-          <a:xfrm>
-            <a:off x="-1" y="0"/>
-            <a:ext cx="1532467" cy="307777"/>
-          </a:xfrm>
-          <a:prstGeom prst="rect">
-            <a:avLst/>
-          </a:prstGeom>
-          <a:noFill/>
-        </p:spPr>
-        <p:txBody>
-          <a:bodyPr wrap="square" rtlCol="0">
-            <a:spAutoFit/>
-          </a:bodyPr>
-          <a:lstStyle/>
-          <a:p>
-            <a:r>
-              <a:rPr lang="fr-FR" sz="1400" dirty="0" smtClean="0">
-                <a:solidFill>
-                  <a:srgbClr val="FF0000"/>
-                </a:solidFill>
-              </a:rPr>
-              <a:t>Développement 5</a:t>
-            </a:r>
-            <a:endParaRPr lang="fr-FR" sz="1400" dirty="0">
-              <a:solidFill>
-                <a:srgbClr val="FF0000"/>
-              </a:solidFill>
-            </a:endParaRPr>
-          </a:p>
-        </p:txBody>
-      </p:sp>
-      <p:sp>
-        <p:nvSpPr>
-          <p:cNvPr id="4" name="Rectangle 3"/>
-          <p:cNvSpPr/>
-          <p:nvPr/>
-        </p:nvSpPr>
-        <p:spPr>
-          <a:xfrm>
-            <a:off x="2461383" y="3244334"/>
-            <a:ext cx="7269234" cy="369332"/>
-          </a:xfrm>
-          <a:prstGeom prst="rect">
-            <a:avLst/>
-          </a:prstGeom>
-        </p:spPr>
-        <p:txBody>
-          <a:bodyPr wrap="none">
-            <a:spAutoFit/>
-          </a:bodyPr>
-          <a:lstStyle/>
-          <a:p>
-            <a:pPr algn="ctr"/>
-            <a:r>
-              <a:rPr lang="fr-FR" dirty="0" smtClean="0"/>
-              <a:t>Peut être un slide de trop ou alors a rajouter pour les problèmes rencontrés</a:t>
-            </a:r>
-            <a:endParaRPr lang="fr-FR" dirty="0"/>
-          </a:p>
-        </p:txBody>
-      </p:sp>
-    </p:spTree>
-    <p:extLst>
-      <p:ext uri="{BB962C8B-B14F-4D97-AF65-F5344CB8AC3E}">
-        <p14:creationId xmlns:p14="http://schemas.microsoft.com/office/powerpoint/2010/main" val="122085997"/>
-      </p:ext>
-    </p:extLst>
-  </p:cSld>
-  <p:clrMapOvr>
-    <a:masterClrMapping/>
-  </p:clrMapOvr>
-  <p:timing>
-    <p:tnLst>
-      <p:par>
-        <p:cTn id="1" dur="indefinite" restart="never" nodeType="tmRoot"/>
-      </p:par>
-    </p:tnLst>
-  </p:timing>
 </p:sld>
 </file>
 
@@ -5283,7 +6061,7 @@
                   <a:srgbClr val="FF0000"/>
                 </a:solidFill>
               </a:rPr>
-              <a:t>Conclusion</a:t>
+              <a:t>Développement 5</a:t>
             </a:r>
             <a:endParaRPr lang="fr-FR" sz="1400" dirty="0">
               <a:solidFill>
@@ -5295,14 +6073,14 @@
       </p:sp>
       <p:sp>
         <p:nvSpPr>
-          <p:cNvPr id="6" name="Rectangle 5"/>
+          <p:cNvPr id="4" name="Rectangle 3"/>
           <p:cNvSpPr/>
           <p:nvPr/>
         </p:nvSpPr>
         <p:spPr>
           <a:xfrm>
-            <a:off x="5314443" y="3244334"/>
-            <a:ext cx="1563120" cy="369332"/>
+            <a:off x="2461383" y="3244334"/>
+            <a:ext cx="7269234" cy="369332"/>
           </a:xfrm>
           <a:prstGeom prst="rect">
             <a:avLst/>
@@ -5317,7 +6095,7 @@
             <a:pPr algn="ctr"/>
             <a:r>
               <a:rPr lang="fr-FR" dirty="0" smtClean="0"/>
-              <a:t>Bilan du projet</a:t>
+              <a:t>Peut être un slide de trop ou alors a rajouter pour les problèmes rencontrés</a:t>
             </a:r>
             <a:endParaRPr lang="fr-FR" dirty="0"/>
           </a:p>
@@ -5326,7 +6104,7 @@
     </p:spTree>
     <p:extLst>
       <p:ext uri="{BB962C8B-B14F-4D97-AF65-F5344CB8AC3E}">
-        <p14:creationId xmlns:p14="http://schemas.microsoft.com/office/powerpoint/2010/main" val="3231713206"/>
+        <p14:creationId xmlns:p14="http://schemas.microsoft.com/office/powerpoint/2010/main" val="122085997"/>
       </p:ext>
     </p:extLst>
   </p:cSld>
@@ -5411,7 +6189,7 @@
                   <a:srgbClr val="FF0000"/>
                 </a:solidFill>
               </a:rPr>
-              <a:t>Merci</a:t>
+              <a:t>Conclusion</a:t>
             </a:r>
             <a:endParaRPr lang="fr-FR" sz="1400" dirty="0">
               <a:solidFill>
@@ -5423,14 +6201,142 @@
       </p:sp>
       <p:sp>
         <p:nvSpPr>
+          <p:cNvPr id="6" name="Rectangle 5"/>
+          <p:cNvSpPr/>
+          <p:nvPr/>
+        </p:nvSpPr>
+        <p:spPr>
+          <a:xfrm>
+            <a:off x="5314443" y="3244334"/>
+            <a:ext cx="1563120" cy="369332"/>
+          </a:xfrm>
+          <a:prstGeom prst="rect">
+            <a:avLst/>
+          </a:prstGeom>
+        </p:spPr>
+        <p:txBody>
+          <a:bodyPr wrap="none">
+            <a:spAutoFit/>
+          </a:bodyPr>
+          <a:lstStyle/>
+          <a:p>
+            <a:pPr algn="ctr"/>
+            <a:r>
+              <a:rPr lang="fr-FR" dirty="0" smtClean="0"/>
+              <a:t>Bilan du projet</a:t>
+            </a:r>
+            <a:endParaRPr lang="fr-FR" dirty="0"/>
+          </a:p>
+        </p:txBody>
+      </p:sp>
+    </p:spTree>
+    <p:extLst>
+      <p:ext uri="{BB962C8B-B14F-4D97-AF65-F5344CB8AC3E}">
+        <p14:creationId xmlns:p14="http://schemas.microsoft.com/office/powerpoint/2010/main" val="3231713206"/>
+      </p:ext>
+    </p:extLst>
+  </p:cSld>
+  <p:clrMapOvr>
+    <a:masterClrMapping/>
+  </p:clrMapOvr>
+  <p:timing>
+    <p:tnLst>
+      <p:par>
+        <p:cTn id="1" dur="indefinite" restart="never" nodeType="tmRoot"/>
+      </p:par>
+    </p:tnLst>
+  </p:timing>
+</p:sld>
+</file>
+
+<file path=ppt/slides/slide22.xml><?xml version="1.0" encoding="utf-8"?>
+<p:sld xmlns:a="http://schemas.openxmlformats.org/drawingml/2006/main" xmlns:r="http://schemas.openxmlformats.org/officeDocument/2006/relationships" xmlns:p="http://schemas.openxmlformats.org/presentationml/2006/main">
+  <p:cSld>
+    <p:spTree>
+      <p:nvGrpSpPr>
+        <p:cNvPr id="1" name=""/>
+        <p:cNvGrpSpPr/>
+        <p:nvPr/>
+      </p:nvGrpSpPr>
+      <p:grpSpPr>
+        <a:xfrm>
+          <a:off x="0" y="0"/>
+          <a:ext cx="0" cy="0"/>
+          <a:chOff x="0" y="0"/>
+          <a:chExt cx="0" cy="0"/>
+        </a:xfrm>
+      </p:grpSpPr>
+      <p:sp>
+        <p:nvSpPr>
+          <p:cNvPr id="2" name="Espace réservé du numéro de diapositive 1"/>
+          <p:cNvSpPr>
+            <a:spLocks noGrp="1"/>
+          </p:cNvSpPr>
+          <p:nvPr>
+            <p:ph type="sldNum" sz="quarter" idx="12"/>
+          </p:nvPr>
+        </p:nvSpPr>
+        <p:spPr/>
+        <p:txBody>
+          <a:bodyPr/>
+          <a:lstStyle/>
+          <a:p>
+            <a:fld id="{E4F67F9A-838C-4734-8EB0-754A37D9A5A7}" type="slidenum">
+              <a:rPr lang="fr-FR" smtClean="0"/>
+              <a:t>22</a:t>
+            </a:fld>
+            <a:endParaRPr lang="fr-FR"/>
+          </a:p>
+        </p:txBody>
+      </p:sp>
+      <p:sp>
+        <p:nvSpPr>
+          <p:cNvPr id="3" name="ZoneTexte 2"/>
+          <p:cNvSpPr txBox="1"/>
+          <p:nvPr/>
+        </p:nvSpPr>
+        <p:spPr>
+          <a:xfrm>
+            <a:off x="-1" y="0"/>
+            <a:ext cx="1532467" cy="307777"/>
+          </a:xfrm>
+          <a:prstGeom prst="rect">
+            <a:avLst/>
+          </a:prstGeom>
+          <a:noFill/>
+        </p:spPr>
+        <p:txBody>
+          <a:bodyPr wrap="square" rtlCol="0">
+            <a:spAutoFit/>
+          </a:bodyPr>
+          <a:lstStyle/>
+          <a:p>
+            <a:r>
+              <a:rPr lang="fr-FR" sz="1400" dirty="0" smtClean="0">
+                <a:solidFill>
+                  <a:srgbClr val="FF0000"/>
+                </a:solidFill>
+              </a:rPr>
+              <a:t>Merci</a:t>
+            </a:r>
+            <a:endParaRPr lang="fr-FR" sz="1400" dirty="0">
+              <a:solidFill>
+                <a:srgbClr val="FF0000"/>
+              </a:solidFill>
+            </a:endParaRPr>
+          </a:p>
+        </p:txBody>
+      </p:sp>
+      <p:sp>
+        <p:nvSpPr>
           <p:cNvPr id="4" name="Rectangle 3"/>
           <p:cNvSpPr/>
           <p:nvPr/>
         </p:nvSpPr>
         <p:spPr>
           <a:xfrm>
-            <a:off x="5525940" y="3167390"/>
-            <a:ext cx="1140120" cy="523220"/>
+            <a:off x="4979508" y="2921168"/>
+            <a:ext cx="2232984" cy="1015663"/>
           </a:xfrm>
           <a:prstGeom prst="rect">
             <a:avLst/>
@@ -5444,10 +6350,10 @@
           <a:p>
             <a:pPr algn="ctr"/>
             <a:r>
-              <a:rPr lang="fr-FR" sz="2800" dirty="0" smtClean="0"/>
+              <a:rPr lang="fr-FR" sz="6000" dirty="0" smtClean="0"/>
               <a:t>MERCI</a:t>
             </a:r>
-            <a:endParaRPr lang="fr-FR" sz="2800" dirty="0"/>
+            <a:endParaRPr lang="fr-FR" sz="6000" dirty="0"/>
           </a:p>
         </p:txBody>
       </p:sp>

</xml_diff>